<commit_message>
add up code with method calls
</commit_message>
<xml_diff>
--- a/resources/ppt-slides/sequence-data-method-call.pptx
+++ b/resources/ppt-slides/sequence-data-method-call.pptx
@@ -205,7 +205,7 @@
           <a:p>
             <a:fld id="{55D2E356-1E4F-384B-BA9F-8D857C61E07D}" type="datetimeFigureOut">
               <a:rPr lang="en-US" smtClean="0"/>
-              <a:t>9/10/23</a:t>
+              <a:t>9/11/23</a:t>
             </a:fld>
             <a:endParaRPr lang="en-US"/>
           </a:p>
@@ -688,7 +688,7 @@
           <a:p>
             <a:fld id="{964302DC-9F53-934F-AE4D-0F1F197008C1}" type="datetimeFigureOut">
               <a:rPr lang="en-US" smtClean="0"/>
-              <a:t>9/10/23</a:t>
+              <a:t>9/11/23</a:t>
             </a:fld>
             <a:endParaRPr lang="en-US"/>
           </a:p>
@@ -858,7 +858,7 @@
           <a:p>
             <a:fld id="{964302DC-9F53-934F-AE4D-0F1F197008C1}" type="datetimeFigureOut">
               <a:rPr lang="en-US" smtClean="0"/>
-              <a:t>9/10/23</a:t>
+              <a:t>9/11/23</a:t>
             </a:fld>
             <a:endParaRPr lang="en-US"/>
           </a:p>
@@ -1038,7 +1038,7 @@
           <a:p>
             <a:fld id="{964302DC-9F53-934F-AE4D-0F1F197008C1}" type="datetimeFigureOut">
               <a:rPr lang="en-US" smtClean="0"/>
-              <a:t>9/10/23</a:t>
+              <a:t>9/11/23</a:t>
             </a:fld>
             <a:endParaRPr lang="en-US"/>
           </a:p>
@@ -1208,7 +1208,7 @@
           <a:p>
             <a:fld id="{964302DC-9F53-934F-AE4D-0F1F197008C1}" type="datetimeFigureOut">
               <a:rPr lang="en-US" smtClean="0"/>
-              <a:t>9/10/23</a:t>
+              <a:t>9/11/23</a:t>
             </a:fld>
             <a:endParaRPr lang="en-US"/>
           </a:p>
@@ -1452,7 +1452,7 @@
           <a:p>
             <a:fld id="{964302DC-9F53-934F-AE4D-0F1F197008C1}" type="datetimeFigureOut">
               <a:rPr lang="en-US" smtClean="0"/>
-              <a:t>9/10/23</a:t>
+              <a:t>9/11/23</a:t>
             </a:fld>
             <a:endParaRPr lang="en-US"/>
           </a:p>
@@ -1684,7 +1684,7 @@
           <a:p>
             <a:fld id="{964302DC-9F53-934F-AE4D-0F1F197008C1}" type="datetimeFigureOut">
               <a:rPr lang="en-US" smtClean="0"/>
-              <a:t>9/10/23</a:t>
+              <a:t>9/11/23</a:t>
             </a:fld>
             <a:endParaRPr lang="en-US"/>
           </a:p>
@@ -2051,7 +2051,7 @@
           <a:p>
             <a:fld id="{964302DC-9F53-934F-AE4D-0F1F197008C1}" type="datetimeFigureOut">
               <a:rPr lang="en-US" smtClean="0"/>
-              <a:t>9/10/23</a:t>
+              <a:t>9/11/23</a:t>
             </a:fld>
             <a:endParaRPr lang="en-US"/>
           </a:p>
@@ -2169,7 +2169,7 @@
           <a:p>
             <a:fld id="{964302DC-9F53-934F-AE4D-0F1F197008C1}" type="datetimeFigureOut">
               <a:rPr lang="en-US" smtClean="0"/>
-              <a:t>9/10/23</a:t>
+              <a:t>9/11/23</a:t>
             </a:fld>
             <a:endParaRPr lang="en-US"/>
           </a:p>
@@ -2264,7 +2264,7 @@
           <a:p>
             <a:fld id="{964302DC-9F53-934F-AE4D-0F1F197008C1}" type="datetimeFigureOut">
               <a:rPr lang="en-US" smtClean="0"/>
-              <a:t>9/10/23</a:t>
+              <a:t>9/11/23</a:t>
             </a:fld>
             <a:endParaRPr lang="en-US"/>
           </a:p>
@@ -2541,7 +2541,7 @@
           <a:p>
             <a:fld id="{964302DC-9F53-934F-AE4D-0F1F197008C1}" type="datetimeFigureOut">
               <a:rPr lang="en-US" smtClean="0"/>
-              <a:t>9/10/23</a:t>
+              <a:t>9/11/23</a:t>
             </a:fld>
             <a:endParaRPr lang="en-US"/>
           </a:p>
@@ -2798,7 +2798,7 @@
           <a:p>
             <a:fld id="{964302DC-9F53-934F-AE4D-0F1F197008C1}" type="datetimeFigureOut">
               <a:rPr lang="en-US" smtClean="0"/>
-              <a:t>9/10/23</a:t>
+              <a:t>9/11/23</a:t>
             </a:fld>
             <a:endParaRPr lang="en-US"/>
           </a:p>
@@ -3011,7 +3011,7 @@
           <a:p>
             <a:fld id="{964302DC-9F53-934F-AE4D-0F1F197008C1}" type="datetimeFigureOut">
               <a:rPr lang="en-US" smtClean="0"/>
-              <a:t>9/10/23</a:t>
+              <a:t>9/11/23</a:t>
             </a:fld>
             <a:endParaRPr lang="en-US"/>
           </a:p>
@@ -7319,7 +7319,7 @@
         </p:nvSpPr>
         <p:spPr>
           <a:xfrm>
-            <a:off x="3043740" y="1772966"/>
+            <a:off x="1928450" y="1784247"/>
             <a:ext cx="1851387" cy="1553992"/>
           </a:xfrm>
           <a:prstGeom prst="rect">
@@ -7354,7 +7354,35 @@
             <a:pPr algn="ctr"/>
             <a:r>
               <a:rPr lang="en-US" dirty="0"/>
-              <a:t>2. Instruction 1 is a method call – (a-c) evaluate the arguments, (d) run the method</a:t>
+              <a:t>2. Instruction 1 is a method call –</a:t>
+            </a:r>
+            <a:r>
+              <a:rPr lang="en-US" b="1" dirty="0"/>
+              <a:t>evaluate </a:t>
+            </a:r>
+            <a:r>
+              <a:rPr lang="en-US" dirty="0"/>
+              <a:t>the </a:t>
+            </a:r>
+            <a:r>
+              <a:rPr lang="en-US" b="1" dirty="0"/>
+              <a:t>arguments</a:t>
+            </a:r>
+            <a:r>
+              <a:rPr lang="en-US" dirty="0"/>
+              <a:t>, </a:t>
+            </a:r>
+            <a:r>
+              <a:rPr lang="en-US" b="1" dirty="0"/>
+              <a:t>run </a:t>
+            </a:r>
+            <a:r>
+              <a:rPr lang="en-US" dirty="0"/>
+              <a:t>the </a:t>
+            </a:r>
+            <a:r>
+              <a:rPr lang="en-US" b="1" dirty="0"/>
+              <a:t>method</a:t>
             </a:r>
           </a:p>
         </p:txBody>
@@ -8259,6 +8287,114 @@
           </p:txBody>
         </p:sp>
       </p:grpSp>
+      <p:sp>
+        <p:nvSpPr>
+          <p:cNvPr id="4" name="Rectangle 3">
+            <a:extLst>
+              <a:ext uri="{FF2B5EF4-FFF2-40B4-BE49-F238E27FC236}">
+                <a16:creationId xmlns:a16="http://schemas.microsoft.com/office/drawing/2014/main" id="{7B18924B-6755-0AB4-F1D8-57FA6DAE95EC}"/>
+              </a:ext>
+            </a:extLst>
+          </p:cNvPr>
+          <p:cNvSpPr/>
+          <p:nvPr/>
+        </p:nvSpPr>
+        <p:spPr>
+          <a:xfrm>
+            <a:off x="3940548" y="2483510"/>
+            <a:ext cx="1851387" cy="1553992"/>
+          </a:xfrm>
+          <a:prstGeom prst="rect">
+            <a:avLst/>
+          </a:prstGeom>
+          <a:solidFill>
+            <a:schemeClr val="accent4">
+              <a:lumMod val="60000"/>
+              <a:lumOff val="40000"/>
+            </a:schemeClr>
+          </a:solidFill>
+          <a:effectLst/>
+        </p:spPr>
+        <p:style>
+          <a:lnRef idx="1">
+            <a:schemeClr val="accent4"/>
+          </a:lnRef>
+          <a:fillRef idx="2">
+            <a:schemeClr val="accent4"/>
+          </a:fillRef>
+          <a:effectRef idx="1">
+            <a:schemeClr val="accent4"/>
+          </a:effectRef>
+          <a:fontRef idx="minor">
+            <a:schemeClr val="dk1"/>
+          </a:fontRef>
+        </p:style>
+        <p:txBody>
+          <a:bodyPr rtlCol="0" anchor="ctr"/>
+          <a:lstStyle/>
+          <a:p>
+            <a:pPr algn="ctr"/>
+            <a:r>
+              <a:rPr lang="en-US" dirty="0"/>
+              <a:t>3. We can use 1a to 1c for the instructions to load literals</a:t>
+            </a:r>
+          </a:p>
+        </p:txBody>
+      </p:sp>
+      <p:sp>
+        <p:nvSpPr>
+          <p:cNvPr id="7" name="Rectangle 6">
+            <a:extLst>
+              <a:ext uri="{FF2B5EF4-FFF2-40B4-BE49-F238E27FC236}">
+                <a16:creationId xmlns:a16="http://schemas.microsoft.com/office/drawing/2014/main" id="{53F4643F-D88A-53DB-09EE-F72ACE6FC12D}"/>
+              </a:ext>
+            </a:extLst>
+          </p:cNvPr>
+          <p:cNvSpPr/>
+          <p:nvPr/>
+        </p:nvSpPr>
+        <p:spPr>
+          <a:xfrm>
+            <a:off x="5026448" y="4134874"/>
+            <a:ext cx="1851387" cy="1553992"/>
+          </a:xfrm>
+          <a:prstGeom prst="rect">
+            <a:avLst/>
+          </a:prstGeom>
+          <a:solidFill>
+            <a:schemeClr val="accent4">
+              <a:lumMod val="60000"/>
+              <a:lumOff val="40000"/>
+            </a:schemeClr>
+          </a:solidFill>
+          <a:effectLst/>
+        </p:spPr>
+        <p:style>
+          <a:lnRef idx="1">
+            <a:schemeClr val="accent4"/>
+          </a:lnRef>
+          <a:fillRef idx="2">
+            <a:schemeClr val="accent4"/>
+          </a:fillRef>
+          <a:effectRef idx="1">
+            <a:schemeClr val="accent4"/>
+          </a:effectRef>
+          <a:fontRef idx="minor">
+            <a:schemeClr val="dk1"/>
+          </a:fontRef>
+        </p:style>
+        <p:txBody>
+          <a:bodyPr rtlCol="0" anchor="ctr"/>
+          <a:lstStyle/>
+          <a:p>
+            <a:pPr algn="ctr"/>
+            <a:r>
+              <a:rPr lang="en-US" dirty="0"/>
+              <a:t>4. Then 1d to call the Open Window method</a:t>
+            </a:r>
+          </a:p>
+        </p:txBody>
+      </p:sp>
     </p:spTree>
     <p:extLst>
       <p:ext uri="{BB962C8B-B14F-4D97-AF65-F5344CB8AC3E}">
@@ -9719,7 +9855,7 @@
                   <a:schemeClr val="tx1"/>
                 </a:solidFill>
               </a:rPr>
-              <a:t>1</a:t>
+              <a:t>1a</a:t>
             </a:r>
           </a:p>
         </p:txBody>
@@ -10610,7 +10746,7 @@
             <a:pPr algn="ctr"/>
             <a:r>
               <a:rPr lang="en-US" dirty="0"/>
-              <a:t>3. (a) Load the first argument (literal) into register 0.</a:t>
+              <a:t>5. (a) Load the first argument (literal) into register 0.</a:t>
             </a:r>
           </a:p>
         </p:txBody>
@@ -10706,6 +10842,60 @@
           </a:fontRef>
         </p:style>
       </p:cxnSp>
+      <p:sp>
+        <p:nvSpPr>
+          <p:cNvPr id="6" name="Rectangle 5">
+            <a:extLst>
+              <a:ext uri="{FF2B5EF4-FFF2-40B4-BE49-F238E27FC236}">
+                <a16:creationId xmlns:a16="http://schemas.microsoft.com/office/drawing/2014/main" id="{CB6DA4E4-9454-3AD8-0A73-52E73AF842F8}"/>
+              </a:ext>
+            </a:extLst>
+          </p:cNvPr>
+          <p:cNvSpPr/>
+          <p:nvPr/>
+        </p:nvSpPr>
+        <p:spPr>
+          <a:xfrm>
+            <a:off x="5038794" y="3062667"/>
+            <a:ext cx="1851387" cy="1553992"/>
+          </a:xfrm>
+          <a:prstGeom prst="rect">
+            <a:avLst/>
+          </a:prstGeom>
+          <a:solidFill>
+            <a:schemeClr val="accent4">
+              <a:lumMod val="60000"/>
+              <a:lumOff val="40000"/>
+            </a:schemeClr>
+          </a:solidFill>
+          <a:effectLst/>
+        </p:spPr>
+        <p:style>
+          <a:lnRef idx="1">
+            <a:schemeClr val="accent4"/>
+          </a:lnRef>
+          <a:fillRef idx="2">
+            <a:schemeClr val="accent4"/>
+          </a:fillRef>
+          <a:effectRef idx="1">
+            <a:schemeClr val="accent4"/>
+          </a:effectRef>
+          <a:fontRef idx="minor">
+            <a:schemeClr val="dk1"/>
+          </a:fontRef>
+        </p:style>
+        <p:txBody>
+          <a:bodyPr rtlCol="0" anchor="ctr"/>
+          <a:lstStyle/>
+          <a:p>
+            <a:pPr algn="ctr"/>
+            <a:r>
+              <a:rPr lang="en-US" dirty="0"/>
+              <a:t>6. The program counter will then be incremented to 1b for us</a:t>
+            </a:r>
+          </a:p>
+        </p:txBody>
+      </p:sp>
     </p:spTree>
     <p:extLst>
       <p:ext uri="{BB962C8B-B14F-4D97-AF65-F5344CB8AC3E}">
@@ -13063,7 +13253,7 @@
             <a:pPr algn="ctr"/>
             <a:r>
               <a:rPr lang="en-US" dirty="0"/>
-              <a:t>4. (b) Load the second argument (literal) into register 1.</a:t>
+              <a:t>7. (b) Load the second argument (literal) into register 1.</a:t>
             </a:r>
           </a:p>
         </p:txBody>
@@ -13221,7 +13411,7 @@
         </p:nvSpPr>
         <p:spPr>
           <a:xfrm>
-            <a:off x="1403711" y="3622048"/>
+            <a:off x="1269903" y="3610038"/>
             <a:ext cx="1851387" cy="1553992"/>
           </a:xfrm>
           <a:prstGeom prst="rect">
@@ -13256,7 +13446,7 @@
             <a:pPr algn="ctr"/>
             <a:r>
               <a:rPr lang="en-US" dirty="0"/>
-              <a:t>5. (c) Load the third argument (literal) into register 2.</a:t>
+              <a:t>8. (c) Load the third argument (literal) into register 2.</a:t>
             </a:r>
           </a:p>
         </p:txBody>
@@ -14721,7 +14911,7 @@
                   <a:schemeClr val="tx1"/>
                 </a:solidFill>
               </a:rPr>
-              <a:t>1</a:t>
+              <a:t>1d</a:t>
             </a:r>
           </a:p>
         </p:txBody>
@@ -15718,7 +15908,7 @@
             <a:pPr algn="ctr"/>
             <a:r>
               <a:rPr lang="en-US" dirty="0"/>
-              <a:t>6. (d) Run Open Window</a:t>
+              <a:t>9. (d) Run Open Window</a:t>
             </a:r>
           </a:p>
         </p:txBody>
@@ -15772,7 +15962,7 @@
             <a:pPr algn="ctr"/>
             <a:r>
               <a:rPr lang="en-US" dirty="0"/>
-              <a:t>7. Our program counter is saved to the stack</a:t>
+              <a:t>10. Our program counter is saved to the stack</a:t>
             </a:r>
           </a:p>
         </p:txBody>
@@ -15965,7 +16155,7 @@
                   <a:schemeClr val="tx1"/>
                 </a:solidFill>
               </a:rPr>
-              <a:t>1</a:t>
+              <a:t>1d</a:t>
             </a:r>
           </a:p>
         </p:txBody>
@@ -18435,7 +18625,7 @@
             <a:pPr algn="ctr"/>
             <a:r>
               <a:rPr lang="en-US" dirty="0"/>
-              <a:t>8. Open Window’s first instruction is set as the program counter.</a:t>
+              <a:t>11. Open Window’s first instruction is set as the program counter.</a:t>
             </a:r>
           </a:p>
         </p:txBody>
@@ -18628,7 +18818,7 @@
                   <a:schemeClr val="tx1"/>
                 </a:solidFill>
               </a:rPr>
-              <a:t>1</a:t>
+              <a:t>1d</a:t>
             </a:r>
           </a:p>
         </p:txBody>
@@ -18733,7 +18923,7 @@
             <a:pPr algn="ctr"/>
             <a:r>
               <a:rPr lang="en-US" dirty="0"/>
-              <a:t>9. Open Window’s instructions now run</a:t>
+              <a:t>12. Open Window’s instructions now run</a:t>
             </a:r>
           </a:p>
         </p:txBody>
@@ -18787,7 +18977,7 @@
             <a:pPr algn="ctr"/>
             <a:r>
               <a:rPr lang="en-US" dirty="0"/>
-              <a:t>10. It will access the arguments in registers</a:t>
+              <a:t>13. It will access the arguments in registers</a:t>
             </a:r>
           </a:p>
         </p:txBody>
@@ -20788,7 +20978,7 @@
             <a:pPr algn="ctr"/>
             <a:r>
               <a:rPr lang="en-US" dirty="0"/>
-              <a:t>11. When Open Windows Ends… control returns to our code</a:t>
+              <a:t>14. When Open Windows Ends… control returns to our code</a:t>
             </a:r>
           </a:p>
         </p:txBody>
@@ -20981,7 +21171,7 @@
                   <a:schemeClr val="tx1"/>
                 </a:solidFill>
               </a:rPr>
-              <a:t>1</a:t>
+              <a:t>1d</a:t>
             </a:r>
           </a:p>
         </p:txBody>
@@ -21389,7 +21579,7 @@
             <a:pPr algn="ctr"/>
             <a:r>
               <a:rPr lang="en-US" dirty="0"/>
-              <a:t>12. A new Window will have been opened</a:t>
+              <a:t>15. A new Window will have been opened</a:t>
             </a:r>
           </a:p>
         </p:txBody>
@@ -22457,7 +22647,7 @@
                   <a:schemeClr val="tx1"/>
                 </a:solidFill>
               </a:rPr>
-              <a:t>1</a:t>
+              <a:t>1d</a:t>
             </a:r>
           </a:p>
         </p:txBody>
@@ -23390,7 +23580,7 @@
             <a:pPr algn="ctr"/>
             <a:r>
               <a:rPr lang="en-US" dirty="0"/>
-              <a:t>13. The old program counter is restored from the stack</a:t>
+              <a:t>16. The old program counter is restored from the stack</a:t>
             </a:r>
           </a:p>
         </p:txBody>
@@ -23583,7 +23773,7 @@
                   <a:schemeClr val="tx1"/>
                 </a:solidFill>
               </a:rPr>
-              <a:t>1</a:t>
+              <a:t>1d</a:t>
             </a:r>
           </a:p>
         </p:txBody>
@@ -26270,7 +26460,7 @@
             <a:pPr algn="ctr"/>
             <a:r>
               <a:rPr lang="en-US" dirty="0"/>
-              <a:t>14. The method call ends – so line 1 is complete</a:t>
+              <a:t>17. The method call ends – so line 1 is complete</a:t>
             </a:r>
           </a:p>
         </p:txBody>
@@ -26324,7 +26514,7 @@
             <a:pPr algn="ctr"/>
             <a:r>
               <a:rPr lang="en-US" dirty="0"/>
-              <a:t>15. The program counter increments (sequence)</a:t>
+              <a:t>18. The program counter increments (sequence)</a:t>
             </a:r>
           </a:p>
         </p:txBody>
@@ -26378,7 +26568,7 @@
             <a:pPr algn="ctr"/>
             <a:r>
               <a:rPr lang="en-US" dirty="0"/>
-              <a:t>16. This keeps running…</a:t>
+              <a:t>19. This keeps running…</a:t>
             </a:r>
           </a:p>
         </p:txBody>

</xml_diff>

<commit_message>
Edit P0C1 Method Call concept.
</commit_message>
<xml_diff>
--- a/resources/ppt-slides/sequence-data-method-call.pptx
+++ b/resources/ppt-slides/sequence-data-method-call.pptx
@@ -6,14 +6,13 @@
   </p:sldMasterIdLst>
   <p:sldIdLst>
     <p:sldId id="288" r:id="rId2"/>
-    <p:sldId id="311" r:id="rId3"/>
-    <p:sldId id="310" r:id="rId4"/>
-    <p:sldId id="312" r:id="rId5"/>
-    <p:sldId id="313" r:id="rId6"/>
-    <p:sldId id="314" r:id="rId7"/>
-    <p:sldId id="316" r:id="rId8"/>
-    <p:sldId id="317" r:id="rId9"/>
-    <p:sldId id="318" r:id="rId10"/>
+    <p:sldId id="310" r:id="rId3"/>
+    <p:sldId id="312" r:id="rId4"/>
+    <p:sldId id="313" r:id="rId5"/>
+    <p:sldId id="314" r:id="rId6"/>
+    <p:sldId id="316" r:id="rId7"/>
+    <p:sldId id="317" r:id="rId8"/>
+    <p:sldId id="318" r:id="rId9"/>
   </p:sldIdLst>
   <p:sldSz cx="7559675" cy="5040313"/>
   <p:notesSz cx="6858000" cy="9144000"/>
@@ -251,7 +250,7 @@
           <a:p>
             <a:fld id="{964302DC-9F53-934F-AE4D-0F1F197008C1}" type="datetimeFigureOut">
               <a:rPr lang="en-US" smtClean="0"/>
-              <a:t>11/27/23</a:t>
+              <a:t>1/3/24</a:t>
             </a:fld>
             <a:endParaRPr lang="en-US"/>
           </a:p>
@@ -421,7 +420,7 @@
           <a:p>
             <a:fld id="{964302DC-9F53-934F-AE4D-0F1F197008C1}" type="datetimeFigureOut">
               <a:rPr lang="en-US" smtClean="0"/>
-              <a:t>11/27/23</a:t>
+              <a:t>1/3/24</a:t>
             </a:fld>
             <a:endParaRPr lang="en-US"/>
           </a:p>
@@ -601,7 +600,7 @@
           <a:p>
             <a:fld id="{964302DC-9F53-934F-AE4D-0F1F197008C1}" type="datetimeFigureOut">
               <a:rPr lang="en-US" smtClean="0"/>
-              <a:t>11/27/23</a:t>
+              <a:t>1/3/24</a:t>
             </a:fld>
             <a:endParaRPr lang="en-US"/>
           </a:p>
@@ -771,7 +770,7 @@
           <a:p>
             <a:fld id="{964302DC-9F53-934F-AE4D-0F1F197008C1}" type="datetimeFigureOut">
               <a:rPr lang="en-US" smtClean="0"/>
-              <a:t>11/27/23</a:t>
+              <a:t>1/3/24</a:t>
             </a:fld>
             <a:endParaRPr lang="en-US"/>
           </a:p>
@@ -1015,7 +1014,7 @@
           <a:p>
             <a:fld id="{964302DC-9F53-934F-AE4D-0F1F197008C1}" type="datetimeFigureOut">
               <a:rPr lang="en-US" smtClean="0"/>
-              <a:t>11/27/23</a:t>
+              <a:t>1/3/24</a:t>
             </a:fld>
             <a:endParaRPr lang="en-US"/>
           </a:p>
@@ -1247,7 +1246,7 @@
           <a:p>
             <a:fld id="{964302DC-9F53-934F-AE4D-0F1F197008C1}" type="datetimeFigureOut">
               <a:rPr lang="en-US" smtClean="0"/>
-              <a:t>11/27/23</a:t>
+              <a:t>1/3/24</a:t>
             </a:fld>
             <a:endParaRPr lang="en-US"/>
           </a:p>
@@ -1614,7 +1613,7 @@
           <a:p>
             <a:fld id="{964302DC-9F53-934F-AE4D-0F1F197008C1}" type="datetimeFigureOut">
               <a:rPr lang="en-US" smtClean="0"/>
-              <a:t>11/27/23</a:t>
+              <a:t>1/3/24</a:t>
             </a:fld>
             <a:endParaRPr lang="en-US"/>
           </a:p>
@@ -1732,7 +1731,7 @@
           <a:p>
             <a:fld id="{964302DC-9F53-934F-AE4D-0F1F197008C1}" type="datetimeFigureOut">
               <a:rPr lang="en-US" smtClean="0"/>
-              <a:t>11/27/23</a:t>
+              <a:t>1/3/24</a:t>
             </a:fld>
             <a:endParaRPr lang="en-US"/>
           </a:p>
@@ -1827,7 +1826,7 @@
           <a:p>
             <a:fld id="{964302DC-9F53-934F-AE4D-0F1F197008C1}" type="datetimeFigureOut">
               <a:rPr lang="en-US" smtClean="0"/>
-              <a:t>11/27/23</a:t>
+              <a:t>1/3/24</a:t>
             </a:fld>
             <a:endParaRPr lang="en-US"/>
           </a:p>
@@ -2104,7 +2103,7 @@
           <a:p>
             <a:fld id="{964302DC-9F53-934F-AE4D-0F1F197008C1}" type="datetimeFigureOut">
               <a:rPr lang="en-US" smtClean="0"/>
-              <a:t>11/27/23</a:t>
+              <a:t>1/3/24</a:t>
             </a:fld>
             <a:endParaRPr lang="en-US"/>
           </a:p>
@@ -2361,7 +2360,7 @@
           <a:p>
             <a:fld id="{964302DC-9F53-934F-AE4D-0F1F197008C1}" type="datetimeFigureOut">
               <a:rPr lang="en-US" smtClean="0"/>
-              <a:t>11/27/23</a:t>
+              <a:t>1/3/24</a:t>
             </a:fld>
             <a:endParaRPr lang="en-US"/>
           </a:p>
@@ -2574,7 +2573,7 @@
           <a:p>
             <a:fld id="{964302DC-9F53-934F-AE4D-0F1F197008C1}" type="datetimeFigureOut">
               <a:rPr lang="en-US" smtClean="0"/>
-              <a:t>11/27/23</a:t>
+              <a:t>1/3/24</a:t>
             </a:fld>
             <a:endParaRPr lang="en-US"/>
           </a:p>
@@ -4858,2922 +4857,6 @@
           </a:fontRef>
         </p:style>
       </p:cxnSp>
-      <p:sp>
-        <p:nvSpPr>
-          <p:cNvPr id="19" name="TextBox 18">
-            <a:extLst>
-              <a:ext uri="{FF2B5EF4-FFF2-40B4-BE49-F238E27FC236}">
-                <a16:creationId xmlns:a16="http://schemas.microsoft.com/office/drawing/2014/main" id="{E1906366-7521-EF04-8057-97DA7615E630}"/>
-              </a:ext>
-            </a:extLst>
-          </p:cNvPr>
-          <p:cNvSpPr txBox="1"/>
-          <p:nvPr/>
-        </p:nvSpPr>
-        <p:spPr>
-          <a:xfrm>
-            <a:off x="161403" y="220542"/>
-            <a:ext cx="4829319" cy="369332"/>
-          </a:xfrm>
-          <a:prstGeom prst="rect">
-            <a:avLst/>
-          </a:prstGeom>
-          <a:noFill/>
-        </p:spPr>
-        <p:txBody>
-          <a:bodyPr wrap="square">
-            <a:spAutoFit/>
-          </a:bodyPr>
-          <a:lstStyle/>
-          <a:p>
-            <a:r>
-              <a:rPr lang="en-US" dirty="0">
-                <a:latin typeface="Gaegu" pitchFamily="2" charset="0"/>
-              </a:rPr>
-              <a:t>Sequence in Method Call</a:t>
-            </a:r>
-            <a:endParaRPr lang="en-US" b="1" dirty="0"/>
-          </a:p>
-        </p:txBody>
-      </p:sp>
-      <p:grpSp>
-        <p:nvGrpSpPr>
-          <p:cNvPr id="20" name="Group 19">
-            <a:extLst>
-              <a:ext uri="{FF2B5EF4-FFF2-40B4-BE49-F238E27FC236}">
-                <a16:creationId xmlns:a16="http://schemas.microsoft.com/office/drawing/2014/main" id="{E455D9A8-3204-B627-DE0B-D2C6BFB8B30C}"/>
-              </a:ext>
-            </a:extLst>
-          </p:cNvPr>
-          <p:cNvGrpSpPr/>
-          <p:nvPr/>
-        </p:nvGrpSpPr>
-        <p:grpSpPr>
-          <a:xfrm>
-            <a:off x="950351" y="3857168"/>
-            <a:ext cx="2228278" cy="267657"/>
-            <a:chOff x="-582691" y="3934868"/>
-            <a:chExt cx="2598434" cy="348218"/>
-          </a:xfrm>
-        </p:grpSpPr>
-        <p:sp>
-          <p:nvSpPr>
-            <p:cNvPr id="22" name="TextBox 21">
-              <a:extLst>
-                <a:ext uri="{FF2B5EF4-FFF2-40B4-BE49-F238E27FC236}">
-                  <a16:creationId xmlns:a16="http://schemas.microsoft.com/office/drawing/2014/main" id="{C9346A69-3996-1923-23E3-651C146B7864}"/>
-                </a:ext>
-              </a:extLst>
-            </p:cNvPr>
-            <p:cNvSpPr txBox="1"/>
-            <p:nvPr/>
-          </p:nvSpPr>
-          <p:spPr>
-            <a:xfrm>
-              <a:off x="-582691" y="3934868"/>
-              <a:ext cx="939681" cy="307776"/>
-            </a:xfrm>
-            <a:prstGeom prst="rect">
-              <a:avLst/>
-            </a:prstGeom>
-            <a:noFill/>
-          </p:spPr>
-          <p:txBody>
-            <a:bodyPr wrap="none" rtlCol="0">
-              <a:spAutoFit/>
-            </a:bodyPr>
-            <a:lstStyle/>
-            <a:p>
-              <a:pPr algn="ctr"/>
-              <a:r>
-                <a:rPr lang="en-US" sz="1400" dirty="0"/>
-                <a:t>Register 0</a:t>
-              </a:r>
-            </a:p>
-          </p:txBody>
-        </p:sp>
-        <p:sp>
-          <p:nvSpPr>
-            <p:cNvPr id="23" name="Rectangle 22">
-              <a:extLst>
-                <a:ext uri="{FF2B5EF4-FFF2-40B4-BE49-F238E27FC236}">
-                  <a16:creationId xmlns:a16="http://schemas.microsoft.com/office/drawing/2014/main" id="{A7C133B4-3BE8-198A-E81A-294A1D98523E}"/>
-                </a:ext>
-              </a:extLst>
-            </p:cNvPr>
-            <p:cNvSpPr/>
-            <p:nvPr/>
-          </p:nvSpPr>
-          <p:spPr>
-            <a:xfrm>
-              <a:off x="418342" y="3975309"/>
-              <a:ext cx="1597401" cy="307777"/>
-            </a:xfrm>
-            <a:custGeom>
-              <a:avLst/>
-              <a:gdLst>
-                <a:gd name="connsiteX0" fmla="*/ 0 w 1597401"/>
-                <a:gd name="connsiteY0" fmla="*/ 0 h 307777"/>
-                <a:gd name="connsiteX1" fmla="*/ 516493 w 1597401"/>
-                <a:gd name="connsiteY1" fmla="*/ 0 h 307777"/>
-                <a:gd name="connsiteX2" fmla="*/ 1001038 w 1597401"/>
-                <a:gd name="connsiteY2" fmla="*/ 0 h 307777"/>
-                <a:gd name="connsiteX3" fmla="*/ 1597401 w 1597401"/>
-                <a:gd name="connsiteY3" fmla="*/ 0 h 307777"/>
-                <a:gd name="connsiteX4" fmla="*/ 1597401 w 1597401"/>
-                <a:gd name="connsiteY4" fmla="*/ 307777 h 307777"/>
-                <a:gd name="connsiteX5" fmla="*/ 1096882 w 1597401"/>
-                <a:gd name="connsiteY5" fmla="*/ 307777 h 307777"/>
-                <a:gd name="connsiteX6" fmla="*/ 532467 w 1597401"/>
-                <a:gd name="connsiteY6" fmla="*/ 307777 h 307777"/>
-                <a:gd name="connsiteX7" fmla="*/ 0 w 1597401"/>
-                <a:gd name="connsiteY7" fmla="*/ 307777 h 307777"/>
-                <a:gd name="connsiteX8" fmla="*/ 0 w 1597401"/>
-                <a:gd name="connsiteY8" fmla="*/ 0 h 307777"/>
-              </a:gdLst>
-              <a:ahLst/>
-              <a:cxnLst>
-                <a:cxn ang="0">
-                  <a:pos x="connsiteX0" y="connsiteY0"/>
-                </a:cxn>
-                <a:cxn ang="0">
-                  <a:pos x="connsiteX1" y="connsiteY1"/>
-                </a:cxn>
-                <a:cxn ang="0">
-                  <a:pos x="connsiteX2" y="connsiteY2"/>
-                </a:cxn>
-                <a:cxn ang="0">
-                  <a:pos x="connsiteX3" y="connsiteY3"/>
-                </a:cxn>
-                <a:cxn ang="0">
-                  <a:pos x="connsiteX4" y="connsiteY4"/>
-                </a:cxn>
-                <a:cxn ang="0">
-                  <a:pos x="connsiteX5" y="connsiteY5"/>
-                </a:cxn>
-                <a:cxn ang="0">
-                  <a:pos x="connsiteX6" y="connsiteY6"/>
-                </a:cxn>
-                <a:cxn ang="0">
-                  <a:pos x="connsiteX7" y="connsiteY7"/>
-                </a:cxn>
-                <a:cxn ang="0">
-                  <a:pos x="connsiteX8" y="connsiteY8"/>
-                </a:cxn>
-              </a:cxnLst>
-              <a:rect l="l" t="t" r="r" b="b"/>
-              <a:pathLst>
-                <a:path w="1597401" h="307777" extrusionOk="0">
-                  <a:moveTo>
-                    <a:pt x="0" y="0"/>
-                  </a:moveTo>
-                  <a:cubicBezTo>
-                    <a:pt x="203401" y="20605"/>
-                    <a:pt x="317947" y="-12274"/>
-                    <a:pt x="516493" y="0"/>
-                  </a:cubicBezTo>
-                  <a:cubicBezTo>
-                    <a:pt x="715039" y="12274"/>
-                    <a:pt x="841383" y="-17816"/>
-                    <a:pt x="1001038" y="0"/>
-                  </a:cubicBezTo>
-                  <a:cubicBezTo>
-                    <a:pt x="1160693" y="17816"/>
-                    <a:pt x="1440425" y="14953"/>
-                    <a:pt x="1597401" y="0"/>
-                  </a:cubicBezTo>
-                  <a:cubicBezTo>
-                    <a:pt x="1602839" y="133970"/>
-                    <a:pt x="1593244" y="197125"/>
-                    <a:pt x="1597401" y="307777"/>
-                  </a:cubicBezTo>
-                  <a:cubicBezTo>
-                    <a:pt x="1471210" y="325796"/>
-                    <a:pt x="1246974" y="315025"/>
-                    <a:pt x="1096882" y="307777"/>
-                  </a:cubicBezTo>
-                  <a:cubicBezTo>
-                    <a:pt x="946790" y="300529"/>
-                    <a:pt x="803485" y="322780"/>
-                    <a:pt x="532467" y="307777"/>
-                  </a:cubicBezTo>
-                  <a:cubicBezTo>
-                    <a:pt x="261449" y="292774"/>
-                    <a:pt x="207679" y="323972"/>
-                    <a:pt x="0" y="307777"/>
-                  </a:cubicBezTo>
-                  <a:cubicBezTo>
-                    <a:pt x="-6096" y="178844"/>
-                    <a:pt x="1978" y="79401"/>
-                    <a:pt x="0" y="0"/>
-                  </a:cubicBezTo>
-                  <a:close/>
-                </a:path>
-              </a:pathLst>
-            </a:custGeom>
-            <a:noFill/>
-            <a:ln w="25400">
-              <a:solidFill>
-                <a:schemeClr val="tx1"/>
-              </a:solidFill>
-              <a:extLst>
-                <a:ext uri="{C807C97D-BFC1-408E-A445-0C87EB9F89A2}">
-                  <ask:lineSketchStyleProps xmlns:ask="http://schemas.microsoft.com/office/drawing/2018/sketchyshapes" sd="1219033472">
-                    <a:prstGeom prst="rect">
-                      <a:avLst/>
-                    </a:prstGeom>
-                    <ask:type>
-                      <ask:lineSketchFreehand/>
-                    </ask:type>
-                  </ask:lineSketchStyleProps>
-                </a:ext>
-              </a:extLst>
-            </a:ln>
-          </p:spPr>
-          <p:style>
-            <a:lnRef idx="2">
-              <a:schemeClr val="accent1">
-                <a:shade val="15000"/>
-              </a:schemeClr>
-            </a:lnRef>
-            <a:fillRef idx="1">
-              <a:schemeClr val="accent1"/>
-            </a:fillRef>
-            <a:effectRef idx="0">
-              <a:schemeClr val="accent1"/>
-            </a:effectRef>
-            <a:fontRef idx="minor">
-              <a:schemeClr val="lt1"/>
-            </a:fontRef>
-          </p:style>
-          <p:txBody>
-            <a:bodyPr rtlCol="0" anchor="ctr"/>
-            <a:lstStyle/>
-            <a:p>
-              <a:pPr algn="ctr"/>
-              <a:endParaRPr lang="en-US">
-                <a:solidFill>
-                  <a:schemeClr val="tx1"/>
-                </a:solidFill>
-              </a:endParaRPr>
-            </a:p>
-          </p:txBody>
-        </p:sp>
-      </p:grpSp>
-      <p:sp>
-        <p:nvSpPr>
-          <p:cNvPr id="34" name="TextBox 33">
-            <a:extLst>
-              <a:ext uri="{FF2B5EF4-FFF2-40B4-BE49-F238E27FC236}">
-                <a16:creationId xmlns:a16="http://schemas.microsoft.com/office/drawing/2014/main" id="{4C1AF8FD-7642-5A76-3152-8CF2C88424A2}"/>
-              </a:ext>
-            </a:extLst>
-          </p:cNvPr>
-          <p:cNvSpPr txBox="1"/>
-          <p:nvPr/>
-        </p:nvSpPr>
-        <p:spPr>
-          <a:xfrm>
-            <a:off x="908480" y="4167485"/>
-            <a:ext cx="906980" cy="307777"/>
-          </a:xfrm>
-          <a:prstGeom prst="rect">
-            <a:avLst/>
-          </a:prstGeom>
-          <a:noFill/>
-        </p:spPr>
-        <p:txBody>
-          <a:bodyPr wrap="none" rtlCol="0">
-            <a:spAutoFit/>
-          </a:bodyPr>
-          <a:lstStyle/>
-          <a:p>
-            <a:pPr algn="ctr"/>
-            <a:r>
-              <a:rPr lang="en-US" sz="1400" dirty="0"/>
-              <a:t>Register 1</a:t>
-            </a:r>
-          </a:p>
-        </p:txBody>
-      </p:sp>
-      <p:sp>
-        <p:nvSpPr>
-          <p:cNvPr id="39" name="Rectangle 38">
-            <a:extLst>
-              <a:ext uri="{FF2B5EF4-FFF2-40B4-BE49-F238E27FC236}">
-                <a16:creationId xmlns:a16="http://schemas.microsoft.com/office/drawing/2014/main" id="{04FA2795-BD9C-1494-DAB7-AC54316A7BEE}"/>
-              </a:ext>
-            </a:extLst>
-          </p:cNvPr>
-          <p:cNvSpPr/>
-          <p:nvPr/>
-        </p:nvSpPr>
-        <p:spPr>
-          <a:xfrm>
-            <a:off x="1808784" y="4207279"/>
-            <a:ext cx="1369845" cy="236572"/>
-          </a:xfrm>
-          <a:custGeom>
-            <a:avLst/>
-            <a:gdLst>
-              <a:gd name="connsiteX0" fmla="*/ 0 w 1369845"/>
-              <a:gd name="connsiteY0" fmla="*/ 0 h 236572"/>
-              <a:gd name="connsiteX1" fmla="*/ 671224 w 1369845"/>
-              <a:gd name="connsiteY1" fmla="*/ 0 h 236572"/>
-              <a:gd name="connsiteX2" fmla="*/ 1369845 w 1369845"/>
-              <a:gd name="connsiteY2" fmla="*/ 0 h 236572"/>
-              <a:gd name="connsiteX3" fmla="*/ 1369845 w 1369845"/>
-              <a:gd name="connsiteY3" fmla="*/ 236572 h 236572"/>
-              <a:gd name="connsiteX4" fmla="*/ 684923 w 1369845"/>
-              <a:gd name="connsiteY4" fmla="*/ 236572 h 236572"/>
-              <a:gd name="connsiteX5" fmla="*/ 0 w 1369845"/>
-              <a:gd name="connsiteY5" fmla="*/ 236572 h 236572"/>
-              <a:gd name="connsiteX6" fmla="*/ 0 w 1369845"/>
-              <a:gd name="connsiteY6" fmla="*/ 0 h 236572"/>
-            </a:gdLst>
-            <a:ahLst/>
-            <a:cxnLst>
-              <a:cxn ang="0">
-                <a:pos x="connsiteX0" y="connsiteY0"/>
-              </a:cxn>
-              <a:cxn ang="0">
-                <a:pos x="connsiteX1" y="connsiteY1"/>
-              </a:cxn>
-              <a:cxn ang="0">
-                <a:pos x="connsiteX2" y="connsiteY2"/>
-              </a:cxn>
-              <a:cxn ang="0">
-                <a:pos x="connsiteX3" y="connsiteY3"/>
-              </a:cxn>
-              <a:cxn ang="0">
-                <a:pos x="connsiteX4" y="connsiteY4"/>
-              </a:cxn>
-              <a:cxn ang="0">
-                <a:pos x="connsiteX5" y="connsiteY5"/>
-              </a:cxn>
-              <a:cxn ang="0">
-                <a:pos x="connsiteX6" y="connsiteY6"/>
-              </a:cxn>
-            </a:cxnLst>
-            <a:rect l="l" t="t" r="r" b="b"/>
-            <a:pathLst>
-              <a:path w="1369845" h="236572" extrusionOk="0">
-                <a:moveTo>
-                  <a:pt x="0" y="0"/>
-                </a:moveTo>
-                <a:cubicBezTo>
-                  <a:pt x="205523" y="-5091"/>
-                  <a:pt x="486769" y="-129"/>
-                  <a:pt x="671224" y="0"/>
-                </a:cubicBezTo>
-                <a:cubicBezTo>
-                  <a:pt x="855679" y="129"/>
-                  <a:pt x="1066832" y="-23656"/>
-                  <a:pt x="1369845" y="0"/>
-                </a:cubicBezTo>
-                <a:cubicBezTo>
-                  <a:pt x="1371396" y="96650"/>
-                  <a:pt x="1359512" y="144096"/>
-                  <a:pt x="1369845" y="236572"/>
-                </a:cubicBezTo>
-                <a:cubicBezTo>
-                  <a:pt x="1038193" y="248984"/>
-                  <a:pt x="854998" y="210473"/>
-                  <a:pt x="684923" y="236572"/>
-                </a:cubicBezTo>
-                <a:cubicBezTo>
-                  <a:pt x="514848" y="262671"/>
-                  <a:pt x="230912" y="258978"/>
-                  <a:pt x="0" y="236572"/>
-                </a:cubicBezTo>
-                <a:cubicBezTo>
-                  <a:pt x="-3484" y="167207"/>
-                  <a:pt x="6312" y="104471"/>
-                  <a:pt x="0" y="0"/>
-                </a:cubicBezTo>
-                <a:close/>
-              </a:path>
-            </a:pathLst>
-          </a:custGeom>
-          <a:noFill/>
-          <a:ln w="25400">
-            <a:solidFill>
-              <a:schemeClr val="tx1"/>
-            </a:solidFill>
-            <a:extLst>
-              <a:ext uri="{C807C97D-BFC1-408E-A445-0C87EB9F89A2}">
-                <ask:lineSketchStyleProps xmlns:ask="http://schemas.microsoft.com/office/drawing/2018/sketchyshapes" sd="1219033472">
-                  <a:prstGeom prst="rect">
-                    <a:avLst/>
-                  </a:prstGeom>
-                  <ask:type>
-                    <ask:lineSketchFreehand/>
-                  </ask:type>
-                </ask:lineSketchStyleProps>
-              </a:ext>
-            </a:extLst>
-          </a:ln>
-        </p:spPr>
-        <p:style>
-          <a:lnRef idx="2">
-            <a:schemeClr val="accent1">
-              <a:shade val="15000"/>
-            </a:schemeClr>
-          </a:lnRef>
-          <a:fillRef idx="1">
-            <a:schemeClr val="accent1"/>
-          </a:fillRef>
-          <a:effectRef idx="0">
-            <a:schemeClr val="accent1"/>
-          </a:effectRef>
-          <a:fontRef idx="minor">
-            <a:schemeClr val="lt1"/>
-          </a:fontRef>
-        </p:style>
-        <p:txBody>
-          <a:bodyPr rtlCol="0" anchor="ctr"/>
-          <a:lstStyle/>
-          <a:p>
-            <a:pPr algn="ctr"/>
-            <a:endParaRPr lang="en-US">
-              <a:solidFill>
-                <a:schemeClr val="tx1"/>
-              </a:solidFill>
-            </a:endParaRPr>
-          </a:p>
-        </p:txBody>
-      </p:sp>
-      <p:sp>
-        <p:nvSpPr>
-          <p:cNvPr id="40" name="TextBox 39">
-            <a:extLst>
-              <a:ext uri="{FF2B5EF4-FFF2-40B4-BE49-F238E27FC236}">
-                <a16:creationId xmlns:a16="http://schemas.microsoft.com/office/drawing/2014/main" id="{8E9C976D-3343-C270-3EC9-C6CA862D3D8A}"/>
-              </a:ext>
-            </a:extLst>
-          </p:cNvPr>
-          <p:cNvSpPr txBox="1"/>
-          <p:nvPr/>
-        </p:nvSpPr>
-        <p:spPr>
-          <a:xfrm>
-            <a:off x="905129" y="4497119"/>
-            <a:ext cx="906980" cy="307777"/>
-          </a:xfrm>
-          <a:prstGeom prst="rect">
-            <a:avLst/>
-          </a:prstGeom>
-          <a:noFill/>
-        </p:spPr>
-        <p:txBody>
-          <a:bodyPr wrap="none" rtlCol="0">
-            <a:spAutoFit/>
-          </a:bodyPr>
-          <a:lstStyle/>
-          <a:p>
-            <a:pPr algn="ctr"/>
-            <a:r>
-              <a:rPr lang="en-US" sz="1400" dirty="0"/>
-              <a:t>Register 2</a:t>
-            </a:r>
-          </a:p>
-        </p:txBody>
-      </p:sp>
-      <p:sp>
-        <p:nvSpPr>
-          <p:cNvPr id="43" name="Rectangle 42">
-            <a:extLst>
-              <a:ext uri="{FF2B5EF4-FFF2-40B4-BE49-F238E27FC236}">
-                <a16:creationId xmlns:a16="http://schemas.microsoft.com/office/drawing/2014/main" id="{E3B27956-81C9-F558-F89F-C05474D68F24}"/>
-              </a:ext>
-            </a:extLst>
-          </p:cNvPr>
-          <p:cNvSpPr/>
-          <p:nvPr/>
-        </p:nvSpPr>
-        <p:spPr>
-          <a:xfrm>
-            <a:off x="1796724" y="4528204"/>
-            <a:ext cx="1369845" cy="236572"/>
-          </a:xfrm>
-          <a:custGeom>
-            <a:avLst/>
-            <a:gdLst>
-              <a:gd name="connsiteX0" fmla="*/ 0 w 1369845"/>
-              <a:gd name="connsiteY0" fmla="*/ 0 h 236572"/>
-              <a:gd name="connsiteX1" fmla="*/ 671224 w 1369845"/>
-              <a:gd name="connsiteY1" fmla="*/ 0 h 236572"/>
-              <a:gd name="connsiteX2" fmla="*/ 1369845 w 1369845"/>
-              <a:gd name="connsiteY2" fmla="*/ 0 h 236572"/>
-              <a:gd name="connsiteX3" fmla="*/ 1369845 w 1369845"/>
-              <a:gd name="connsiteY3" fmla="*/ 236572 h 236572"/>
-              <a:gd name="connsiteX4" fmla="*/ 684923 w 1369845"/>
-              <a:gd name="connsiteY4" fmla="*/ 236572 h 236572"/>
-              <a:gd name="connsiteX5" fmla="*/ 0 w 1369845"/>
-              <a:gd name="connsiteY5" fmla="*/ 236572 h 236572"/>
-              <a:gd name="connsiteX6" fmla="*/ 0 w 1369845"/>
-              <a:gd name="connsiteY6" fmla="*/ 0 h 236572"/>
-            </a:gdLst>
-            <a:ahLst/>
-            <a:cxnLst>
-              <a:cxn ang="0">
-                <a:pos x="connsiteX0" y="connsiteY0"/>
-              </a:cxn>
-              <a:cxn ang="0">
-                <a:pos x="connsiteX1" y="connsiteY1"/>
-              </a:cxn>
-              <a:cxn ang="0">
-                <a:pos x="connsiteX2" y="connsiteY2"/>
-              </a:cxn>
-              <a:cxn ang="0">
-                <a:pos x="connsiteX3" y="connsiteY3"/>
-              </a:cxn>
-              <a:cxn ang="0">
-                <a:pos x="connsiteX4" y="connsiteY4"/>
-              </a:cxn>
-              <a:cxn ang="0">
-                <a:pos x="connsiteX5" y="connsiteY5"/>
-              </a:cxn>
-              <a:cxn ang="0">
-                <a:pos x="connsiteX6" y="connsiteY6"/>
-              </a:cxn>
-            </a:cxnLst>
-            <a:rect l="l" t="t" r="r" b="b"/>
-            <a:pathLst>
-              <a:path w="1369845" h="236572" extrusionOk="0">
-                <a:moveTo>
-                  <a:pt x="0" y="0"/>
-                </a:moveTo>
-                <a:cubicBezTo>
-                  <a:pt x="205523" y="-5091"/>
-                  <a:pt x="486769" y="-129"/>
-                  <a:pt x="671224" y="0"/>
-                </a:cubicBezTo>
-                <a:cubicBezTo>
-                  <a:pt x="855679" y="129"/>
-                  <a:pt x="1066832" y="-23656"/>
-                  <a:pt x="1369845" y="0"/>
-                </a:cubicBezTo>
-                <a:cubicBezTo>
-                  <a:pt x="1371396" y="96650"/>
-                  <a:pt x="1359512" y="144096"/>
-                  <a:pt x="1369845" y="236572"/>
-                </a:cubicBezTo>
-                <a:cubicBezTo>
-                  <a:pt x="1038193" y="248984"/>
-                  <a:pt x="854998" y="210473"/>
-                  <a:pt x="684923" y="236572"/>
-                </a:cubicBezTo>
-                <a:cubicBezTo>
-                  <a:pt x="514848" y="262671"/>
-                  <a:pt x="230912" y="258978"/>
-                  <a:pt x="0" y="236572"/>
-                </a:cubicBezTo>
-                <a:cubicBezTo>
-                  <a:pt x="-3484" y="167207"/>
-                  <a:pt x="6312" y="104471"/>
-                  <a:pt x="0" y="0"/>
-                </a:cubicBezTo>
-                <a:close/>
-              </a:path>
-            </a:pathLst>
-          </a:custGeom>
-          <a:noFill/>
-          <a:ln w="25400">
-            <a:solidFill>
-              <a:schemeClr val="tx1"/>
-            </a:solidFill>
-            <a:extLst>
-              <a:ext uri="{C807C97D-BFC1-408E-A445-0C87EB9F89A2}">
-                <ask:lineSketchStyleProps xmlns:ask="http://schemas.microsoft.com/office/drawing/2018/sketchyshapes" sd="1219033472">
-                  <a:prstGeom prst="rect">
-                    <a:avLst/>
-                  </a:prstGeom>
-                  <ask:type>
-                    <ask:lineSketchFreehand/>
-                  </ask:type>
-                </ask:lineSketchStyleProps>
-              </a:ext>
-            </a:extLst>
-          </a:ln>
-        </p:spPr>
-        <p:style>
-          <a:lnRef idx="2">
-            <a:schemeClr val="accent1">
-              <a:shade val="15000"/>
-            </a:schemeClr>
-          </a:lnRef>
-          <a:fillRef idx="1">
-            <a:schemeClr val="accent1"/>
-          </a:fillRef>
-          <a:effectRef idx="0">
-            <a:schemeClr val="accent1"/>
-          </a:effectRef>
-          <a:fontRef idx="minor">
-            <a:schemeClr val="lt1"/>
-          </a:fontRef>
-        </p:style>
-        <p:txBody>
-          <a:bodyPr rtlCol="0" anchor="ctr"/>
-          <a:lstStyle/>
-          <a:p>
-            <a:pPr algn="ctr"/>
-            <a:endParaRPr lang="en-US">
-              <a:solidFill>
-                <a:schemeClr val="tx1"/>
-              </a:solidFill>
-            </a:endParaRPr>
-          </a:p>
-        </p:txBody>
-      </p:sp>
-      <p:sp>
-        <p:nvSpPr>
-          <p:cNvPr id="46" name="TextBox 45">
-            <a:extLst>
-              <a:ext uri="{FF2B5EF4-FFF2-40B4-BE49-F238E27FC236}">
-                <a16:creationId xmlns:a16="http://schemas.microsoft.com/office/drawing/2014/main" id="{FF9BBA8D-DF7F-CCA2-3C98-1382F147BA1F}"/>
-              </a:ext>
-            </a:extLst>
-          </p:cNvPr>
-          <p:cNvSpPr txBox="1"/>
-          <p:nvPr/>
-        </p:nvSpPr>
-        <p:spPr>
-          <a:xfrm>
-            <a:off x="2255764" y="788966"/>
-            <a:ext cx="4658837" cy="1077218"/>
-          </a:xfrm>
-          <a:prstGeom prst="rect">
-            <a:avLst/>
-          </a:prstGeom>
-          <a:noFill/>
-        </p:spPr>
-        <p:txBody>
-          <a:bodyPr wrap="square">
-            <a:spAutoFit/>
-          </a:bodyPr>
-          <a:lstStyle/>
-          <a:p>
-            <a:pPr marL="342900" indent="-342900">
-              <a:buFont typeface="+mj-lt"/>
-              <a:buAutoNum type="arabicPeriod"/>
-            </a:pPr>
-            <a:r>
-              <a:rPr lang="en-US" sz="1600" dirty="0" err="1"/>
-              <a:t>OpenWindow</a:t>
-            </a:r>
-            <a:r>
-              <a:rPr lang="en-US" sz="1600" dirty="0"/>
-              <a:t>("Random Color", 800, 600);</a:t>
-            </a:r>
-          </a:p>
-          <a:p>
-            <a:pPr marL="342900" indent="-342900">
-              <a:buFont typeface="+mj-lt"/>
-              <a:buAutoNum type="arabicPeriod"/>
-            </a:pPr>
-            <a:r>
-              <a:rPr lang="en-US" sz="1600" dirty="0" err="1">
-                <a:solidFill>
-                  <a:schemeClr val="bg1">
-                    <a:lumMod val="65000"/>
-                  </a:schemeClr>
-                </a:solidFill>
-              </a:rPr>
-              <a:t>ClearScreen</a:t>
-            </a:r>
-            <a:r>
-              <a:rPr lang="en-US" sz="1600" dirty="0">
-                <a:solidFill>
-                  <a:schemeClr val="bg1">
-                    <a:lumMod val="65000"/>
-                  </a:schemeClr>
-                </a:solidFill>
-              </a:rPr>
-              <a:t>(</a:t>
-            </a:r>
-            <a:r>
-              <a:rPr lang="en-US" sz="1600" dirty="0" err="1">
-                <a:solidFill>
-                  <a:schemeClr val="bg1">
-                    <a:lumMod val="65000"/>
-                  </a:schemeClr>
-                </a:solidFill>
-              </a:rPr>
-              <a:t>RandomColor</a:t>
-            </a:r>
-            <a:r>
-              <a:rPr lang="en-US" sz="1600" dirty="0">
-                <a:solidFill>
-                  <a:schemeClr val="bg1">
-                    <a:lumMod val="65000"/>
-                  </a:schemeClr>
-                </a:solidFill>
-              </a:rPr>
-              <a:t>());</a:t>
-            </a:r>
-          </a:p>
-          <a:p>
-            <a:pPr marL="342900" indent="-342900">
-              <a:buFont typeface="+mj-lt"/>
-              <a:buAutoNum type="arabicPeriod"/>
-            </a:pPr>
-            <a:r>
-              <a:rPr lang="en-US" sz="1600" dirty="0" err="1">
-                <a:solidFill>
-                  <a:schemeClr val="bg1">
-                    <a:lumMod val="65000"/>
-                  </a:schemeClr>
-                </a:solidFill>
-              </a:rPr>
-              <a:t>RefreshScreen</a:t>
-            </a:r>
-            <a:r>
-              <a:rPr lang="en-US" sz="1600" dirty="0">
-                <a:solidFill>
-                  <a:schemeClr val="bg1">
-                    <a:lumMod val="65000"/>
-                  </a:schemeClr>
-                </a:solidFill>
-              </a:rPr>
-              <a:t>();</a:t>
-            </a:r>
-          </a:p>
-          <a:p>
-            <a:pPr marL="342900" indent="-342900">
-              <a:buFont typeface="+mj-lt"/>
-              <a:buAutoNum type="arabicPeriod"/>
-            </a:pPr>
-            <a:r>
-              <a:rPr lang="en-US" sz="1600" dirty="0">
-                <a:solidFill>
-                  <a:schemeClr val="bg1">
-                    <a:lumMod val="65000"/>
-                  </a:schemeClr>
-                </a:solidFill>
-              </a:rPr>
-              <a:t>Delay(1000 * </a:t>
-            </a:r>
-            <a:r>
-              <a:rPr lang="en-US" sz="1600" dirty="0" err="1">
-                <a:solidFill>
-                  <a:schemeClr val="bg1">
-                    <a:lumMod val="65000"/>
-                  </a:schemeClr>
-                </a:solidFill>
-              </a:rPr>
-              <a:t>Rnd</a:t>
-            </a:r>
-            <a:r>
-              <a:rPr lang="en-US" sz="1600" dirty="0">
-                <a:solidFill>
-                  <a:schemeClr val="bg1">
-                    <a:lumMod val="65000"/>
-                  </a:schemeClr>
-                </a:solidFill>
-              </a:rPr>
-              <a:t>(10));</a:t>
-            </a:r>
-          </a:p>
-        </p:txBody>
-      </p:sp>
-      <p:sp>
-        <p:nvSpPr>
-          <p:cNvPr id="47" name="TextBox 46">
-            <a:extLst>
-              <a:ext uri="{FF2B5EF4-FFF2-40B4-BE49-F238E27FC236}">
-                <a16:creationId xmlns:a16="http://schemas.microsoft.com/office/drawing/2014/main" id="{CEE8ED42-3479-1B5C-54AF-861C3445BCF0}"/>
-              </a:ext>
-            </a:extLst>
-          </p:cNvPr>
-          <p:cNvSpPr txBox="1"/>
-          <p:nvPr/>
-        </p:nvSpPr>
-        <p:spPr>
-          <a:xfrm>
-            <a:off x="3290509" y="3571577"/>
-            <a:ext cx="1369606" cy="369332"/>
-          </a:xfrm>
-          <a:prstGeom prst="rect">
-            <a:avLst/>
-          </a:prstGeom>
-          <a:noFill/>
-        </p:spPr>
-        <p:txBody>
-          <a:bodyPr wrap="none" rtlCol="0">
-            <a:spAutoFit/>
-          </a:bodyPr>
-          <a:lstStyle/>
-          <a:p>
-            <a:r>
-              <a:rPr lang="en-US" dirty="0"/>
-              <a:t>./screen-test</a:t>
-            </a:r>
-          </a:p>
-        </p:txBody>
-      </p:sp>
-      <p:grpSp>
-        <p:nvGrpSpPr>
-          <p:cNvPr id="48" name="Group 47">
-            <a:extLst>
-              <a:ext uri="{FF2B5EF4-FFF2-40B4-BE49-F238E27FC236}">
-                <a16:creationId xmlns:a16="http://schemas.microsoft.com/office/drawing/2014/main" id="{05274D53-B4BE-BAEF-144F-08DAB4E49891}"/>
-              </a:ext>
-            </a:extLst>
-          </p:cNvPr>
-          <p:cNvGrpSpPr/>
-          <p:nvPr/>
-        </p:nvGrpSpPr>
-        <p:grpSpPr>
-          <a:xfrm>
-            <a:off x="1443231" y="995084"/>
-            <a:ext cx="891098" cy="2880325"/>
-            <a:chOff x="1668759" y="-13958058"/>
-            <a:chExt cx="487848" cy="22198517"/>
-          </a:xfrm>
-        </p:grpSpPr>
-        <p:cxnSp>
-          <p:nvCxnSpPr>
-            <p:cNvPr id="49" name="Straight Arrow Connector 55">
-              <a:extLst>
-                <a:ext uri="{FF2B5EF4-FFF2-40B4-BE49-F238E27FC236}">
-                  <a16:creationId xmlns:a16="http://schemas.microsoft.com/office/drawing/2014/main" id="{FA6E083F-CAB9-4C60-9780-C87DA9BCD391}"/>
-                </a:ext>
-              </a:extLst>
-            </p:cNvPr>
-            <p:cNvCxnSpPr>
-              <a:cxnSpLocks/>
-            </p:cNvCxnSpPr>
-            <p:nvPr/>
-          </p:nvCxnSpPr>
-          <p:spPr>
-            <a:xfrm rot="5400000" flipH="1" flipV="1">
-              <a:off x="-7504250" y="-4785019"/>
-              <a:ext cx="18833896" cy="487818"/>
-            </a:xfrm>
-            <a:prstGeom prst="bentConnector3">
-              <a:avLst>
-                <a:gd name="adj1" fmla="val 100645"/>
-              </a:avLst>
-            </a:prstGeom>
-            <a:ln w="19050" cap="rnd" cmpd="sng">
-              <a:solidFill>
-                <a:schemeClr val="tx1"/>
-              </a:solidFill>
-              <a:prstDash val="dash"/>
-              <a:round/>
-              <a:tailEnd type="triangle"/>
-            </a:ln>
-          </p:spPr>
-          <p:style>
-            <a:lnRef idx="1">
-              <a:schemeClr val="accent1"/>
-            </a:lnRef>
-            <a:fillRef idx="0">
-              <a:schemeClr val="accent1"/>
-            </a:fillRef>
-            <a:effectRef idx="0">
-              <a:schemeClr val="accent1"/>
-            </a:effectRef>
-            <a:fontRef idx="minor">
-              <a:schemeClr val="tx1"/>
-            </a:fontRef>
-          </p:style>
-        </p:cxnSp>
-        <p:sp>
-          <p:nvSpPr>
-            <p:cNvPr id="50" name="Rectangle 49">
-              <a:extLst>
-                <a:ext uri="{FF2B5EF4-FFF2-40B4-BE49-F238E27FC236}">
-                  <a16:creationId xmlns:a16="http://schemas.microsoft.com/office/drawing/2014/main" id="{EC958D75-D126-E1A1-EBB7-369046B06B90}"/>
-                </a:ext>
-              </a:extLst>
-            </p:cNvPr>
-            <p:cNvSpPr/>
-            <p:nvPr/>
-          </p:nvSpPr>
-          <p:spPr>
-            <a:xfrm>
-              <a:off x="1668759" y="7932682"/>
-              <a:ext cx="343070" cy="307777"/>
-            </a:xfrm>
-            <a:prstGeom prst="rect">
-              <a:avLst/>
-            </a:prstGeom>
-            <a:noFill/>
-            <a:ln>
-              <a:noFill/>
-            </a:ln>
-          </p:spPr>
-          <p:style>
-            <a:lnRef idx="2">
-              <a:schemeClr val="accent1">
-                <a:shade val="15000"/>
-              </a:schemeClr>
-            </a:lnRef>
-            <a:fillRef idx="1">
-              <a:schemeClr val="accent1"/>
-            </a:fillRef>
-            <a:effectRef idx="0">
-              <a:schemeClr val="accent1"/>
-            </a:effectRef>
-            <a:fontRef idx="minor">
-              <a:schemeClr val="lt1"/>
-            </a:fontRef>
-          </p:style>
-          <p:txBody>
-            <a:bodyPr rtlCol="0" anchor="ctr"/>
-            <a:lstStyle/>
-            <a:p>
-              <a:pPr algn="ctr"/>
-              <a:endParaRPr lang="en-US"/>
-            </a:p>
-          </p:txBody>
-        </p:sp>
-      </p:grpSp>
-      <p:sp>
-        <p:nvSpPr>
-          <p:cNvPr id="51" name="TextBox 50">
-            <a:extLst>
-              <a:ext uri="{FF2B5EF4-FFF2-40B4-BE49-F238E27FC236}">
-                <a16:creationId xmlns:a16="http://schemas.microsoft.com/office/drawing/2014/main" id="{18FD4E86-DE4F-DD70-9A77-BD8210F52EA6}"/>
-              </a:ext>
-            </a:extLst>
-          </p:cNvPr>
-          <p:cNvSpPr txBox="1"/>
-          <p:nvPr/>
-        </p:nvSpPr>
-        <p:spPr>
-          <a:xfrm>
-            <a:off x="1027797" y="3427239"/>
-            <a:ext cx="836603" cy="369332"/>
-          </a:xfrm>
-          <a:prstGeom prst="rect">
-            <a:avLst/>
-          </a:prstGeom>
-          <a:noFill/>
-        </p:spPr>
-        <p:txBody>
-          <a:bodyPr wrap="square" rtlCol="0">
-            <a:spAutoFit/>
-          </a:bodyPr>
-          <a:lstStyle/>
-          <a:p>
-            <a:pPr algn="ctr"/>
-            <a:r>
-              <a:rPr lang="en-US" dirty="0"/>
-              <a:t>1</a:t>
-            </a:r>
-          </a:p>
-        </p:txBody>
-      </p:sp>
-    </p:spTree>
-    <p:extLst>
-      <p:ext uri="{BB962C8B-B14F-4D97-AF65-F5344CB8AC3E}">
-        <p14:creationId xmlns:p14="http://schemas.microsoft.com/office/powerpoint/2010/main" val="1784227139"/>
-      </p:ext>
-    </p:extLst>
-  </p:cSld>
-  <p:clrMapOvr>
-    <a:masterClrMapping/>
-  </p:clrMapOvr>
-</p:sld>
-</file>
-
-<file path=ppt/slides/slide2.xml><?xml version="1.0" encoding="utf-8"?>
-<p:sld xmlns:a="http://schemas.openxmlformats.org/drawingml/2006/main" xmlns:r="http://schemas.openxmlformats.org/officeDocument/2006/relationships" xmlns:p="http://schemas.openxmlformats.org/presentationml/2006/main">
-  <p:cSld>
-    <p:bg>
-      <p:bgPr>
-        <a:blipFill dpi="0" rotWithShape="1">
-          <a:blip r:embed="rId2">
-            <a:lum/>
-          </a:blip>
-          <a:srcRect/>
-          <a:stretch>
-            <a:fillRect/>
-          </a:stretch>
-        </a:blipFill>
-        <a:effectLst/>
-      </p:bgPr>
-    </p:bg>
-    <p:spTree>
-      <p:nvGrpSpPr>
-        <p:cNvPr id="1" name=""/>
-        <p:cNvGrpSpPr/>
-        <p:nvPr/>
-      </p:nvGrpSpPr>
-      <p:grpSpPr>
-        <a:xfrm>
-          <a:off x="0" y="0"/>
-          <a:ext cx="0" cy="0"/>
-          <a:chOff x="0" y="0"/>
-          <a:chExt cx="0" cy="0"/>
-        </a:xfrm>
-      </p:grpSpPr>
-      <p:grpSp>
-        <p:nvGrpSpPr>
-          <p:cNvPr id="12" name="Group 11">
-            <a:extLst>
-              <a:ext uri="{FF2B5EF4-FFF2-40B4-BE49-F238E27FC236}">
-                <a16:creationId xmlns:a16="http://schemas.microsoft.com/office/drawing/2014/main" id="{F79D1400-153A-0626-FCB1-82473C4A95BC}"/>
-              </a:ext>
-            </a:extLst>
-          </p:cNvPr>
-          <p:cNvGrpSpPr/>
-          <p:nvPr/>
-        </p:nvGrpSpPr>
-        <p:grpSpPr>
-          <a:xfrm>
-            <a:off x="237102" y="213481"/>
-            <a:ext cx="7093528" cy="4658157"/>
-            <a:chOff x="239330" y="-2890187"/>
-            <a:chExt cx="7093528" cy="4658157"/>
-          </a:xfrm>
-        </p:grpSpPr>
-        <p:sp>
-          <p:nvSpPr>
-            <p:cNvPr id="16" name="TextBox 15">
-              <a:extLst>
-                <a:ext uri="{FF2B5EF4-FFF2-40B4-BE49-F238E27FC236}">
-                  <a16:creationId xmlns:a16="http://schemas.microsoft.com/office/drawing/2014/main" id="{579D6D41-105C-FB51-AC96-A544404112E8}"/>
-                </a:ext>
-              </a:extLst>
-            </p:cNvPr>
-            <p:cNvSpPr txBox="1"/>
-            <p:nvPr/>
-          </p:nvSpPr>
-          <p:spPr>
-            <a:xfrm>
-              <a:off x="2253693" y="-2438525"/>
-              <a:ext cx="5046276" cy="276999"/>
-            </a:xfrm>
-            <a:prstGeom prst="rect">
-              <a:avLst/>
-            </a:prstGeom>
-            <a:noFill/>
-          </p:spPr>
-          <p:txBody>
-            <a:bodyPr wrap="square" rtlCol="0">
-              <a:spAutoFit/>
-            </a:bodyPr>
-            <a:lstStyle/>
-            <a:p>
-              <a:pPr marL="342900" indent="-342900" rtl="0">
-                <a:buFont typeface="+mj-lt"/>
-                <a:buAutoNum type="arabicPeriod"/>
-              </a:pPr>
-              <a:endParaRPr lang="en-AU" sz="1200" dirty="0">
-                <a:solidFill>
-                  <a:schemeClr val="bg1">
-                    <a:lumMod val="65000"/>
-                  </a:schemeClr>
-                </a:solidFill>
-              </a:endParaRPr>
-            </a:p>
-          </p:txBody>
-        </p:sp>
-        <p:grpSp>
-          <p:nvGrpSpPr>
-            <p:cNvPr id="37" name="Group 36">
-              <a:extLst>
-                <a:ext uri="{FF2B5EF4-FFF2-40B4-BE49-F238E27FC236}">
-                  <a16:creationId xmlns:a16="http://schemas.microsoft.com/office/drawing/2014/main" id="{2DBCA10F-924D-E145-7FF6-9A1953DEE281}"/>
-                </a:ext>
-              </a:extLst>
-            </p:cNvPr>
-            <p:cNvGrpSpPr/>
-            <p:nvPr/>
-          </p:nvGrpSpPr>
-          <p:grpSpPr>
-            <a:xfrm>
-              <a:off x="350723" y="943316"/>
-              <a:ext cx="567020" cy="824654"/>
-              <a:chOff x="1477273" y="4783810"/>
-              <a:chExt cx="567020" cy="824654"/>
-            </a:xfrm>
-          </p:grpSpPr>
-          <p:pic>
-            <p:nvPicPr>
-              <p:cNvPr id="13" name="Picture 12" descr="A black square with white lines&#10;&#10;Description automatically generated">
-                <a:extLst>
-                  <a:ext uri="{FF2B5EF4-FFF2-40B4-BE49-F238E27FC236}">
-                    <a16:creationId xmlns:a16="http://schemas.microsoft.com/office/drawing/2014/main" id="{9975BC6B-61F7-6B1E-178A-EB5A5CF8412C}"/>
-                  </a:ext>
-                </a:extLst>
-              </p:cNvPr>
-              <p:cNvPicPr>
-                <a:picLocks noChangeAspect="1"/>
-              </p:cNvPicPr>
-              <p:nvPr/>
-            </p:nvPicPr>
-            <p:blipFill>
-              <a:blip r:embed="rId3">
-                <a:alphaModFix/>
-              </a:blip>
-              <a:stretch>
-                <a:fillRect/>
-              </a:stretch>
-            </p:blipFill>
-            <p:spPr>
-              <a:xfrm>
-                <a:off x="1489332" y="4783810"/>
-                <a:ext cx="554961" cy="509789"/>
-              </a:xfrm>
-              <a:prstGeom prst="rect">
-                <a:avLst/>
-              </a:prstGeom>
-            </p:spPr>
-          </p:pic>
-          <p:sp>
-            <p:nvSpPr>
-              <p:cNvPr id="18" name="TextBox 17">
-                <a:extLst>
-                  <a:ext uri="{FF2B5EF4-FFF2-40B4-BE49-F238E27FC236}">
-                    <a16:creationId xmlns:a16="http://schemas.microsoft.com/office/drawing/2014/main" id="{21E6B770-730F-7A2F-0BCC-DFD2371C6F55}"/>
-                  </a:ext>
-                </a:extLst>
-              </p:cNvPr>
-              <p:cNvSpPr txBox="1"/>
-              <p:nvPr/>
-            </p:nvSpPr>
-            <p:spPr>
-              <a:xfrm>
-                <a:off x="1477273" y="5239132"/>
-                <a:ext cx="554960" cy="369332"/>
-              </a:xfrm>
-              <a:prstGeom prst="rect">
-                <a:avLst/>
-              </a:prstGeom>
-              <a:noFill/>
-            </p:spPr>
-            <p:txBody>
-              <a:bodyPr wrap="none" rtlCol="0">
-                <a:spAutoFit/>
-              </a:bodyPr>
-              <a:lstStyle/>
-              <a:p>
-                <a:r>
-                  <a:rPr lang="en-US" dirty="0">
-                    <a:latin typeface="Gaegu" pitchFamily="2" charset="0"/>
-                  </a:rPr>
-                  <a:t>CPU</a:t>
-                </a:r>
-              </a:p>
-            </p:txBody>
-          </p:sp>
-        </p:grpSp>
-        <p:sp>
-          <p:nvSpPr>
-            <p:cNvPr id="2" name="TextBox 1">
-              <a:extLst>
-                <a:ext uri="{FF2B5EF4-FFF2-40B4-BE49-F238E27FC236}">
-                  <a16:creationId xmlns:a16="http://schemas.microsoft.com/office/drawing/2014/main" id="{7896A7BA-08CF-32E6-6836-EBE01A61209D}"/>
-                </a:ext>
-              </a:extLst>
-            </p:cNvPr>
-            <p:cNvSpPr txBox="1"/>
-            <p:nvPr/>
-          </p:nvSpPr>
-          <p:spPr>
-            <a:xfrm>
-              <a:off x="487351" y="-2537265"/>
-              <a:ext cx="1119217" cy="369332"/>
-            </a:xfrm>
-            <a:prstGeom prst="rect">
-              <a:avLst/>
-            </a:prstGeom>
-            <a:noFill/>
-          </p:spPr>
-          <p:txBody>
-            <a:bodyPr wrap="none" rtlCol="0">
-              <a:spAutoFit/>
-            </a:bodyPr>
-            <a:lstStyle/>
-            <a:p>
-              <a:r>
-                <a:rPr lang="en-US" dirty="0">
-                  <a:latin typeface="Gaegu" pitchFamily="2" charset="0"/>
-                </a:rPr>
-                <a:t>The Stack</a:t>
-              </a:r>
-            </a:p>
-          </p:txBody>
-        </p:sp>
-        <p:grpSp>
-          <p:nvGrpSpPr>
-            <p:cNvPr id="52" name="Group 51">
-              <a:extLst>
-                <a:ext uri="{FF2B5EF4-FFF2-40B4-BE49-F238E27FC236}">
-                  <a16:creationId xmlns:a16="http://schemas.microsoft.com/office/drawing/2014/main" id="{31F76148-6180-4659-D4A7-BBA4F34A68D0}"/>
-                </a:ext>
-              </a:extLst>
-            </p:cNvPr>
-            <p:cNvGrpSpPr/>
-            <p:nvPr/>
-          </p:nvGrpSpPr>
-          <p:grpSpPr>
-            <a:xfrm>
-              <a:off x="239330" y="-2544837"/>
-              <a:ext cx="7081019" cy="2633707"/>
-              <a:chOff x="239327" y="704652"/>
-              <a:chExt cx="7081020" cy="7128375"/>
-            </a:xfrm>
-          </p:grpSpPr>
-          <p:cxnSp>
-            <p:nvCxnSpPr>
-              <p:cNvPr id="5" name="Straight Connector 4">
-                <a:extLst>
-                  <a:ext uri="{FF2B5EF4-FFF2-40B4-BE49-F238E27FC236}">
-                    <a16:creationId xmlns:a16="http://schemas.microsoft.com/office/drawing/2014/main" id="{34E695AC-7393-02EF-35F2-A6C76AC72756}"/>
-                  </a:ext>
-                </a:extLst>
-              </p:cNvPr>
-              <p:cNvCxnSpPr>
-                <a:cxnSpLocks/>
-              </p:cNvCxnSpPr>
-              <p:nvPr/>
-            </p:nvCxnSpPr>
-            <p:spPr>
-              <a:xfrm>
-                <a:off x="2208417" y="789175"/>
-                <a:ext cx="0" cy="7043852"/>
-              </a:xfrm>
-              <a:prstGeom prst="line">
-                <a:avLst/>
-              </a:prstGeom>
-              <a:ln w="15875">
-                <a:solidFill>
-                  <a:schemeClr val="tx1">
-                    <a:lumMod val="50000"/>
-                    <a:lumOff val="50000"/>
-                  </a:schemeClr>
-                </a:solidFill>
-                <a:prstDash val="dashDot"/>
-              </a:ln>
-            </p:spPr>
-            <p:style>
-              <a:lnRef idx="1">
-                <a:schemeClr val="accent1"/>
-              </a:lnRef>
-              <a:fillRef idx="0">
-                <a:schemeClr val="accent1"/>
-              </a:fillRef>
-              <a:effectRef idx="0">
-                <a:schemeClr val="accent1"/>
-              </a:effectRef>
-              <a:fontRef idx="minor">
-                <a:schemeClr val="tx1"/>
-              </a:fontRef>
-            </p:style>
-          </p:cxnSp>
-          <p:sp>
-            <p:nvSpPr>
-              <p:cNvPr id="21" name="Rectangle 20">
-                <a:extLst>
-                  <a:ext uri="{FF2B5EF4-FFF2-40B4-BE49-F238E27FC236}">
-                    <a16:creationId xmlns:a16="http://schemas.microsoft.com/office/drawing/2014/main" id="{99972E63-2ADF-1620-345A-182BFBAF91AF}"/>
-                  </a:ext>
-                </a:extLst>
-              </p:cNvPr>
-              <p:cNvSpPr/>
-              <p:nvPr/>
-            </p:nvSpPr>
-            <p:spPr>
-              <a:xfrm>
-                <a:off x="239327" y="704652"/>
-                <a:ext cx="7081020" cy="7128375"/>
-              </a:xfrm>
-              <a:custGeom>
-                <a:avLst/>
-                <a:gdLst>
-                  <a:gd name="connsiteX0" fmla="*/ 0 w 7081020"/>
-                  <a:gd name="connsiteY0" fmla="*/ 0 h 7128375"/>
-                  <a:gd name="connsiteX1" fmla="*/ 572919 w 7081020"/>
-                  <a:gd name="connsiteY1" fmla="*/ 0 h 7128375"/>
-                  <a:gd name="connsiteX2" fmla="*/ 1004217 w 7081020"/>
-                  <a:gd name="connsiteY2" fmla="*/ 0 h 7128375"/>
-                  <a:gd name="connsiteX3" fmla="*/ 1789567 w 7081020"/>
-                  <a:gd name="connsiteY3" fmla="*/ 0 h 7128375"/>
-                  <a:gd name="connsiteX4" fmla="*/ 2362486 w 7081020"/>
-                  <a:gd name="connsiteY4" fmla="*/ 0 h 7128375"/>
-                  <a:gd name="connsiteX5" fmla="*/ 2935405 w 7081020"/>
-                  <a:gd name="connsiteY5" fmla="*/ 0 h 7128375"/>
-                  <a:gd name="connsiteX6" fmla="*/ 3720754 w 7081020"/>
-                  <a:gd name="connsiteY6" fmla="*/ 0 h 7128375"/>
-                  <a:gd name="connsiteX7" fmla="*/ 4222863 w 7081020"/>
-                  <a:gd name="connsiteY7" fmla="*/ 0 h 7128375"/>
-                  <a:gd name="connsiteX8" fmla="*/ 5008212 w 7081020"/>
-                  <a:gd name="connsiteY8" fmla="*/ 0 h 7128375"/>
-                  <a:gd name="connsiteX9" fmla="*/ 5793562 w 7081020"/>
-                  <a:gd name="connsiteY9" fmla="*/ 0 h 7128375"/>
-                  <a:gd name="connsiteX10" fmla="*/ 6437291 w 7081020"/>
-                  <a:gd name="connsiteY10" fmla="*/ 0 h 7128375"/>
-                  <a:gd name="connsiteX11" fmla="*/ 7081020 w 7081020"/>
-                  <a:gd name="connsiteY11" fmla="*/ 0 h 7128375"/>
-                  <a:gd name="connsiteX12" fmla="*/ 7081020 w 7081020"/>
-                  <a:gd name="connsiteY12" fmla="*/ 576750 h 7128375"/>
-                  <a:gd name="connsiteX13" fmla="*/ 7081020 w 7081020"/>
-                  <a:gd name="connsiteY13" fmla="*/ 1010933 h 7128375"/>
-                  <a:gd name="connsiteX14" fmla="*/ 7081020 w 7081020"/>
-                  <a:gd name="connsiteY14" fmla="*/ 1658967 h 7128375"/>
-                  <a:gd name="connsiteX15" fmla="*/ 7081020 w 7081020"/>
-                  <a:gd name="connsiteY15" fmla="*/ 2307001 h 7128375"/>
-                  <a:gd name="connsiteX16" fmla="*/ 7081020 w 7081020"/>
-                  <a:gd name="connsiteY16" fmla="*/ 2955035 h 7128375"/>
-                  <a:gd name="connsiteX17" fmla="*/ 7081020 w 7081020"/>
-                  <a:gd name="connsiteY17" fmla="*/ 3674353 h 7128375"/>
-                  <a:gd name="connsiteX18" fmla="*/ 7081020 w 7081020"/>
-                  <a:gd name="connsiteY18" fmla="*/ 4393671 h 7128375"/>
-                  <a:gd name="connsiteX19" fmla="*/ 7081020 w 7081020"/>
-                  <a:gd name="connsiteY19" fmla="*/ 5112989 h 7128375"/>
-                  <a:gd name="connsiteX20" fmla="*/ 7081020 w 7081020"/>
-                  <a:gd name="connsiteY20" fmla="*/ 5547172 h 7128375"/>
-                  <a:gd name="connsiteX21" fmla="*/ 7081020 w 7081020"/>
-                  <a:gd name="connsiteY21" fmla="*/ 6052638 h 7128375"/>
-                  <a:gd name="connsiteX22" fmla="*/ 7081020 w 7081020"/>
-                  <a:gd name="connsiteY22" fmla="*/ 7128375 h 7128375"/>
-                  <a:gd name="connsiteX23" fmla="*/ 6508101 w 7081020"/>
-                  <a:gd name="connsiteY23" fmla="*/ 7128375 h 7128375"/>
-                  <a:gd name="connsiteX24" fmla="*/ 5864372 w 7081020"/>
-                  <a:gd name="connsiteY24" fmla="*/ 7128375 h 7128375"/>
-                  <a:gd name="connsiteX25" fmla="*/ 5433074 w 7081020"/>
-                  <a:gd name="connsiteY25" fmla="*/ 7128375 h 7128375"/>
-                  <a:gd name="connsiteX26" fmla="*/ 5001775 w 7081020"/>
-                  <a:gd name="connsiteY26" fmla="*/ 7128375 h 7128375"/>
-                  <a:gd name="connsiteX27" fmla="*/ 4358046 w 7081020"/>
-                  <a:gd name="connsiteY27" fmla="*/ 7128375 h 7128375"/>
-                  <a:gd name="connsiteX28" fmla="*/ 3855937 w 7081020"/>
-                  <a:gd name="connsiteY28" fmla="*/ 7128375 h 7128375"/>
-                  <a:gd name="connsiteX29" fmla="*/ 3141398 w 7081020"/>
-                  <a:gd name="connsiteY29" fmla="*/ 7128375 h 7128375"/>
-                  <a:gd name="connsiteX30" fmla="*/ 2639289 w 7081020"/>
-                  <a:gd name="connsiteY30" fmla="*/ 7128375 h 7128375"/>
-                  <a:gd name="connsiteX31" fmla="*/ 1924750 w 7081020"/>
-                  <a:gd name="connsiteY31" fmla="*/ 7128375 h 7128375"/>
-                  <a:gd name="connsiteX32" fmla="*/ 1493451 w 7081020"/>
-                  <a:gd name="connsiteY32" fmla="*/ 7128375 h 7128375"/>
-                  <a:gd name="connsiteX33" fmla="*/ 778912 w 7081020"/>
-                  <a:gd name="connsiteY33" fmla="*/ 7128375 h 7128375"/>
-                  <a:gd name="connsiteX34" fmla="*/ 0 w 7081020"/>
-                  <a:gd name="connsiteY34" fmla="*/ 7128375 h 7128375"/>
-                  <a:gd name="connsiteX35" fmla="*/ 0 w 7081020"/>
-                  <a:gd name="connsiteY35" fmla="*/ 6694192 h 7128375"/>
-                  <a:gd name="connsiteX36" fmla="*/ 0 w 7081020"/>
-                  <a:gd name="connsiteY36" fmla="*/ 6117442 h 7128375"/>
-                  <a:gd name="connsiteX37" fmla="*/ 0 w 7081020"/>
-                  <a:gd name="connsiteY37" fmla="*/ 5326840 h 7128375"/>
-                  <a:gd name="connsiteX38" fmla="*/ 0 w 7081020"/>
-                  <a:gd name="connsiteY38" fmla="*/ 4821374 h 7128375"/>
-                  <a:gd name="connsiteX39" fmla="*/ 0 w 7081020"/>
-                  <a:gd name="connsiteY39" fmla="*/ 4387191 h 7128375"/>
-                  <a:gd name="connsiteX40" fmla="*/ 0 w 7081020"/>
-                  <a:gd name="connsiteY40" fmla="*/ 3953008 h 7128375"/>
-                  <a:gd name="connsiteX41" fmla="*/ 0 w 7081020"/>
-                  <a:gd name="connsiteY41" fmla="*/ 3233690 h 7128375"/>
-                  <a:gd name="connsiteX42" fmla="*/ 0 w 7081020"/>
-                  <a:gd name="connsiteY42" fmla="*/ 2799507 h 7128375"/>
-                  <a:gd name="connsiteX43" fmla="*/ 0 w 7081020"/>
-                  <a:gd name="connsiteY43" fmla="*/ 2151473 h 7128375"/>
-                  <a:gd name="connsiteX44" fmla="*/ 0 w 7081020"/>
-                  <a:gd name="connsiteY44" fmla="*/ 1646007 h 7128375"/>
-                  <a:gd name="connsiteX45" fmla="*/ 0 w 7081020"/>
-                  <a:gd name="connsiteY45" fmla="*/ 997972 h 7128375"/>
-                  <a:gd name="connsiteX46" fmla="*/ 0 w 7081020"/>
-                  <a:gd name="connsiteY46" fmla="*/ 0 h 7128375"/>
-                </a:gdLst>
-                <a:ahLst/>
-                <a:cxnLst>
-                  <a:cxn ang="0">
-                    <a:pos x="connsiteX0" y="connsiteY0"/>
-                  </a:cxn>
-                  <a:cxn ang="0">
-                    <a:pos x="connsiteX1" y="connsiteY1"/>
-                  </a:cxn>
-                  <a:cxn ang="0">
-                    <a:pos x="connsiteX2" y="connsiteY2"/>
-                  </a:cxn>
-                  <a:cxn ang="0">
-                    <a:pos x="connsiteX3" y="connsiteY3"/>
-                  </a:cxn>
-                  <a:cxn ang="0">
-                    <a:pos x="connsiteX4" y="connsiteY4"/>
-                  </a:cxn>
-                  <a:cxn ang="0">
-                    <a:pos x="connsiteX5" y="connsiteY5"/>
-                  </a:cxn>
-                  <a:cxn ang="0">
-                    <a:pos x="connsiteX6" y="connsiteY6"/>
-                  </a:cxn>
-                  <a:cxn ang="0">
-                    <a:pos x="connsiteX7" y="connsiteY7"/>
-                  </a:cxn>
-                  <a:cxn ang="0">
-                    <a:pos x="connsiteX8" y="connsiteY8"/>
-                  </a:cxn>
-                  <a:cxn ang="0">
-                    <a:pos x="connsiteX9" y="connsiteY9"/>
-                  </a:cxn>
-                  <a:cxn ang="0">
-                    <a:pos x="connsiteX10" y="connsiteY10"/>
-                  </a:cxn>
-                  <a:cxn ang="0">
-                    <a:pos x="connsiteX11" y="connsiteY11"/>
-                  </a:cxn>
-                  <a:cxn ang="0">
-                    <a:pos x="connsiteX12" y="connsiteY12"/>
-                  </a:cxn>
-                  <a:cxn ang="0">
-                    <a:pos x="connsiteX13" y="connsiteY13"/>
-                  </a:cxn>
-                  <a:cxn ang="0">
-                    <a:pos x="connsiteX14" y="connsiteY14"/>
-                  </a:cxn>
-                  <a:cxn ang="0">
-                    <a:pos x="connsiteX15" y="connsiteY15"/>
-                  </a:cxn>
-                  <a:cxn ang="0">
-                    <a:pos x="connsiteX16" y="connsiteY16"/>
-                  </a:cxn>
-                  <a:cxn ang="0">
-                    <a:pos x="connsiteX17" y="connsiteY17"/>
-                  </a:cxn>
-                  <a:cxn ang="0">
-                    <a:pos x="connsiteX18" y="connsiteY18"/>
-                  </a:cxn>
-                  <a:cxn ang="0">
-                    <a:pos x="connsiteX19" y="connsiteY19"/>
-                  </a:cxn>
-                  <a:cxn ang="0">
-                    <a:pos x="connsiteX20" y="connsiteY20"/>
-                  </a:cxn>
-                  <a:cxn ang="0">
-                    <a:pos x="connsiteX21" y="connsiteY21"/>
-                  </a:cxn>
-                  <a:cxn ang="0">
-                    <a:pos x="connsiteX22" y="connsiteY22"/>
-                  </a:cxn>
-                  <a:cxn ang="0">
-                    <a:pos x="connsiteX23" y="connsiteY23"/>
-                  </a:cxn>
-                  <a:cxn ang="0">
-                    <a:pos x="connsiteX24" y="connsiteY24"/>
-                  </a:cxn>
-                  <a:cxn ang="0">
-                    <a:pos x="connsiteX25" y="connsiteY25"/>
-                  </a:cxn>
-                  <a:cxn ang="0">
-                    <a:pos x="connsiteX26" y="connsiteY26"/>
-                  </a:cxn>
-                  <a:cxn ang="0">
-                    <a:pos x="connsiteX27" y="connsiteY27"/>
-                  </a:cxn>
-                  <a:cxn ang="0">
-                    <a:pos x="connsiteX28" y="connsiteY28"/>
-                  </a:cxn>
-                  <a:cxn ang="0">
-                    <a:pos x="connsiteX29" y="connsiteY29"/>
-                  </a:cxn>
-                  <a:cxn ang="0">
-                    <a:pos x="connsiteX30" y="connsiteY30"/>
-                  </a:cxn>
-                  <a:cxn ang="0">
-                    <a:pos x="connsiteX31" y="connsiteY31"/>
-                  </a:cxn>
-                  <a:cxn ang="0">
-                    <a:pos x="connsiteX32" y="connsiteY32"/>
-                  </a:cxn>
-                  <a:cxn ang="0">
-                    <a:pos x="connsiteX33" y="connsiteY33"/>
-                  </a:cxn>
-                  <a:cxn ang="0">
-                    <a:pos x="connsiteX34" y="connsiteY34"/>
-                  </a:cxn>
-                  <a:cxn ang="0">
-                    <a:pos x="connsiteX35" y="connsiteY35"/>
-                  </a:cxn>
-                  <a:cxn ang="0">
-                    <a:pos x="connsiteX36" y="connsiteY36"/>
-                  </a:cxn>
-                  <a:cxn ang="0">
-                    <a:pos x="connsiteX37" y="connsiteY37"/>
-                  </a:cxn>
-                  <a:cxn ang="0">
-                    <a:pos x="connsiteX38" y="connsiteY38"/>
-                  </a:cxn>
-                  <a:cxn ang="0">
-                    <a:pos x="connsiteX39" y="connsiteY39"/>
-                  </a:cxn>
-                  <a:cxn ang="0">
-                    <a:pos x="connsiteX40" y="connsiteY40"/>
-                  </a:cxn>
-                  <a:cxn ang="0">
-                    <a:pos x="connsiteX41" y="connsiteY41"/>
-                  </a:cxn>
-                  <a:cxn ang="0">
-                    <a:pos x="connsiteX42" y="connsiteY42"/>
-                  </a:cxn>
-                  <a:cxn ang="0">
-                    <a:pos x="connsiteX43" y="connsiteY43"/>
-                  </a:cxn>
-                  <a:cxn ang="0">
-                    <a:pos x="connsiteX44" y="connsiteY44"/>
-                  </a:cxn>
-                  <a:cxn ang="0">
-                    <a:pos x="connsiteX45" y="connsiteY45"/>
-                  </a:cxn>
-                  <a:cxn ang="0">
-                    <a:pos x="connsiteX46" y="connsiteY46"/>
-                  </a:cxn>
-                </a:cxnLst>
-                <a:rect l="l" t="t" r="r" b="b"/>
-                <a:pathLst>
-                  <a:path w="7081020" h="7128375" extrusionOk="0">
-                    <a:moveTo>
-                      <a:pt x="0" y="0"/>
-                    </a:moveTo>
-                    <a:cubicBezTo>
-                      <a:pt x="210263" y="22018"/>
-                      <a:pt x="413341" y="21500"/>
-                      <a:pt x="572919" y="0"/>
-                    </a:cubicBezTo>
-                    <a:cubicBezTo>
-                      <a:pt x="732497" y="-21500"/>
-                      <a:pt x="792396" y="690"/>
-                      <a:pt x="1004217" y="0"/>
-                    </a:cubicBezTo>
-                    <a:cubicBezTo>
-                      <a:pt x="1216038" y="-690"/>
-                      <a:pt x="1615716" y="10174"/>
-                      <a:pt x="1789567" y="0"/>
-                    </a:cubicBezTo>
-                    <a:cubicBezTo>
-                      <a:pt x="1963418" y="-10174"/>
-                      <a:pt x="2244829" y="4874"/>
-                      <a:pt x="2362486" y="0"/>
-                    </a:cubicBezTo>
-                    <a:cubicBezTo>
-                      <a:pt x="2480143" y="-4874"/>
-                      <a:pt x="2735114" y="-20363"/>
-                      <a:pt x="2935405" y="0"/>
-                    </a:cubicBezTo>
-                    <a:cubicBezTo>
-                      <a:pt x="3135696" y="20363"/>
-                      <a:pt x="3436871" y="-29544"/>
-                      <a:pt x="3720754" y="0"/>
-                    </a:cubicBezTo>
-                    <a:cubicBezTo>
-                      <a:pt x="4004637" y="29544"/>
-                      <a:pt x="4028634" y="1501"/>
-                      <a:pt x="4222863" y="0"/>
-                    </a:cubicBezTo>
-                    <a:cubicBezTo>
-                      <a:pt x="4417092" y="-1501"/>
-                      <a:pt x="4654536" y="13421"/>
-                      <a:pt x="5008212" y="0"/>
-                    </a:cubicBezTo>
-                    <a:cubicBezTo>
-                      <a:pt x="5361888" y="-13421"/>
-                      <a:pt x="5558134" y="-3460"/>
-                      <a:pt x="5793562" y="0"/>
-                    </a:cubicBezTo>
-                    <a:cubicBezTo>
-                      <a:pt x="6028990" y="3460"/>
-                      <a:pt x="6283140" y="-18066"/>
-                      <a:pt x="6437291" y="0"/>
-                    </a:cubicBezTo>
-                    <a:cubicBezTo>
-                      <a:pt x="6591442" y="18066"/>
-                      <a:pt x="6828068" y="20319"/>
-                      <a:pt x="7081020" y="0"/>
-                    </a:cubicBezTo>
-                    <a:cubicBezTo>
-                      <a:pt x="7086679" y="197309"/>
-                      <a:pt x="7052409" y="340961"/>
-                      <a:pt x="7081020" y="576750"/>
-                    </a:cubicBezTo>
-                    <a:cubicBezTo>
-                      <a:pt x="7109632" y="812539"/>
-                      <a:pt x="7078751" y="855081"/>
-                      <a:pt x="7081020" y="1010933"/>
-                    </a:cubicBezTo>
-                    <a:cubicBezTo>
-                      <a:pt x="7083289" y="1166785"/>
-                      <a:pt x="7071237" y="1407724"/>
-                      <a:pt x="7081020" y="1658967"/>
-                    </a:cubicBezTo>
-                    <a:cubicBezTo>
-                      <a:pt x="7090803" y="1910210"/>
-                      <a:pt x="7062603" y="2032907"/>
-                      <a:pt x="7081020" y="2307001"/>
-                    </a:cubicBezTo>
-                    <a:cubicBezTo>
-                      <a:pt x="7099437" y="2581095"/>
-                      <a:pt x="7090470" y="2745162"/>
-                      <a:pt x="7081020" y="2955035"/>
-                    </a:cubicBezTo>
-                    <a:cubicBezTo>
-                      <a:pt x="7071570" y="3164908"/>
-                      <a:pt x="7066660" y="3460273"/>
-                      <a:pt x="7081020" y="3674353"/>
-                    </a:cubicBezTo>
-                    <a:cubicBezTo>
-                      <a:pt x="7095380" y="3888433"/>
-                      <a:pt x="7101845" y="4088684"/>
-                      <a:pt x="7081020" y="4393671"/>
-                    </a:cubicBezTo>
-                    <a:cubicBezTo>
-                      <a:pt x="7060195" y="4698658"/>
-                      <a:pt x="7045749" y="4754912"/>
-                      <a:pt x="7081020" y="5112989"/>
-                    </a:cubicBezTo>
-                    <a:cubicBezTo>
-                      <a:pt x="7116291" y="5471066"/>
-                      <a:pt x="7081173" y="5404600"/>
-                      <a:pt x="7081020" y="5547172"/>
-                    </a:cubicBezTo>
-                    <a:cubicBezTo>
-                      <a:pt x="7080867" y="5689744"/>
-                      <a:pt x="7067424" y="5891982"/>
-                      <a:pt x="7081020" y="6052638"/>
-                    </a:cubicBezTo>
-                    <a:cubicBezTo>
-                      <a:pt x="7094616" y="6213294"/>
-                      <a:pt x="7107647" y="6614038"/>
-                      <a:pt x="7081020" y="7128375"/>
-                    </a:cubicBezTo>
-                    <a:cubicBezTo>
-                      <a:pt x="6954770" y="7122103"/>
-                      <a:pt x="6779392" y="7110310"/>
-                      <a:pt x="6508101" y="7128375"/>
-                    </a:cubicBezTo>
-                    <a:cubicBezTo>
-                      <a:pt x="6236810" y="7146440"/>
-                      <a:pt x="6026138" y="7145017"/>
-                      <a:pt x="5864372" y="7128375"/>
-                    </a:cubicBezTo>
-                    <a:cubicBezTo>
-                      <a:pt x="5702606" y="7111733"/>
-                      <a:pt x="5551602" y="7148973"/>
-                      <a:pt x="5433074" y="7128375"/>
-                    </a:cubicBezTo>
-                    <a:cubicBezTo>
-                      <a:pt x="5314546" y="7107777"/>
-                      <a:pt x="5146991" y="7129476"/>
-                      <a:pt x="5001775" y="7128375"/>
-                    </a:cubicBezTo>
-                    <a:cubicBezTo>
-                      <a:pt x="4856559" y="7127274"/>
-                      <a:pt x="4630755" y="7126059"/>
-                      <a:pt x="4358046" y="7128375"/>
-                    </a:cubicBezTo>
-                    <a:cubicBezTo>
-                      <a:pt x="4085337" y="7130691"/>
-                      <a:pt x="3967138" y="7142143"/>
-                      <a:pt x="3855937" y="7128375"/>
-                    </a:cubicBezTo>
-                    <a:cubicBezTo>
-                      <a:pt x="3744736" y="7114607"/>
-                      <a:pt x="3452305" y="7132533"/>
-                      <a:pt x="3141398" y="7128375"/>
-                    </a:cubicBezTo>
-                    <a:cubicBezTo>
-                      <a:pt x="2830491" y="7124217"/>
-                      <a:pt x="2779193" y="7123189"/>
-                      <a:pt x="2639289" y="7128375"/>
-                    </a:cubicBezTo>
-                    <a:cubicBezTo>
-                      <a:pt x="2499385" y="7133561"/>
-                      <a:pt x="2173760" y="7093547"/>
-                      <a:pt x="1924750" y="7128375"/>
-                    </a:cubicBezTo>
-                    <a:cubicBezTo>
-                      <a:pt x="1675740" y="7163203"/>
-                      <a:pt x="1667255" y="7133285"/>
-                      <a:pt x="1493451" y="7128375"/>
-                    </a:cubicBezTo>
-                    <a:cubicBezTo>
-                      <a:pt x="1319647" y="7123465"/>
-                      <a:pt x="928836" y="7162812"/>
-                      <a:pt x="778912" y="7128375"/>
-                    </a:cubicBezTo>
-                    <a:cubicBezTo>
-                      <a:pt x="628988" y="7093938"/>
-                      <a:pt x="182251" y="7126729"/>
-                      <a:pt x="0" y="7128375"/>
-                    </a:cubicBezTo>
-                    <a:cubicBezTo>
-                      <a:pt x="17581" y="6957036"/>
-                      <a:pt x="19306" y="6836112"/>
-                      <a:pt x="0" y="6694192"/>
-                    </a:cubicBezTo>
-                    <a:cubicBezTo>
-                      <a:pt x="-19306" y="6552272"/>
-                      <a:pt x="-27487" y="6330951"/>
-                      <a:pt x="0" y="6117442"/>
-                    </a:cubicBezTo>
-                    <a:cubicBezTo>
-                      <a:pt x="27487" y="5903933"/>
-                      <a:pt x="34445" y="5603571"/>
-                      <a:pt x="0" y="5326840"/>
-                    </a:cubicBezTo>
-                    <a:cubicBezTo>
-                      <a:pt x="-34445" y="5050109"/>
-                      <a:pt x="22424" y="5011072"/>
-                      <a:pt x="0" y="4821374"/>
-                    </a:cubicBezTo>
-                    <a:cubicBezTo>
-                      <a:pt x="-22424" y="4631676"/>
-                      <a:pt x="-9224" y="4579426"/>
-                      <a:pt x="0" y="4387191"/>
-                    </a:cubicBezTo>
-                    <a:cubicBezTo>
-                      <a:pt x="9224" y="4194956"/>
-                      <a:pt x="12046" y="4059739"/>
-                      <a:pt x="0" y="3953008"/>
-                    </a:cubicBezTo>
-                    <a:cubicBezTo>
-                      <a:pt x="-12046" y="3846277"/>
-                      <a:pt x="-2171" y="3399792"/>
-                      <a:pt x="0" y="3233690"/>
-                    </a:cubicBezTo>
-                    <a:cubicBezTo>
-                      <a:pt x="2171" y="3067588"/>
-                      <a:pt x="-5609" y="2974591"/>
-                      <a:pt x="0" y="2799507"/>
-                    </a:cubicBezTo>
-                    <a:cubicBezTo>
-                      <a:pt x="5609" y="2624423"/>
-                      <a:pt x="-28770" y="2289599"/>
-                      <a:pt x="0" y="2151473"/>
-                    </a:cubicBezTo>
-                    <a:cubicBezTo>
-                      <a:pt x="28770" y="2013347"/>
-                      <a:pt x="-2451" y="1763400"/>
-                      <a:pt x="0" y="1646007"/>
-                    </a:cubicBezTo>
-                    <a:cubicBezTo>
-                      <a:pt x="2451" y="1528614"/>
-                      <a:pt x="-5029" y="1223026"/>
-                      <a:pt x="0" y="997972"/>
-                    </a:cubicBezTo>
-                    <a:cubicBezTo>
-                      <a:pt x="5029" y="772919"/>
-                      <a:pt x="-35205" y="296777"/>
-                      <a:pt x="0" y="0"/>
-                    </a:cubicBezTo>
-                    <a:close/>
-                  </a:path>
-                </a:pathLst>
-              </a:custGeom>
-              <a:noFill/>
-              <a:ln w="25400">
-                <a:solidFill>
-                  <a:schemeClr val="tx1"/>
-                </a:solidFill>
-                <a:extLst>
-                  <a:ext uri="{C807C97D-BFC1-408E-A445-0C87EB9F89A2}">
-                    <ask:lineSketchStyleProps xmlns:ask="http://schemas.microsoft.com/office/drawing/2018/sketchyshapes" sd="1219033472">
-                      <a:prstGeom prst="rect">
-                        <a:avLst/>
-                      </a:prstGeom>
-                      <ask:type>
-                        <ask:lineSketchFreehand/>
-                      </ask:type>
-                    </ask:lineSketchStyleProps>
-                  </a:ext>
-                </a:extLst>
-              </a:ln>
-            </p:spPr>
-            <p:style>
-              <a:lnRef idx="2">
-                <a:schemeClr val="accent1">
-                  <a:shade val="15000"/>
-                </a:schemeClr>
-              </a:lnRef>
-              <a:fillRef idx="1">
-                <a:schemeClr val="accent1"/>
-              </a:fillRef>
-              <a:effectRef idx="0">
-                <a:schemeClr val="accent1"/>
-              </a:effectRef>
-              <a:fontRef idx="minor">
-                <a:schemeClr val="lt1"/>
-              </a:fontRef>
-            </p:style>
-            <p:txBody>
-              <a:bodyPr rtlCol="0" anchor="ctr"/>
-              <a:lstStyle/>
-              <a:p>
-                <a:pPr algn="ctr"/>
-                <a:endParaRPr lang="en-US" sz="2229"/>
-              </a:p>
-            </p:txBody>
-          </p:sp>
-        </p:grpSp>
-        <p:grpSp>
-          <p:nvGrpSpPr>
-            <p:cNvPr id="44" name="Group 43">
-              <a:extLst>
-                <a:ext uri="{FF2B5EF4-FFF2-40B4-BE49-F238E27FC236}">
-                  <a16:creationId xmlns:a16="http://schemas.microsoft.com/office/drawing/2014/main" id="{57041239-5E19-1885-DBBA-360623883237}"/>
-                </a:ext>
-              </a:extLst>
-            </p:cNvPr>
-            <p:cNvGrpSpPr/>
-            <p:nvPr/>
-          </p:nvGrpSpPr>
-          <p:grpSpPr>
-            <a:xfrm>
-              <a:off x="3336640" y="180530"/>
-              <a:ext cx="3996218" cy="1585586"/>
-              <a:chOff x="4993885" y="4429523"/>
-              <a:chExt cx="6705679" cy="1940814"/>
-            </a:xfrm>
-          </p:grpSpPr>
-          <p:sp>
-            <p:nvSpPr>
-              <p:cNvPr id="3" name="Rectangle 2">
-                <a:extLst>
-                  <a:ext uri="{FF2B5EF4-FFF2-40B4-BE49-F238E27FC236}">
-                    <a16:creationId xmlns:a16="http://schemas.microsoft.com/office/drawing/2014/main" id="{F87659A1-007A-5A1A-3C43-D31914FA600E}"/>
-                  </a:ext>
-                </a:extLst>
-              </p:cNvPr>
-              <p:cNvSpPr/>
-              <p:nvPr/>
-            </p:nvSpPr>
-            <p:spPr>
-              <a:xfrm>
-                <a:off x="4993887" y="4490435"/>
-                <a:ext cx="6685442" cy="1879902"/>
-              </a:xfrm>
-              <a:custGeom>
-                <a:avLst/>
-                <a:gdLst>
-                  <a:gd name="connsiteX0" fmla="*/ 0 w 6685442"/>
-                  <a:gd name="connsiteY0" fmla="*/ 0 h 1879902"/>
-                  <a:gd name="connsiteX1" fmla="*/ 601690 w 6685442"/>
-                  <a:gd name="connsiteY1" fmla="*/ 0 h 1879902"/>
-                  <a:gd name="connsiteX2" fmla="*/ 1069671 w 6685442"/>
-                  <a:gd name="connsiteY2" fmla="*/ 0 h 1879902"/>
-                  <a:gd name="connsiteX3" fmla="*/ 1871924 w 6685442"/>
-                  <a:gd name="connsiteY3" fmla="*/ 0 h 1879902"/>
-                  <a:gd name="connsiteX4" fmla="*/ 2473614 w 6685442"/>
-                  <a:gd name="connsiteY4" fmla="*/ 0 h 1879902"/>
-                  <a:gd name="connsiteX5" fmla="*/ 3075303 w 6685442"/>
-                  <a:gd name="connsiteY5" fmla="*/ 0 h 1879902"/>
-                  <a:gd name="connsiteX6" fmla="*/ 3877556 w 6685442"/>
-                  <a:gd name="connsiteY6" fmla="*/ 0 h 1879902"/>
-                  <a:gd name="connsiteX7" fmla="*/ 4412392 w 6685442"/>
-                  <a:gd name="connsiteY7" fmla="*/ 0 h 1879902"/>
-                  <a:gd name="connsiteX8" fmla="*/ 5214645 w 6685442"/>
-                  <a:gd name="connsiteY8" fmla="*/ 0 h 1879902"/>
-                  <a:gd name="connsiteX9" fmla="*/ 6016898 w 6685442"/>
-                  <a:gd name="connsiteY9" fmla="*/ 0 h 1879902"/>
-                  <a:gd name="connsiteX10" fmla="*/ 6685442 w 6685442"/>
-                  <a:gd name="connsiteY10" fmla="*/ 0 h 1879902"/>
-                  <a:gd name="connsiteX11" fmla="*/ 6685442 w 6685442"/>
-                  <a:gd name="connsiteY11" fmla="*/ 664232 h 1879902"/>
-                  <a:gd name="connsiteX12" fmla="*/ 6685442 w 6685442"/>
-                  <a:gd name="connsiteY12" fmla="*/ 1309665 h 1879902"/>
-                  <a:gd name="connsiteX13" fmla="*/ 6685442 w 6685442"/>
-                  <a:gd name="connsiteY13" fmla="*/ 1879902 h 1879902"/>
-                  <a:gd name="connsiteX14" fmla="*/ 6016898 w 6685442"/>
-                  <a:gd name="connsiteY14" fmla="*/ 1879902 h 1879902"/>
-                  <a:gd name="connsiteX15" fmla="*/ 5482062 w 6685442"/>
-                  <a:gd name="connsiteY15" fmla="*/ 1879902 h 1879902"/>
-                  <a:gd name="connsiteX16" fmla="*/ 4813518 w 6685442"/>
-                  <a:gd name="connsiteY16" fmla="*/ 1879902 h 1879902"/>
-                  <a:gd name="connsiteX17" fmla="*/ 4011265 w 6685442"/>
-                  <a:gd name="connsiteY17" fmla="*/ 1879902 h 1879902"/>
-                  <a:gd name="connsiteX18" fmla="*/ 3342721 w 6685442"/>
-                  <a:gd name="connsiteY18" fmla="*/ 1879902 h 1879902"/>
-                  <a:gd name="connsiteX19" fmla="*/ 2874740 w 6685442"/>
-                  <a:gd name="connsiteY19" fmla="*/ 1879902 h 1879902"/>
-                  <a:gd name="connsiteX20" fmla="*/ 2339905 w 6685442"/>
-                  <a:gd name="connsiteY20" fmla="*/ 1879902 h 1879902"/>
-                  <a:gd name="connsiteX21" fmla="*/ 1537652 w 6685442"/>
-                  <a:gd name="connsiteY21" fmla="*/ 1879902 h 1879902"/>
-                  <a:gd name="connsiteX22" fmla="*/ 869107 w 6685442"/>
-                  <a:gd name="connsiteY22" fmla="*/ 1879902 h 1879902"/>
-                  <a:gd name="connsiteX23" fmla="*/ 0 w 6685442"/>
-                  <a:gd name="connsiteY23" fmla="*/ 1879902 h 1879902"/>
-                  <a:gd name="connsiteX24" fmla="*/ 0 w 6685442"/>
-                  <a:gd name="connsiteY24" fmla="*/ 1253268 h 1879902"/>
-                  <a:gd name="connsiteX25" fmla="*/ 0 w 6685442"/>
-                  <a:gd name="connsiteY25" fmla="*/ 683031 h 1879902"/>
-                  <a:gd name="connsiteX26" fmla="*/ 0 w 6685442"/>
-                  <a:gd name="connsiteY26" fmla="*/ 0 h 1879902"/>
-                </a:gdLst>
-                <a:ahLst/>
-                <a:cxnLst>
-                  <a:cxn ang="0">
-                    <a:pos x="connsiteX0" y="connsiteY0"/>
-                  </a:cxn>
-                  <a:cxn ang="0">
-                    <a:pos x="connsiteX1" y="connsiteY1"/>
-                  </a:cxn>
-                  <a:cxn ang="0">
-                    <a:pos x="connsiteX2" y="connsiteY2"/>
-                  </a:cxn>
-                  <a:cxn ang="0">
-                    <a:pos x="connsiteX3" y="connsiteY3"/>
-                  </a:cxn>
-                  <a:cxn ang="0">
-                    <a:pos x="connsiteX4" y="connsiteY4"/>
-                  </a:cxn>
-                  <a:cxn ang="0">
-                    <a:pos x="connsiteX5" y="connsiteY5"/>
-                  </a:cxn>
-                  <a:cxn ang="0">
-                    <a:pos x="connsiteX6" y="connsiteY6"/>
-                  </a:cxn>
-                  <a:cxn ang="0">
-                    <a:pos x="connsiteX7" y="connsiteY7"/>
-                  </a:cxn>
-                  <a:cxn ang="0">
-                    <a:pos x="connsiteX8" y="connsiteY8"/>
-                  </a:cxn>
-                  <a:cxn ang="0">
-                    <a:pos x="connsiteX9" y="connsiteY9"/>
-                  </a:cxn>
-                  <a:cxn ang="0">
-                    <a:pos x="connsiteX10" y="connsiteY10"/>
-                  </a:cxn>
-                  <a:cxn ang="0">
-                    <a:pos x="connsiteX11" y="connsiteY11"/>
-                  </a:cxn>
-                  <a:cxn ang="0">
-                    <a:pos x="connsiteX12" y="connsiteY12"/>
-                  </a:cxn>
-                  <a:cxn ang="0">
-                    <a:pos x="connsiteX13" y="connsiteY13"/>
-                  </a:cxn>
-                  <a:cxn ang="0">
-                    <a:pos x="connsiteX14" y="connsiteY14"/>
-                  </a:cxn>
-                  <a:cxn ang="0">
-                    <a:pos x="connsiteX15" y="connsiteY15"/>
-                  </a:cxn>
-                  <a:cxn ang="0">
-                    <a:pos x="connsiteX16" y="connsiteY16"/>
-                  </a:cxn>
-                  <a:cxn ang="0">
-                    <a:pos x="connsiteX17" y="connsiteY17"/>
-                  </a:cxn>
-                  <a:cxn ang="0">
-                    <a:pos x="connsiteX18" y="connsiteY18"/>
-                  </a:cxn>
-                  <a:cxn ang="0">
-                    <a:pos x="connsiteX19" y="connsiteY19"/>
-                  </a:cxn>
-                  <a:cxn ang="0">
-                    <a:pos x="connsiteX20" y="connsiteY20"/>
-                  </a:cxn>
-                  <a:cxn ang="0">
-                    <a:pos x="connsiteX21" y="connsiteY21"/>
-                  </a:cxn>
-                  <a:cxn ang="0">
-                    <a:pos x="connsiteX22" y="connsiteY22"/>
-                  </a:cxn>
-                  <a:cxn ang="0">
-                    <a:pos x="connsiteX23" y="connsiteY23"/>
-                  </a:cxn>
-                  <a:cxn ang="0">
-                    <a:pos x="connsiteX24" y="connsiteY24"/>
-                  </a:cxn>
-                  <a:cxn ang="0">
-                    <a:pos x="connsiteX25" y="connsiteY25"/>
-                  </a:cxn>
-                  <a:cxn ang="0">
-                    <a:pos x="connsiteX26" y="connsiteY26"/>
-                  </a:cxn>
-                </a:cxnLst>
-                <a:rect l="l" t="t" r="r" b="b"/>
-                <a:pathLst>
-                  <a:path w="6685442" h="1879902" extrusionOk="0">
-                    <a:moveTo>
-                      <a:pt x="0" y="0"/>
-                    </a:moveTo>
-                    <a:cubicBezTo>
-                      <a:pt x="197687" y="5421"/>
-                      <a:pt x="392637" y="-27165"/>
-                      <a:pt x="601690" y="0"/>
-                    </a:cubicBezTo>
-                    <a:cubicBezTo>
-                      <a:pt x="810743" y="27165"/>
-                      <a:pt x="967174" y="20034"/>
-                      <a:pt x="1069671" y="0"/>
-                    </a:cubicBezTo>
-                    <a:cubicBezTo>
-                      <a:pt x="1172168" y="-20034"/>
-                      <a:pt x="1481114" y="26288"/>
-                      <a:pt x="1871924" y="0"/>
-                    </a:cubicBezTo>
-                    <a:cubicBezTo>
-                      <a:pt x="2262734" y="-26288"/>
-                      <a:pt x="2275646" y="9816"/>
-                      <a:pt x="2473614" y="0"/>
-                    </a:cubicBezTo>
-                    <a:cubicBezTo>
-                      <a:pt x="2671582" y="-9816"/>
-                      <a:pt x="2839412" y="-12461"/>
-                      <a:pt x="3075303" y="0"/>
-                    </a:cubicBezTo>
-                    <a:cubicBezTo>
-                      <a:pt x="3311194" y="12461"/>
-                      <a:pt x="3565081" y="13656"/>
-                      <a:pt x="3877556" y="0"/>
-                    </a:cubicBezTo>
-                    <a:cubicBezTo>
-                      <a:pt x="4190031" y="-13656"/>
-                      <a:pt x="4272708" y="20821"/>
-                      <a:pt x="4412392" y="0"/>
-                    </a:cubicBezTo>
-                    <a:cubicBezTo>
-                      <a:pt x="4552076" y="-20821"/>
-                      <a:pt x="4977913" y="13579"/>
-                      <a:pt x="5214645" y="0"/>
-                    </a:cubicBezTo>
-                    <a:cubicBezTo>
-                      <a:pt x="5451377" y="-13579"/>
-                      <a:pt x="5621381" y="6072"/>
-                      <a:pt x="6016898" y="0"/>
-                    </a:cubicBezTo>
-                    <a:cubicBezTo>
-                      <a:pt x="6412415" y="-6072"/>
-                      <a:pt x="6368098" y="-22480"/>
-                      <a:pt x="6685442" y="0"/>
-                    </a:cubicBezTo>
-                    <a:cubicBezTo>
-                      <a:pt x="6697591" y="301157"/>
-                      <a:pt x="6697727" y="480815"/>
-                      <a:pt x="6685442" y="664232"/>
-                    </a:cubicBezTo>
-                    <a:cubicBezTo>
-                      <a:pt x="6673157" y="847649"/>
-                      <a:pt x="6658653" y="1087675"/>
-                      <a:pt x="6685442" y="1309665"/>
-                    </a:cubicBezTo>
-                    <a:cubicBezTo>
-                      <a:pt x="6712231" y="1531655"/>
-                      <a:pt x="6698835" y="1763455"/>
-                      <a:pt x="6685442" y="1879902"/>
-                    </a:cubicBezTo>
-                    <a:cubicBezTo>
-                      <a:pt x="6531484" y="1891034"/>
-                      <a:pt x="6258287" y="1890565"/>
-                      <a:pt x="6016898" y="1879902"/>
-                    </a:cubicBezTo>
-                    <a:cubicBezTo>
-                      <a:pt x="5775509" y="1869239"/>
-                      <a:pt x="5635686" y="1872983"/>
-                      <a:pt x="5482062" y="1879902"/>
-                    </a:cubicBezTo>
-                    <a:cubicBezTo>
-                      <a:pt x="5328438" y="1886821"/>
-                      <a:pt x="4969532" y="1862725"/>
-                      <a:pt x="4813518" y="1879902"/>
-                    </a:cubicBezTo>
-                    <a:cubicBezTo>
-                      <a:pt x="4657504" y="1897079"/>
-                      <a:pt x="4277483" y="1862195"/>
-                      <a:pt x="4011265" y="1879902"/>
-                    </a:cubicBezTo>
-                    <a:cubicBezTo>
-                      <a:pt x="3745047" y="1897609"/>
-                      <a:pt x="3503886" y="1863257"/>
-                      <a:pt x="3342721" y="1879902"/>
-                    </a:cubicBezTo>
-                    <a:cubicBezTo>
-                      <a:pt x="3181556" y="1896547"/>
-                      <a:pt x="3092212" y="1868626"/>
-                      <a:pt x="2874740" y="1879902"/>
-                    </a:cubicBezTo>
-                    <a:cubicBezTo>
-                      <a:pt x="2657268" y="1891178"/>
-                      <a:pt x="2552356" y="1874833"/>
-                      <a:pt x="2339905" y="1879902"/>
-                    </a:cubicBezTo>
-                    <a:cubicBezTo>
-                      <a:pt x="2127454" y="1884971"/>
-                      <a:pt x="1825409" y="1871730"/>
-                      <a:pt x="1537652" y="1879902"/>
-                    </a:cubicBezTo>
-                    <a:cubicBezTo>
-                      <a:pt x="1249895" y="1888074"/>
-                      <a:pt x="1087231" y="1899817"/>
-                      <a:pt x="869107" y="1879902"/>
-                    </a:cubicBezTo>
-                    <a:cubicBezTo>
-                      <a:pt x="650984" y="1859987"/>
-                      <a:pt x="261332" y="1888226"/>
-                      <a:pt x="0" y="1879902"/>
-                    </a:cubicBezTo>
-                    <a:cubicBezTo>
-                      <a:pt x="-26905" y="1691074"/>
-                      <a:pt x="-15528" y="1463785"/>
-                      <a:pt x="0" y="1253268"/>
-                    </a:cubicBezTo>
-                    <a:cubicBezTo>
-                      <a:pt x="15528" y="1042751"/>
-                      <a:pt x="5394" y="927087"/>
-                      <a:pt x="0" y="683031"/>
-                    </a:cubicBezTo>
-                    <a:cubicBezTo>
-                      <a:pt x="-5394" y="438975"/>
-                      <a:pt x="21060" y="197410"/>
-                      <a:pt x="0" y="0"/>
-                    </a:cubicBezTo>
-                    <a:close/>
-                  </a:path>
-                </a:pathLst>
-              </a:custGeom>
-              <a:noFill/>
-              <a:ln w="25400">
-                <a:solidFill>
-                  <a:schemeClr val="tx1"/>
-                </a:solidFill>
-                <a:extLst>
-                  <a:ext uri="{C807C97D-BFC1-408E-A445-0C87EB9F89A2}">
-                    <ask:lineSketchStyleProps xmlns:ask="http://schemas.microsoft.com/office/drawing/2018/sketchyshapes" sd="1219033472">
-                      <a:prstGeom prst="rect">
-                        <a:avLst/>
-                      </a:prstGeom>
-                      <ask:type>
-                        <ask:lineSketchFreehand/>
-                      </ask:type>
-                    </ask:lineSketchStyleProps>
-                  </a:ext>
-                </a:extLst>
-              </a:ln>
-            </p:spPr>
-            <p:style>
-              <a:lnRef idx="2">
-                <a:schemeClr val="accent1">
-                  <a:shade val="15000"/>
-                </a:schemeClr>
-              </a:lnRef>
-              <a:fillRef idx="1">
-                <a:schemeClr val="accent1"/>
-              </a:fillRef>
-              <a:effectRef idx="0">
-                <a:schemeClr val="accent1"/>
-              </a:effectRef>
-              <a:fontRef idx="minor">
-                <a:schemeClr val="lt1"/>
-              </a:fontRef>
-            </p:style>
-            <p:txBody>
-              <a:bodyPr rtlCol="0" anchor="ctr"/>
-              <a:lstStyle/>
-              <a:p>
-                <a:pPr algn="ctr"/>
-                <a:endParaRPr lang="en-US" sz="2229">
-                  <a:solidFill>
-                    <a:schemeClr val="bg1">
-                      <a:lumMod val="65000"/>
-                    </a:schemeClr>
-                  </a:solidFill>
-                </a:endParaRPr>
-              </a:p>
-            </p:txBody>
-          </p:sp>
-          <p:cxnSp>
-            <p:nvCxnSpPr>
-              <p:cNvPr id="26" name="Straight Connector 25">
-                <a:extLst>
-                  <a:ext uri="{FF2B5EF4-FFF2-40B4-BE49-F238E27FC236}">
-                    <a16:creationId xmlns:a16="http://schemas.microsoft.com/office/drawing/2014/main" id="{D66AC27D-B429-2C64-1CB1-4E16FBF1C232}"/>
-                  </a:ext>
-                </a:extLst>
-              </p:cNvPr>
-              <p:cNvCxnSpPr>
-                <a:cxnSpLocks/>
-              </p:cNvCxnSpPr>
-              <p:nvPr/>
-            </p:nvCxnSpPr>
-            <p:spPr>
-              <a:xfrm flipH="1">
-                <a:off x="4993885" y="4799489"/>
-                <a:ext cx="6705679" cy="17685"/>
-              </a:xfrm>
-              <a:prstGeom prst="line">
-                <a:avLst/>
-              </a:prstGeom>
-              <a:ln w="25400">
-                <a:solidFill>
-                  <a:schemeClr val="tx1"/>
-                </a:solidFill>
-              </a:ln>
-            </p:spPr>
-            <p:style>
-              <a:lnRef idx="1">
-                <a:schemeClr val="accent1"/>
-              </a:lnRef>
-              <a:fillRef idx="0">
-                <a:schemeClr val="accent1"/>
-              </a:fillRef>
-              <a:effectRef idx="0">
-                <a:schemeClr val="accent1"/>
-              </a:effectRef>
-              <a:fontRef idx="minor">
-                <a:schemeClr val="tx1"/>
-              </a:fontRef>
-            </p:style>
-          </p:cxnSp>
-          <p:sp>
-            <p:nvSpPr>
-              <p:cNvPr id="31" name="TextBox 30">
-                <a:extLst>
-                  <a:ext uri="{FF2B5EF4-FFF2-40B4-BE49-F238E27FC236}">
-                    <a16:creationId xmlns:a16="http://schemas.microsoft.com/office/drawing/2014/main" id="{A3B4A587-7240-6AD2-F254-3221EEE6D709}"/>
-                  </a:ext>
-                </a:extLst>
-              </p:cNvPr>
-              <p:cNvSpPr txBox="1"/>
-              <p:nvPr/>
-            </p:nvSpPr>
-            <p:spPr>
-              <a:xfrm>
-                <a:off x="5830910" y="4429523"/>
-                <a:ext cx="1689764" cy="452076"/>
-              </a:xfrm>
-              <a:prstGeom prst="rect">
-                <a:avLst/>
-              </a:prstGeom>
-              <a:noFill/>
-            </p:spPr>
-            <p:txBody>
-              <a:bodyPr wrap="none" rtlCol="0">
-                <a:spAutoFit/>
-              </a:bodyPr>
-              <a:lstStyle/>
-              <a:p>
-                <a:r>
-                  <a:rPr lang="en-US" dirty="0">
-                    <a:latin typeface="Gaegu" pitchFamily="2" charset="0"/>
-                  </a:rPr>
-                  <a:t>Terminal</a:t>
-                </a:r>
-              </a:p>
-            </p:txBody>
-          </p:sp>
-        </p:grpSp>
-        <p:sp>
-          <p:nvSpPr>
-            <p:cNvPr id="58" name="Rectangle 57">
-              <a:extLst>
-                <a:ext uri="{FF2B5EF4-FFF2-40B4-BE49-F238E27FC236}">
-                  <a16:creationId xmlns:a16="http://schemas.microsoft.com/office/drawing/2014/main" id="{185C1771-9148-68B9-A280-04E3AC16818D}"/>
-                </a:ext>
-              </a:extLst>
-            </p:cNvPr>
-            <p:cNvSpPr/>
-            <p:nvPr/>
-          </p:nvSpPr>
-          <p:spPr>
-            <a:xfrm>
-              <a:off x="1949880" y="721827"/>
-              <a:ext cx="286544" cy="35418"/>
-            </a:xfrm>
-            <a:prstGeom prst="rect">
-              <a:avLst/>
-            </a:prstGeom>
-            <a:noFill/>
-            <a:ln>
-              <a:noFill/>
-            </a:ln>
-          </p:spPr>
-          <p:style>
-            <a:lnRef idx="2">
-              <a:schemeClr val="accent1">
-                <a:shade val="15000"/>
-              </a:schemeClr>
-            </a:lnRef>
-            <a:fillRef idx="1">
-              <a:schemeClr val="accent1"/>
-            </a:fillRef>
-            <a:effectRef idx="0">
-              <a:schemeClr val="accent1"/>
-            </a:effectRef>
-            <a:fontRef idx="minor">
-              <a:schemeClr val="lt1"/>
-            </a:fontRef>
-          </p:style>
-          <p:txBody>
-            <a:bodyPr rtlCol="0" anchor="ctr"/>
-            <a:lstStyle/>
-            <a:p>
-              <a:pPr algn="ctr"/>
-              <a:endParaRPr lang="en-US"/>
-            </a:p>
-          </p:txBody>
-        </p:sp>
-        <p:grpSp>
-          <p:nvGrpSpPr>
-            <p:cNvPr id="14" name="Group 13">
-              <a:extLst>
-                <a:ext uri="{FF2B5EF4-FFF2-40B4-BE49-F238E27FC236}">
-                  <a16:creationId xmlns:a16="http://schemas.microsoft.com/office/drawing/2014/main" id="{CF99B1D7-71EB-E496-288D-D8E0582D3C14}"/>
-                </a:ext>
-              </a:extLst>
-            </p:cNvPr>
-            <p:cNvGrpSpPr/>
-            <p:nvPr/>
-          </p:nvGrpSpPr>
-          <p:grpSpPr>
-            <a:xfrm>
-              <a:off x="253104" y="248521"/>
-              <a:ext cx="1625602" cy="523220"/>
-              <a:chOff x="-417390" y="3448889"/>
-              <a:chExt cx="1625602" cy="523221"/>
-            </a:xfrm>
-          </p:grpSpPr>
-          <p:sp>
-            <p:nvSpPr>
-              <p:cNvPr id="15" name="TextBox 14">
-                <a:extLst>
-                  <a:ext uri="{FF2B5EF4-FFF2-40B4-BE49-F238E27FC236}">
-                    <a16:creationId xmlns:a16="http://schemas.microsoft.com/office/drawing/2014/main" id="{1F26C3E5-5F49-EEF2-7A70-013C462FCF7D}"/>
-                  </a:ext>
-                </a:extLst>
-              </p:cNvPr>
-              <p:cNvSpPr txBox="1"/>
-              <p:nvPr/>
-            </p:nvSpPr>
-            <p:spPr>
-              <a:xfrm>
-                <a:off x="-417390" y="3448889"/>
-                <a:ext cx="788999" cy="523221"/>
-              </a:xfrm>
-              <a:prstGeom prst="rect">
-                <a:avLst/>
-              </a:prstGeom>
-              <a:noFill/>
-            </p:spPr>
-            <p:txBody>
-              <a:bodyPr wrap="none" rtlCol="0">
-                <a:spAutoFit/>
-              </a:bodyPr>
-              <a:lstStyle/>
-              <a:p>
-                <a:r>
-                  <a:rPr lang="en-US" sz="1400" dirty="0"/>
-                  <a:t>Program</a:t>
-                </a:r>
-              </a:p>
-              <a:p>
-                <a:r>
-                  <a:rPr lang="en-US" sz="1400" dirty="0"/>
-                  <a:t>Counter</a:t>
-                </a:r>
-              </a:p>
-            </p:txBody>
-          </p:sp>
-          <p:sp>
-            <p:nvSpPr>
-              <p:cNvPr id="17" name="Rectangle 16">
-                <a:extLst>
-                  <a:ext uri="{FF2B5EF4-FFF2-40B4-BE49-F238E27FC236}">
-                    <a16:creationId xmlns:a16="http://schemas.microsoft.com/office/drawing/2014/main" id="{EB0EE411-0245-D51A-35B4-5FF329DF6E34}"/>
-                  </a:ext>
-                </a:extLst>
-              </p:cNvPr>
-              <p:cNvSpPr/>
-              <p:nvPr/>
-            </p:nvSpPr>
-            <p:spPr>
-              <a:xfrm>
-                <a:off x="353918" y="3559875"/>
-                <a:ext cx="854294" cy="307777"/>
-              </a:xfrm>
-              <a:custGeom>
-                <a:avLst/>
-                <a:gdLst>
-                  <a:gd name="connsiteX0" fmla="*/ 0 w 854294"/>
-                  <a:gd name="connsiteY0" fmla="*/ 0 h 307777"/>
-                  <a:gd name="connsiteX1" fmla="*/ 418604 w 854294"/>
-                  <a:gd name="connsiteY1" fmla="*/ 0 h 307777"/>
-                  <a:gd name="connsiteX2" fmla="*/ 854294 w 854294"/>
-                  <a:gd name="connsiteY2" fmla="*/ 0 h 307777"/>
-                  <a:gd name="connsiteX3" fmla="*/ 854294 w 854294"/>
-                  <a:gd name="connsiteY3" fmla="*/ 307777 h 307777"/>
-                  <a:gd name="connsiteX4" fmla="*/ 427147 w 854294"/>
-                  <a:gd name="connsiteY4" fmla="*/ 307777 h 307777"/>
-                  <a:gd name="connsiteX5" fmla="*/ 0 w 854294"/>
-                  <a:gd name="connsiteY5" fmla="*/ 307777 h 307777"/>
-                  <a:gd name="connsiteX6" fmla="*/ 0 w 854294"/>
-                  <a:gd name="connsiteY6" fmla="*/ 0 h 307777"/>
-                </a:gdLst>
-                <a:ahLst/>
-                <a:cxnLst>
-                  <a:cxn ang="0">
-                    <a:pos x="connsiteX0" y="connsiteY0"/>
-                  </a:cxn>
-                  <a:cxn ang="0">
-                    <a:pos x="connsiteX1" y="connsiteY1"/>
-                  </a:cxn>
-                  <a:cxn ang="0">
-                    <a:pos x="connsiteX2" y="connsiteY2"/>
-                  </a:cxn>
-                  <a:cxn ang="0">
-                    <a:pos x="connsiteX3" y="connsiteY3"/>
-                  </a:cxn>
-                  <a:cxn ang="0">
-                    <a:pos x="connsiteX4" y="connsiteY4"/>
-                  </a:cxn>
-                  <a:cxn ang="0">
-                    <a:pos x="connsiteX5" y="connsiteY5"/>
-                  </a:cxn>
-                  <a:cxn ang="0">
-                    <a:pos x="connsiteX6" y="connsiteY6"/>
-                  </a:cxn>
-                </a:cxnLst>
-                <a:rect l="l" t="t" r="r" b="b"/>
-                <a:pathLst>
-                  <a:path w="854294" h="307777" extrusionOk="0">
-                    <a:moveTo>
-                      <a:pt x="0" y="0"/>
-                    </a:moveTo>
-                    <a:cubicBezTo>
-                      <a:pt x="173209" y="4046"/>
-                      <a:pt x="303085" y="10214"/>
-                      <a:pt x="418604" y="0"/>
-                    </a:cubicBezTo>
-                    <a:cubicBezTo>
-                      <a:pt x="534123" y="-10214"/>
-                      <a:pt x="722488" y="-9036"/>
-                      <a:pt x="854294" y="0"/>
-                    </a:cubicBezTo>
-                    <a:cubicBezTo>
-                      <a:pt x="843460" y="62246"/>
-                      <a:pt x="843276" y="219189"/>
-                      <a:pt x="854294" y="307777"/>
-                    </a:cubicBezTo>
-                    <a:cubicBezTo>
-                      <a:pt x="762963" y="302806"/>
-                      <a:pt x="592541" y="323160"/>
-                      <a:pt x="427147" y="307777"/>
-                    </a:cubicBezTo>
-                    <a:cubicBezTo>
-                      <a:pt x="261753" y="292394"/>
-                      <a:pt x="133192" y="320592"/>
-                      <a:pt x="0" y="307777"/>
-                    </a:cubicBezTo>
-                    <a:cubicBezTo>
-                      <a:pt x="9866" y="171271"/>
-                      <a:pt x="-8953" y="65853"/>
-                      <a:pt x="0" y="0"/>
-                    </a:cubicBezTo>
-                    <a:close/>
-                  </a:path>
-                </a:pathLst>
-              </a:custGeom>
-              <a:noFill/>
-              <a:ln w="25400">
-                <a:solidFill>
-                  <a:schemeClr val="tx1"/>
-                </a:solidFill>
-                <a:extLst>
-                  <a:ext uri="{C807C97D-BFC1-408E-A445-0C87EB9F89A2}">
-                    <ask:lineSketchStyleProps xmlns:ask="http://schemas.microsoft.com/office/drawing/2018/sketchyshapes" sd="1219033472">
-                      <a:prstGeom prst="rect">
-                        <a:avLst/>
-                      </a:prstGeom>
-                      <ask:type>
-                        <ask:lineSketchFreehand/>
-                      </ask:type>
-                    </ask:lineSketchStyleProps>
-                  </a:ext>
-                </a:extLst>
-              </a:ln>
-            </p:spPr>
-            <p:style>
-              <a:lnRef idx="2">
-                <a:schemeClr val="accent1">
-                  <a:shade val="15000"/>
-                </a:schemeClr>
-              </a:lnRef>
-              <a:fillRef idx="1">
-                <a:schemeClr val="accent1"/>
-              </a:fillRef>
-              <a:effectRef idx="0">
-                <a:schemeClr val="accent1"/>
-              </a:effectRef>
-              <a:fontRef idx="minor">
-                <a:schemeClr val="lt1"/>
-              </a:fontRef>
-            </p:style>
-            <p:txBody>
-              <a:bodyPr rtlCol="0" anchor="ctr"/>
-              <a:lstStyle/>
-              <a:p>
-                <a:pPr algn="ctr"/>
-                <a:endParaRPr lang="en-US">
-                  <a:solidFill>
-                    <a:schemeClr val="tx1"/>
-                  </a:solidFill>
-                </a:endParaRPr>
-              </a:p>
-            </p:txBody>
-          </p:sp>
-        </p:grpSp>
-        <p:sp>
-          <p:nvSpPr>
-            <p:cNvPr id="38" name="Rectangle 37">
-              <a:extLst>
-                <a:ext uri="{FF2B5EF4-FFF2-40B4-BE49-F238E27FC236}">
-                  <a16:creationId xmlns:a16="http://schemas.microsoft.com/office/drawing/2014/main" id="{A6064B66-0AE2-BB50-3D9F-9AC965129215}"/>
-                </a:ext>
-              </a:extLst>
-            </p:cNvPr>
-            <p:cNvSpPr/>
-            <p:nvPr/>
-          </p:nvSpPr>
-          <p:spPr>
-            <a:xfrm>
-              <a:off x="243333" y="251717"/>
-              <a:ext cx="3005859" cy="1514400"/>
-            </a:xfrm>
-            <a:custGeom>
-              <a:avLst/>
-              <a:gdLst>
-                <a:gd name="connsiteX0" fmla="*/ 0 w 3005859"/>
-                <a:gd name="connsiteY0" fmla="*/ 0 h 1514400"/>
-                <a:gd name="connsiteX1" fmla="*/ 571113 w 3005859"/>
-                <a:gd name="connsiteY1" fmla="*/ 0 h 1514400"/>
-                <a:gd name="connsiteX2" fmla="*/ 1082109 w 3005859"/>
-                <a:gd name="connsiteY2" fmla="*/ 0 h 1514400"/>
-                <a:gd name="connsiteX3" fmla="*/ 1743398 w 3005859"/>
-                <a:gd name="connsiteY3" fmla="*/ 0 h 1514400"/>
-                <a:gd name="connsiteX4" fmla="*/ 2314511 w 3005859"/>
-                <a:gd name="connsiteY4" fmla="*/ 0 h 1514400"/>
-                <a:gd name="connsiteX5" fmla="*/ 3005859 w 3005859"/>
-                <a:gd name="connsiteY5" fmla="*/ 0 h 1514400"/>
-                <a:gd name="connsiteX6" fmla="*/ 3005859 w 3005859"/>
-                <a:gd name="connsiteY6" fmla="*/ 535088 h 1514400"/>
-                <a:gd name="connsiteX7" fmla="*/ 3005859 w 3005859"/>
-                <a:gd name="connsiteY7" fmla="*/ 1039888 h 1514400"/>
-                <a:gd name="connsiteX8" fmla="*/ 3005859 w 3005859"/>
-                <a:gd name="connsiteY8" fmla="*/ 1514400 h 1514400"/>
-                <a:gd name="connsiteX9" fmla="*/ 2464804 w 3005859"/>
-                <a:gd name="connsiteY9" fmla="*/ 1514400 h 1514400"/>
-                <a:gd name="connsiteX10" fmla="*/ 1863633 w 3005859"/>
-                <a:gd name="connsiteY10" fmla="*/ 1514400 h 1514400"/>
-                <a:gd name="connsiteX11" fmla="*/ 1262461 w 3005859"/>
-                <a:gd name="connsiteY11" fmla="*/ 1514400 h 1514400"/>
-                <a:gd name="connsiteX12" fmla="*/ 691348 w 3005859"/>
-                <a:gd name="connsiteY12" fmla="*/ 1514400 h 1514400"/>
-                <a:gd name="connsiteX13" fmla="*/ 0 w 3005859"/>
-                <a:gd name="connsiteY13" fmla="*/ 1514400 h 1514400"/>
-                <a:gd name="connsiteX14" fmla="*/ 0 w 3005859"/>
-                <a:gd name="connsiteY14" fmla="*/ 979312 h 1514400"/>
-                <a:gd name="connsiteX15" fmla="*/ 0 w 3005859"/>
-                <a:gd name="connsiteY15" fmla="*/ 444224 h 1514400"/>
-                <a:gd name="connsiteX16" fmla="*/ 0 w 3005859"/>
-                <a:gd name="connsiteY16" fmla="*/ 0 h 1514400"/>
-              </a:gdLst>
-              <a:ahLst/>
-              <a:cxnLst>
-                <a:cxn ang="0">
-                  <a:pos x="connsiteX0" y="connsiteY0"/>
-                </a:cxn>
-                <a:cxn ang="0">
-                  <a:pos x="connsiteX1" y="connsiteY1"/>
-                </a:cxn>
-                <a:cxn ang="0">
-                  <a:pos x="connsiteX2" y="connsiteY2"/>
-                </a:cxn>
-                <a:cxn ang="0">
-                  <a:pos x="connsiteX3" y="connsiteY3"/>
-                </a:cxn>
-                <a:cxn ang="0">
-                  <a:pos x="connsiteX4" y="connsiteY4"/>
-                </a:cxn>
-                <a:cxn ang="0">
-                  <a:pos x="connsiteX5" y="connsiteY5"/>
-                </a:cxn>
-                <a:cxn ang="0">
-                  <a:pos x="connsiteX6" y="connsiteY6"/>
-                </a:cxn>
-                <a:cxn ang="0">
-                  <a:pos x="connsiteX7" y="connsiteY7"/>
-                </a:cxn>
-                <a:cxn ang="0">
-                  <a:pos x="connsiteX8" y="connsiteY8"/>
-                </a:cxn>
-                <a:cxn ang="0">
-                  <a:pos x="connsiteX9" y="connsiteY9"/>
-                </a:cxn>
-                <a:cxn ang="0">
-                  <a:pos x="connsiteX10" y="connsiteY10"/>
-                </a:cxn>
-                <a:cxn ang="0">
-                  <a:pos x="connsiteX11" y="connsiteY11"/>
-                </a:cxn>
-                <a:cxn ang="0">
-                  <a:pos x="connsiteX12" y="connsiteY12"/>
-                </a:cxn>
-                <a:cxn ang="0">
-                  <a:pos x="connsiteX13" y="connsiteY13"/>
-                </a:cxn>
-                <a:cxn ang="0">
-                  <a:pos x="connsiteX14" y="connsiteY14"/>
-                </a:cxn>
-                <a:cxn ang="0">
-                  <a:pos x="connsiteX15" y="connsiteY15"/>
-                </a:cxn>
-                <a:cxn ang="0">
-                  <a:pos x="connsiteX16" y="connsiteY16"/>
-                </a:cxn>
-              </a:cxnLst>
-              <a:rect l="l" t="t" r="r" b="b"/>
-              <a:pathLst>
-                <a:path w="3005859" h="1514400" extrusionOk="0">
-                  <a:moveTo>
-                    <a:pt x="0" y="0"/>
-                  </a:moveTo>
-                  <a:cubicBezTo>
-                    <a:pt x="202126" y="629"/>
-                    <a:pt x="373438" y="-24313"/>
-                    <a:pt x="571113" y="0"/>
-                  </a:cubicBezTo>
-                  <a:cubicBezTo>
-                    <a:pt x="768788" y="24313"/>
-                    <a:pt x="943630" y="5247"/>
-                    <a:pt x="1082109" y="0"/>
-                  </a:cubicBezTo>
-                  <a:cubicBezTo>
-                    <a:pt x="1220588" y="-5247"/>
-                    <a:pt x="1567048" y="1888"/>
-                    <a:pt x="1743398" y="0"/>
-                  </a:cubicBezTo>
-                  <a:cubicBezTo>
-                    <a:pt x="1919748" y="-1888"/>
-                    <a:pt x="2096828" y="-18556"/>
-                    <a:pt x="2314511" y="0"/>
-                  </a:cubicBezTo>
-                  <a:cubicBezTo>
-                    <a:pt x="2532194" y="18556"/>
-                    <a:pt x="2773515" y="-30998"/>
-                    <a:pt x="3005859" y="0"/>
-                  </a:cubicBezTo>
-                  <a:cubicBezTo>
-                    <a:pt x="2997379" y="230008"/>
-                    <a:pt x="3001612" y="302463"/>
-                    <a:pt x="3005859" y="535088"/>
-                  </a:cubicBezTo>
-                  <a:cubicBezTo>
-                    <a:pt x="3010106" y="767713"/>
-                    <a:pt x="3006570" y="904903"/>
-                    <a:pt x="3005859" y="1039888"/>
-                  </a:cubicBezTo>
-                  <a:cubicBezTo>
-                    <a:pt x="3005148" y="1174873"/>
-                    <a:pt x="3021108" y="1279206"/>
-                    <a:pt x="3005859" y="1514400"/>
-                  </a:cubicBezTo>
-                  <a:cubicBezTo>
-                    <a:pt x="2840317" y="1526862"/>
-                    <a:pt x="2604091" y="1520043"/>
-                    <a:pt x="2464804" y="1514400"/>
-                  </a:cubicBezTo>
-                  <a:cubicBezTo>
-                    <a:pt x="2325518" y="1508757"/>
-                    <a:pt x="2096952" y="1510517"/>
-                    <a:pt x="1863633" y="1514400"/>
-                  </a:cubicBezTo>
-                  <a:cubicBezTo>
-                    <a:pt x="1630314" y="1518283"/>
-                    <a:pt x="1483968" y="1498091"/>
-                    <a:pt x="1262461" y="1514400"/>
-                  </a:cubicBezTo>
-                  <a:cubicBezTo>
-                    <a:pt x="1040954" y="1530709"/>
-                    <a:pt x="918307" y="1492735"/>
-                    <a:pt x="691348" y="1514400"/>
-                  </a:cubicBezTo>
-                  <a:cubicBezTo>
-                    <a:pt x="464389" y="1536065"/>
-                    <a:pt x="305996" y="1532919"/>
-                    <a:pt x="0" y="1514400"/>
-                  </a:cubicBezTo>
-                  <a:cubicBezTo>
-                    <a:pt x="-10481" y="1399660"/>
-                    <a:pt x="-23453" y="1212697"/>
-                    <a:pt x="0" y="979312"/>
-                  </a:cubicBezTo>
-                  <a:cubicBezTo>
-                    <a:pt x="23453" y="745927"/>
-                    <a:pt x="24094" y="557585"/>
-                    <a:pt x="0" y="444224"/>
-                  </a:cubicBezTo>
-                  <a:cubicBezTo>
-                    <a:pt x="-24094" y="330863"/>
-                    <a:pt x="18100" y="208625"/>
-                    <a:pt x="0" y="0"/>
-                  </a:cubicBezTo>
-                  <a:close/>
-                </a:path>
-              </a:pathLst>
-            </a:custGeom>
-            <a:noFill/>
-            <a:ln w="25400">
-              <a:solidFill>
-                <a:schemeClr val="tx1"/>
-              </a:solidFill>
-              <a:extLst>
-                <a:ext uri="{C807C97D-BFC1-408E-A445-0C87EB9F89A2}">
-                  <ask:lineSketchStyleProps xmlns:ask="http://schemas.microsoft.com/office/drawing/2018/sketchyshapes" sd="1219033472">
-                    <a:prstGeom prst="rect">
-                      <a:avLst/>
-                    </a:prstGeom>
-                    <ask:type>
-                      <ask:lineSketchFreehand/>
-                    </ask:type>
-                  </ask:lineSketchStyleProps>
-                </a:ext>
-              </a:extLst>
-            </a:ln>
-          </p:spPr>
-          <p:style>
-            <a:lnRef idx="2">
-              <a:schemeClr val="accent1">
-                <a:shade val="15000"/>
-              </a:schemeClr>
-            </a:lnRef>
-            <a:fillRef idx="1">
-              <a:schemeClr val="accent1"/>
-            </a:fillRef>
-            <a:effectRef idx="0">
-              <a:schemeClr val="accent1"/>
-            </a:effectRef>
-            <a:fontRef idx="minor">
-              <a:schemeClr val="lt1"/>
-            </a:fontRef>
-          </p:style>
-          <p:txBody>
-            <a:bodyPr rtlCol="0" anchor="ctr"/>
-            <a:lstStyle/>
-            <a:p>
-              <a:pPr algn="ctr"/>
-              <a:endParaRPr lang="en-US" sz="2229" dirty="0"/>
-            </a:p>
-          </p:txBody>
-        </p:sp>
-        <p:pic>
-          <p:nvPicPr>
-            <p:cNvPr id="63" name="Picture 62">
-              <a:extLst>
-                <a:ext uri="{FF2B5EF4-FFF2-40B4-BE49-F238E27FC236}">
-                  <a16:creationId xmlns:a16="http://schemas.microsoft.com/office/drawing/2014/main" id="{329DC273-B102-9F5D-CEA3-63DE1E27CDEF}"/>
-                </a:ext>
-              </a:extLst>
-            </p:cNvPr>
-            <p:cNvPicPr>
-              <a:picLocks noChangeAspect="1"/>
-            </p:cNvPicPr>
-            <p:nvPr/>
-          </p:nvPicPr>
-          <p:blipFill>
-            <a:blip r:embed="rId4">
-              <a:alphaModFix/>
-            </a:blip>
-            <a:stretch>
-              <a:fillRect/>
-            </a:stretch>
-          </p:blipFill>
-          <p:spPr>
-            <a:xfrm>
-              <a:off x="3432106" y="294495"/>
-              <a:ext cx="426016" cy="152400"/>
-            </a:xfrm>
-            <a:prstGeom prst="rect">
-              <a:avLst/>
-            </a:prstGeom>
-          </p:spPr>
-        </p:pic>
-        <p:sp>
-          <p:nvSpPr>
-            <p:cNvPr id="11" name="TextBox 10">
-              <a:extLst>
-                <a:ext uri="{FF2B5EF4-FFF2-40B4-BE49-F238E27FC236}">
-                  <a16:creationId xmlns:a16="http://schemas.microsoft.com/office/drawing/2014/main" id="{6CB480FE-B0D2-3A3F-FD56-1E9784092FA6}"/>
-                </a:ext>
-              </a:extLst>
-            </p:cNvPr>
-            <p:cNvSpPr txBox="1"/>
-            <p:nvPr/>
-          </p:nvSpPr>
-          <p:spPr>
-            <a:xfrm>
-              <a:off x="6320882" y="-2890187"/>
-              <a:ext cx="923651" cy="369332"/>
-            </a:xfrm>
-            <a:prstGeom prst="rect">
-              <a:avLst/>
-            </a:prstGeom>
-            <a:noFill/>
-          </p:spPr>
-          <p:txBody>
-            <a:bodyPr wrap="none" rtlCol="0">
-              <a:spAutoFit/>
-            </a:bodyPr>
-            <a:lstStyle/>
-            <a:p>
-              <a:r>
-                <a:rPr lang="en-US" dirty="0">
-                  <a:latin typeface="Gaegu" pitchFamily="2" charset="0"/>
-                </a:rPr>
-                <a:t>Memory</a:t>
-              </a:r>
-            </a:p>
-          </p:txBody>
-        </p:sp>
-      </p:grpSp>
-      <p:cxnSp>
-        <p:nvCxnSpPr>
-          <p:cNvPr id="41" name="Straight Connector 40">
-            <a:extLst>
-              <a:ext uri="{FF2B5EF4-FFF2-40B4-BE49-F238E27FC236}">
-                <a16:creationId xmlns:a16="http://schemas.microsoft.com/office/drawing/2014/main" id="{B3456096-EE7B-1111-014A-49B3A909CAC4}"/>
-              </a:ext>
-            </a:extLst>
-          </p:cNvPr>
-          <p:cNvCxnSpPr>
-            <a:cxnSpLocks/>
-          </p:cNvCxnSpPr>
-          <p:nvPr/>
-        </p:nvCxnSpPr>
-        <p:spPr>
-          <a:xfrm flipV="1">
-            <a:off x="3409307" y="3929007"/>
-            <a:ext cx="0" cy="190857"/>
-          </a:xfrm>
-          <a:prstGeom prst="line">
-            <a:avLst/>
-          </a:prstGeom>
-          <a:ln w="25400">
-            <a:solidFill>
-              <a:schemeClr val="tx1"/>
-            </a:solidFill>
-          </a:ln>
-        </p:spPr>
-        <p:style>
-          <a:lnRef idx="1">
-            <a:schemeClr val="accent1"/>
-          </a:lnRef>
-          <a:fillRef idx="0">
-            <a:schemeClr val="accent1"/>
-          </a:fillRef>
-          <a:effectRef idx="0">
-            <a:schemeClr val="accent1"/>
-          </a:effectRef>
-          <a:fontRef idx="minor">
-            <a:schemeClr val="tx1"/>
-          </a:fontRef>
-        </p:style>
-      </p:cxnSp>
-      <p:sp>
-        <p:nvSpPr>
-          <p:cNvPr id="19" name="TextBox 18">
-            <a:extLst>
-              <a:ext uri="{FF2B5EF4-FFF2-40B4-BE49-F238E27FC236}">
-                <a16:creationId xmlns:a16="http://schemas.microsoft.com/office/drawing/2014/main" id="{E1906366-7521-EF04-8057-97DA7615E630}"/>
-              </a:ext>
-            </a:extLst>
-          </p:cNvPr>
-          <p:cNvSpPr txBox="1"/>
-          <p:nvPr/>
-        </p:nvSpPr>
-        <p:spPr>
-          <a:xfrm>
-            <a:off x="161403" y="220542"/>
-            <a:ext cx="4829319" cy="369332"/>
-          </a:xfrm>
-          <a:prstGeom prst="rect">
-            <a:avLst/>
-          </a:prstGeom>
-          <a:noFill/>
-        </p:spPr>
-        <p:txBody>
-          <a:bodyPr wrap="square">
-            <a:spAutoFit/>
-          </a:bodyPr>
-          <a:lstStyle/>
-          <a:p>
-            <a:r>
-              <a:rPr lang="en-US" dirty="0">
-                <a:latin typeface="Gaegu" pitchFamily="2" charset="0"/>
-              </a:rPr>
-              <a:t>Sequence in Method Call</a:t>
-            </a:r>
-            <a:endParaRPr lang="en-US" b="1" dirty="0"/>
-          </a:p>
-        </p:txBody>
-      </p:sp>
       <p:grpSp>
         <p:nvGrpSpPr>
           <p:cNvPr id="20" name="Group 19">
@@ -8710,7 +5793,7 @@
           <p:cNvPr id="4" name="TextBox 3">
             <a:extLst>
               <a:ext uri="{FF2B5EF4-FFF2-40B4-BE49-F238E27FC236}">
-                <a16:creationId xmlns:a16="http://schemas.microsoft.com/office/drawing/2014/main" id="{1A883F54-FB1F-3CE8-0891-A30AA89BC2CE}"/>
+                <a16:creationId xmlns:a16="http://schemas.microsoft.com/office/drawing/2014/main" id="{8B30C209-F8C5-CD43-35DB-A5699C8E4CC3}"/>
               </a:ext>
             </a:extLst>
           </p:cNvPr>
@@ -8736,8 +5819,8 @@
             <a:r>
               <a:rPr lang="en-AU" sz="1800" dirty="0">
                 <a:solidFill>
-                  <a:schemeClr val="accent2">
-                    <a:lumMod val="75000"/>
+                  <a:schemeClr val="bg1">
+                    <a:lumMod val="65000"/>
                   </a:schemeClr>
                 </a:solidFill>
               </a:rPr>
@@ -8746,442 +5829,10 @@
           </a:p>
         </p:txBody>
       </p:sp>
-      <p:sp>
-        <p:nvSpPr>
-          <p:cNvPr id="6" name="Rectangle 5">
-            <a:extLst>
-              <a:ext uri="{FF2B5EF4-FFF2-40B4-BE49-F238E27FC236}">
-                <a16:creationId xmlns:a16="http://schemas.microsoft.com/office/drawing/2014/main" id="{3FA7F7B1-6035-F322-35C1-3D43DE61CDDF}"/>
-              </a:ext>
-            </a:extLst>
-          </p:cNvPr>
-          <p:cNvSpPr/>
-          <p:nvPr/>
-        </p:nvSpPr>
-        <p:spPr>
-          <a:xfrm>
-            <a:off x="1873436" y="609841"/>
-            <a:ext cx="1654299" cy="215009"/>
-          </a:xfrm>
-          <a:custGeom>
-            <a:avLst/>
-            <a:gdLst>
-              <a:gd name="connsiteX0" fmla="*/ 0 w 1654299"/>
-              <a:gd name="connsiteY0" fmla="*/ 0 h 215009"/>
-              <a:gd name="connsiteX1" fmla="*/ 584519 w 1654299"/>
-              <a:gd name="connsiteY1" fmla="*/ 0 h 215009"/>
-              <a:gd name="connsiteX2" fmla="*/ 1152495 w 1654299"/>
-              <a:gd name="connsiteY2" fmla="*/ 0 h 215009"/>
-              <a:gd name="connsiteX3" fmla="*/ 1654299 w 1654299"/>
-              <a:gd name="connsiteY3" fmla="*/ 0 h 215009"/>
-              <a:gd name="connsiteX4" fmla="*/ 1654299 w 1654299"/>
-              <a:gd name="connsiteY4" fmla="*/ 215009 h 215009"/>
-              <a:gd name="connsiteX5" fmla="*/ 1135952 w 1654299"/>
-              <a:gd name="connsiteY5" fmla="*/ 215009 h 215009"/>
-              <a:gd name="connsiteX6" fmla="*/ 584519 w 1654299"/>
-              <a:gd name="connsiteY6" fmla="*/ 215009 h 215009"/>
-              <a:gd name="connsiteX7" fmla="*/ 0 w 1654299"/>
-              <a:gd name="connsiteY7" fmla="*/ 215009 h 215009"/>
-              <a:gd name="connsiteX8" fmla="*/ 0 w 1654299"/>
-              <a:gd name="connsiteY8" fmla="*/ 0 h 215009"/>
-            </a:gdLst>
-            <a:ahLst/>
-            <a:cxnLst>
-              <a:cxn ang="0">
-                <a:pos x="connsiteX0" y="connsiteY0"/>
-              </a:cxn>
-              <a:cxn ang="0">
-                <a:pos x="connsiteX1" y="connsiteY1"/>
-              </a:cxn>
-              <a:cxn ang="0">
-                <a:pos x="connsiteX2" y="connsiteY2"/>
-              </a:cxn>
-              <a:cxn ang="0">
-                <a:pos x="connsiteX3" y="connsiteY3"/>
-              </a:cxn>
-              <a:cxn ang="0">
-                <a:pos x="connsiteX4" y="connsiteY4"/>
-              </a:cxn>
-              <a:cxn ang="0">
-                <a:pos x="connsiteX5" y="connsiteY5"/>
-              </a:cxn>
-              <a:cxn ang="0">
-                <a:pos x="connsiteX6" y="connsiteY6"/>
-              </a:cxn>
-              <a:cxn ang="0">
-                <a:pos x="connsiteX7" y="connsiteY7"/>
-              </a:cxn>
-              <a:cxn ang="0">
-                <a:pos x="connsiteX8" y="connsiteY8"/>
-              </a:cxn>
-            </a:cxnLst>
-            <a:rect l="l" t="t" r="r" b="b"/>
-            <a:pathLst>
-              <a:path w="1654299" h="215009" fill="none" extrusionOk="0">
-                <a:moveTo>
-                  <a:pt x="0" y="0"/>
-                </a:moveTo>
-                <a:cubicBezTo>
-                  <a:pt x="210479" y="15519"/>
-                  <a:pt x="441142" y="5848"/>
-                  <a:pt x="584519" y="0"/>
-                </a:cubicBezTo>
-                <a:cubicBezTo>
-                  <a:pt x="727896" y="-5848"/>
-                  <a:pt x="990191" y="28206"/>
-                  <a:pt x="1152495" y="0"/>
-                </a:cubicBezTo>
-                <a:cubicBezTo>
-                  <a:pt x="1314799" y="-28206"/>
-                  <a:pt x="1409920" y="-13119"/>
-                  <a:pt x="1654299" y="0"/>
-                </a:cubicBezTo>
-                <a:cubicBezTo>
-                  <a:pt x="1649031" y="80377"/>
-                  <a:pt x="1652697" y="113549"/>
-                  <a:pt x="1654299" y="215009"/>
-                </a:cubicBezTo>
-                <a:cubicBezTo>
-                  <a:pt x="1506384" y="218396"/>
-                  <a:pt x="1272831" y="229618"/>
-                  <a:pt x="1135952" y="215009"/>
-                </a:cubicBezTo>
-                <a:cubicBezTo>
-                  <a:pt x="999073" y="200400"/>
-                  <a:pt x="848198" y="226202"/>
-                  <a:pt x="584519" y="215009"/>
-                </a:cubicBezTo>
-                <a:cubicBezTo>
-                  <a:pt x="320840" y="203816"/>
-                  <a:pt x="273152" y="222675"/>
-                  <a:pt x="0" y="215009"/>
-                </a:cubicBezTo>
-                <a:cubicBezTo>
-                  <a:pt x="-2438" y="123297"/>
-                  <a:pt x="-3410" y="83469"/>
-                  <a:pt x="0" y="0"/>
-                </a:cubicBezTo>
-                <a:close/>
-              </a:path>
-              <a:path w="1654299" h="215009" stroke="0" extrusionOk="0">
-                <a:moveTo>
-                  <a:pt x="0" y="0"/>
-                </a:moveTo>
-                <a:cubicBezTo>
-                  <a:pt x="216923" y="-21430"/>
-                  <a:pt x="293677" y="-7800"/>
-                  <a:pt x="534890" y="0"/>
-                </a:cubicBezTo>
-                <a:cubicBezTo>
-                  <a:pt x="776103" y="7800"/>
-                  <a:pt x="821079" y="-7366"/>
-                  <a:pt x="1036694" y="0"/>
-                </a:cubicBezTo>
-                <a:cubicBezTo>
-                  <a:pt x="1252309" y="7366"/>
-                  <a:pt x="1442164" y="16616"/>
-                  <a:pt x="1654299" y="0"/>
-                </a:cubicBezTo>
-                <a:cubicBezTo>
-                  <a:pt x="1661184" y="67152"/>
-                  <a:pt x="1644782" y="156295"/>
-                  <a:pt x="1654299" y="215009"/>
-                </a:cubicBezTo>
-                <a:cubicBezTo>
-                  <a:pt x="1396623" y="238631"/>
-                  <a:pt x="1378947" y="202620"/>
-                  <a:pt x="1135952" y="215009"/>
-                </a:cubicBezTo>
-                <a:cubicBezTo>
-                  <a:pt x="892957" y="227398"/>
-                  <a:pt x="765362" y="229871"/>
-                  <a:pt x="551433" y="215009"/>
-                </a:cubicBezTo>
-                <a:cubicBezTo>
-                  <a:pt x="337504" y="200147"/>
-                  <a:pt x="219438" y="194351"/>
-                  <a:pt x="0" y="215009"/>
-                </a:cubicBezTo>
-                <a:cubicBezTo>
-                  <a:pt x="5572" y="114517"/>
-                  <a:pt x="-6554" y="52986"/>
-                  <a:pt x="0" y="0"/>
-                </a:cubicBezTo>
-                <a:close/>
-              </a:path>
-            </a:pathLst>
-          </a:custGeom>
-          <a:solidFill>
-            <a:schemeClr val="accent4">
-              <a:lumMod val="60000"/>
-              <a:lumOff val="40000"/>
-            </a:schemeClr>
-          </a:solidFill>
-          <a:ln w="12700">
-            <a:solidFill>
-              <a:schemeClr val="tx1"/>
-            </a:solidFill>
-            <a:extLst>
-              <a:ext uri="{C807C97D-BFC1-408E-A445-0C87EB9F89A2}">
-                <ask:lineSketchStyleProps xmlns:ask="http://schemas.microsoft.com/office/drawing/2018/sketchyshapes" sd="1219033472">
-                  <a:prstGeom prst="rect">
-                    <a:avLst/>
-                  </a:prstGeom>
-                  <ask:type>
-                    <ask:lineSketchFreehand/>
-                  </ask:type>
-                </ask:lineSketchStyleProps>
-              </a:ext>
-            </a:extLst>
-          </a:ln>
-          <a:effectLst/>
-        </p:spPr>
-        <p:style>
-          <a:lnRef idx="1">
-            <a:schemeClr val="accent4"/>
-          </a:lnRef>
-          <a:fillRef idx="2">
-            <a:schemeClr val="accent4"/>
-          </a:fillRef>
-          <a:effectRef idx="1">
-            <a:schemeClr val="accent4"/>
-          </a:effectRef>
-          <a:fontRef idx="minor">
-            <a:schemeClr val="dk1"/>
-          </a:fontRef>
-        </p:style>
-        <p:txBody>
-          <a:bodyPr rtlCol="0" anchor="ctr"/>
-          <a:lstStyle/>
-          <a:p>
-            <a:pPr algn="ctr"/>
-            <a:r>
-              <a:rPr lang="en-US" sz="1200" dirty="0"/>
-              <a:t>Call the method (1d)</a:t>
-            </a:r>
-          </a:p>
-        </p:txBody>
-      </p:sp>
-      <p:sp>
-        <p:nvSpPr>
-          <p:cNvPr id="7" name="Rectangle 6">
-            <a:extLst>
-              <a:ext uri="{FF2B5EF4-FFF2-40B4-BE49-F238E27FC236}">
-                <a16:creationId xmlns:a16="http://schemas.microsoft.com/office/drawing/2014/main" id="{5AF1C875-B150-3663-951D-C94BDC79F5D1}"/>
-              </a:ext>
-            </a:extLst>
-          </p:cNvPr>
-          <p:cNvSpPr/>
-          <p:nvPr/>
-        </p:nvSpPr>
-        <p:spPr>
-          <a:xfrm>
-            <a:off x="5311740" y="1152124"/>
-            <a:ext cx="1834064" cy="392354"/>
-          </a:xfrm>
-          <a:custGeom>
-            <a:avLst/>
-            <a:gdLst>
-              <a:gd name="connsiteX0" fmla="*/ 0 w 1834064"/>
-              <a:gd name="connsiteY0" fmla="*/ 0 h 392354"/>
-              <a:gd name="connsiteX1" fmla="*/ 648036 w 1834064"/>
-              <a:gd name="connsiteY1" fmla="*/ 0 h 392354"/>
-              <a:gd name="connsiteX2" fmla="*/ 1277731 w 1834064"/>
-              <a:gd name="connsiteY2" fmla="*/ 0 h 392354"/>
-              <a:gd name="connsiteX3" fmla="*/ 1834064 w 1834064"/>
-              <a:gd name="connsiteY3" fmla="*/ 0 h 392354"/>
-              <a:gd name="connsiteX4" fmla="*/ 1834064 w 1834064"/>
-              <a:gd name="connsiteY4" fmla="*/ 392354 h 392354"/>
-              <a:gd name="connsiteX5" fmla="*/ 1259391 w 1834064"/>
-              <a:gd name="connsiteY5" fmla="*/ 392354 h 392354"/>
-              <a:gd name="connsiteX6" fmla="*/ 648036 w 1834064"/>
-              <a:gd name="connsiteY6" fmla="*/ 392354 h 392354"/>
-              <a:gd name="connsiteX7" fmla="*/ 0 w 1834064"/>
-              <a:gd name="connsiteY7" fmla="*/ 392354 h 392354"/>
-              <a:gd name="connsiteX8" fmla="*/ 0 w 1834064"/>
-              <a:gd name="connsiteY8" fmla="*/ 0 h 392354"/>
-            </a:gdLst>
-            <a:ahLst/>
-            <a:cxnLst>
-              <a:cxn ang="0">
-                <a:pos x="connsiteX0" y="connsiteY0"/>
-              </a:cxn>
-              <a:cxn ang="0">
-                <a:pos x="connsiteX1" y="connsiteY1"/>
-              </a:cxn>
-              <a:cxn ang="0">
-                <a:pos x="connsiteX2" y="connsiteY2"/>
-              </a:cxn>
-              <a:cxn ang="0">
-                <a:pos x="connsiteX3" y="connsiteY3"/>
-              </a:cxn>
-              <a:cxn ang="0">
-                <a:pos x="connsiteX4" y="connsiteY4"/>
-              </a:cxn>
-              <a:cxn ang="0">
-                <a:pos x="connsiteX5" y="connsiteY5"/>
-              </a:cxn>
-              <a:cxn ang="0">
-                <a:pos x="connsiteX6" y="connsiteY6"/>
-              </a:cxn>
-              <a:cxn ang="0">
-                <a:pos x="connsiteX7" y="connsiteY7"/>
-              </a:cxn>
-              <a:cxn ang="0">
-                <a:pos x="connsiteX8" y="connsiteY8"/>
-              </a:cxn>
-            </a:cxnLst>
-            <a:rect l="l" t="t" r="r" b="b"/>
-            <a:pathLst>
-              <a:path w="1834064" h="392354" fill="none" extrusionOk="0">
-                <a:moveTo>
-                  <a:pt x="0" y="0"/>
-                </a:moveTo>
-                <a:cubicBezTo>
-                  <a:pt x="317532" y="-14568"/>
-                  <a:pt x="494260" y="-29177"/>
-                  <a:pt x="648036" y="0"/>
-                </a:cubicBezTo>
-                <a:cubicBezTo>
-                  <a:pt x="801812" y="29177"/>
-                  <a:pt x="1019379" y="12084"/>
-                  <a:pt x="1277731" y="0"/>
-                </a:cubicBezTo>
-                <a:cubicBezTo>
-                  <a:pt x="1536084" y="-12084"/>
-                  <a:pt x="1624210" y="2516"/>
-                  <a:pt x="1834064" y="0"/>
-                </a:cubicBezTo>
-                <a:cubicBezTo>
-                  <a:pt x="1852413" y="139008"/>
-                  <a:pt x="1851067" y="211505"/>
-                  <a:pt x="1834064" y="392354"/>
-                </a:cubicBezTo>
-                <a:cubicBezTo>
-                  <a:pt x="1567944" y="397523"/>
-                  <a:pt x="1483922" y="395226"/>
-                  <a:pt x="1259391" y="392354"/>
-                </a:cubicBezTo>
-                <a:cubicBezTo>
-                  <a:pt x="1034860" y="389482"/>
-                  <a:pt x="869967" y="370214"/>
-                  <a:pt x="648036" y="392354"/>
-                </a:cubicBezTo>
-                <a:cubicBezTo>
-                  <a:pt x="426105" y="414494"/>
-                  <a:pt x="134745" y="363167"/>
-                  <a:pt x="0" y="392354"/>
-                </a:cubicBezTo>
-                <a:cubicBezTo>
-                  <a:pt x="-11399" y="264049"/>
-                  <a:pt x="11849" y="83972"/>
-                  <a:pt x="0" y="0"/>
-                </a:cubicBezTo>
-                <a:close/>
-              </a:path>
-              <a:path w="1834064" h="392354" stroke="0" extrusionOk="0">
-                <a:moveTo>
-                  <a:pt x="0" y="0"/>
-                </a:moveTo>
-                <a:cubicBezTo>
-                  <a:pt x="218080" y="-18777"/>
-                  <a:pt x="416820" y="597"/>
-                  <a:pt x="593014" y="0"/>
-                </a:cubicBezTo>
-                <a:cubicBezTo>
-                  <a:pt x="769208" y="-597"/>
-                  <a:pt x="909263" y="-23826"/>
-                  <a:pt x="1149347" y="0"/>
-                </a:cubicBezTo>
-                <a:cubicBezTo>
-                  <a:pt x="1389431" y="23826"/>
-                  <a:pt x="1651744" y="30827"/>
-                  <a:pt x="1834064" y="0"/>
-                </a:cubicBezTo>
-                <a:cubicBezTo>
-                  <a:pt x="1835898" y="86753"/>
-                  <a:pt x="1852095" y="269327"/>
-                  <a:pt x="1834064" y="392354"/>
-                </a:cubicBezTo>
-                <a:cubicBezTo>
-                  <a:pt x="1581106" y="387087"/>
-                  <a:pt x="1392778" y="394774"/>
-                  <a:pt x="1259391" y="392354"/>
-                </a:cubicBezTo>
-                <a:cubicBezTo>
-                  <a:pt x="1126004" y="389934"/>
-                  <a:pt x="823938" y="414968"/>
-                  <a:pt x="611355" y="392354"/>
-                </a:cubicBezTo>
-                <a:cubicBezTo>
-                  <a:pt x="398772" y="369740"/>
-                  <a:pt x="259169" y="417139"/>
-                  <a:pt x="0" y="392354"/>
-                </a:cubicBezTo>
-                <a:cubicBezTo>
-                  <a:pt x="-9326" y="239827"/>
-                  <a:pt x="9089" y="102701"/>
-                  <a:pt x="0" y="0"/>
-                </a:cubicBezTo>
-                <a:close/>
-              </a:path>
-            </a:pathLst>
-          </a:custGeom>
-          <a:solidFill>
-            <a:schemeClr val="accent4">
-              <a:lumMod val="60000"/>
-              <a:lumOff val="40000"/>
-            </a:schemeClr>
-          </a:solidFill>
-          <a:ln w="12700">
-            <a:solidFill>
-              <a:schemeClr val="tx1"/>
-            </a:solidFill>
-            <a:extLst>
-              <a:ext uri="{C807C97D-BFC1-408E-A445-0C87EB9F89A2}">
-                <ask:lineSketchStyleProps xmlns:ask="http://schemas.microsoft.com/office/drawing/2018/sketchyshapes" sd="1219033472">
-                  <a:prstGeom prst="rect">
-                    <a:avLst/>
-                  </a:prstGeom>
-                  <ask:type>
-                    <ask:lineSketchFreehand/>
-                  </ask:type>
-                </ask:lineSketchStyleProps>
-              </a:ext>
-            </a:extLst>
-          </a:ln>
-          <a:effectLst/>
-        </p:spPr>
-        <p:style>
-          <a:lnRef idx="1">
-            <a:schemeClr val="accent4"/>
-          </a:lnRef>
-          <a:fillRef idx="2">
-            <a:schemeClr val="accent4"/>
-          </a:fillRef>
-          <a:effectRef idx="1">
-            <a:schemeClr val="accent4"/>
-          </a:effectRef>
-          <a:fontRef idx="minor">
-            <a:schemeClr val="dk1"/>
-          </a:fontRef>
-        </p:style>
-        <p:txBody>
-          <a:bodyPr rtlCol="0" anchor="ctr"/>
-          <a:lstStyle/>
-          <a:p>
-            <a:pPr algn="ctr"/>
-            <a:r>
-              <a:rPr lang="en-US" sz="1200" dirty="0"/>
-              <a:t>Evaluate and load the arguments (1a, 1b and 1c)</a:t>
-            </a:r>
-          </a:p>
-        </p:txBody>
-      </p:sp>
     </p:spTree>
     <p:extLst>
       <p:ext uri="{BB962C8B-B14F-4D97-AF65-F5344CB8AC3E}">
-        <p14:creationId xmlns:p14="http://schemas.microsoft.com/office/powerpoint/2010/main" val="391336855"/>
+        <p14:creationId xmlns:p14="http://schemas.microsoft.com/office/powerpoint/2010/main" val="1784227139"/>
       </p:ext>
     </p:extLst>
   </p:cSld>
@@ -9191,7 +5842,7 @@
 </p:sld>
 </file>
 
-<file path=ppt/slides/slide3.xml><?xml version="1.0" encoding="utf-8"?>
+<file path=ppt/slides/slide2.xml><?xml version="1.0" encoding="utf-8"?>
 <p:sld xmlns:a="http://schemas.openxmlformats.org/drawingml/2006/main" xmlns:r="http://schemas.openxmlformats.org/officeDocument/2006/relationships" xmlns:p="http://schemas.openxmlformats.org/presentationml/2006/main">
   <p:cSld>
     <p:bg>
@@ -11087,44 +7738,6 @@
           </a:fontRef>
         </p:style>
       </p:cxnSp>
-      <p:sp>
-        <p:nvSpPr>
-          <p:cNvPr id="19" name="TextBox 18">
-            <a:extLst>
-              <a:ext uri="{FF2B5EF4-FFF2-40B4-BE49-F238E27FC236}">
-                <a16:creationId xmlns:a16="http://schemas.microsoft.com/office/drawing/2014/main" id="{E1906366-7521-EF04-8057-97DA7615E630}"/>
-              </a:ext>
-            </a:extLst>
-          </p:cNvPr>
-          <p:cNvSpPr txBox="1"/>
-          <p:nvPr/>
-        </p:nvSpPr>
-        <p:spPr>
-          <a:xfrm>
-            <a:off x="161403" y="220542"/>
-            <a:ext cx="4829319" cy="369332"/>
-          </a:xfrm>
-          <a:prstGeom prst="rect">
-            <a:avLst/>
-          </a:prstGeom>
-          <a:noFill/>
-        </p:spPr>
-        <p:txBody>
-          <a:bodyPr wrap="square">
-            <a:spAutoFit/>
-          </a:bodyPr>
-          <a:lstStyle/>
-          <a:p>
-            <a:r>
-              <a:rPr lang="en-US" dirty="0">
-                <a:latin typeface="Gaegu" pitchFamily="2" charset="0"/>
-              </a:rPr>
-              <a:t>Sequence in Method Call</a:t>
-            </a:r>
-            <a:endParaRPr lang="en-US" b="1" dirty="0"/>
-          </a:p>
-        </p:txBody>
-      </p:sp>
       <p:grpSp>
         <p:nvGrpSpPr>
           <p:cNvPr id="20" name="Group 19">
@@ -12696,7 +9309,7 @@
 </p:sld>
 </file>
 
-<file path=ppt/slides/slide4.xml><?xml version="1.0" encoding="utf-8"?>
+<file path=ppt/slides/slide3.xml><?xml version="1.0" encoding="utf-8"?>
 <p:sld xmlns:a="http://schemas.openxmlformats.org/drawingml/2006/main" xmlns:r="http://schemas.openxmlformats.org/officeDocument/2006/relationships" xmlns:p="http://schemas.openxmlformats.org/presentationml/2006/main">
   <p:cSld>
     <p:bg>
@@ -14592,44 +11205,6 @@
           </a:fontRef>
         </p:style>
       </p:cxnSp>
-      <p:sp>
-        <p:nvSpPr>
-          <p:cNvPr id="19" name="TextBox 18">
-            <a:extLst>
-              <a:ext uri="{FF2B5EF4-FFF2-40B4-BE49-F238E27FC236}">
-                <a16:creationId xmlns:a16="http://schemas.microsoft.com/office/drawing/2014/main" id="{E1906366-7521-EF04-8057-97DA7615E630}"/>
-              </a:ext>
-            </a:extLst>
-          </p:cNvPr>
-          <p:cNvSpPr txBox="1"/>
-          <p:nvPr/>
-        </p:nvSpPr>
-        <p:spPr>
-          <a:xfrm>
-            <a:off x="161403" y="220542"/>
-            <a:ext cx="4829319" cy="369332"/>
-          </a:xfrm>
-          <a:prstGeom prst="rect">
-            <a:avLst/>
-          </a:prstGeom>
-          <a:noFill/>
-        </p:spPr>
-        <p:txBody>
-          <a:bodyPr wrap="square">
-            <a:spAutoFit/>
-          </a:bodyPr>
-          <a:lstStyle/>
-          <a:p>
-            <a:r>
-              <a:rPr lang="en-US" dirty="0">
-                <a:latin typeface="Gaegu" pitchFamily="2" charset="0"/>
-              </a:rPr>
-              <a:t>Sequence in Method Call</a:t>
-            </a:r>
-            <a:endParaRPr lang="en-US" b="1" dirty="0"/>
-          </a:p>
-        </p:txBody>
-      </p:sp>
       <p:grpSp>
         <p:nvGrpSpPr>
           <p:cNvPr id="20" name="Group 19">
@@ -16357,7 +12932,7 @@
 </p:sld>
 </file>
 
-<file path=ppt/slides/slide5.xml><?xml version="1.0" encoding="utf-8"?>
+<file path=ppt/slides/slide4.xml><?xml version="1.0" encoding="utf-8"?>
 <p:sld xmlns:a="http://schemas.openxmlformats.org/drawingml/2006/main" xmlns:r="http://schemas.openxmlformats.org/officeDocument/2006/relationships" xmlns:p="http://schemas.openxmlformats.org/presentationml/2006/main">
   <p:cSld>
     <p:bg>
@@ -18253,44 +14828,6 @@
           </a:fontRef>
         </p:style>
       </p:cxnSp>
-      <p:sp>
-        <p:nvSpPr>
-          <p:cNvPr id="19" name="TextBox 18">
-            <a:extLst>
-              <a:ext uri="{FF2B5EF4-FFF2-40B4-BE49-F238E27FC236}">
-                <a16:creationId xmlns:a16="http://schemas.microsoft.com/office/drawing/2014/main" id="{E1906366-7521-EF04-8057-97DA7615E630}"/>
-              </a:ext>
-            </a:extLst>
-          </p:cNvPr>
-          <p:cNvSpPr txBox="1"/>
-          <p:nvPr/>
-        </p:nvSpPr>
-        <p:spPr>
-          <a:xfrm>
-            <a:off x="161403" y="220542"/>
-            <a:ext cx="4829319" cy="369332"/>
-          </a:xfrm>
-          <a:prstGeom prst="rect">
-            <a:avLst/>
-          </a:prstGeom>
-          <a:noFill/>
-        </p:spPr>
-        <p:txBody>
-          <a:bodyPr wrap="square">
-            <a:spAutoFit/>
-          </a:bodyPr>
-          <a:lstStyle/>
-          <a:p>
-            <a:r>
-              <a:rPr lang="en-US" dirty="0">
-                <a:latin typeface="Gaegu" pitchFamily="2" charset="0"/>
-              </a:rPr>
-              <a:t>Sequence in Method Call</a:t>
-            </a:r>
-            <a:endParaRPr lang="en-US" b="1" dirty="0"/>
-          </a:p>
-        </p:txBody>
-      </p:sp>
       <p:grpSp>
         <p:nvGrpSpPr>
           <p:cNvPr id="20" name="Group 19">
@@ -19851,7 +16388,7 @@
 </p:sld>
 </file>
 
-<file path=ppt/slides/slide6.xml><?xml version="1.0" encoding="utf-8"?>
+<file path=ppt/slides/slide5.xml><?xml version="1.0" encoding="utf-8"?>
 <p:sld xmlns:a="http://schemas.openxmlformats.org/drawingml/2006/main" xmlns:r="http://schemas.openxmlformats.org/officeDocument/2006/relationships" xmlns:p="http://schemas.openxmlformats.org/presentationml/2006/main">
   <p:cSld>
     <p:bg>
@@ -21806,44 +18343,6 @@
           </a:fontRef>
         </p:style>
       </p:cxnSp>
-      <p:sp>
-        <p:nvSpPr>
-          <p:cNvPr id="19" name="TextBox 18">
-            <a:extLst>
-              <a:ext uri="{FF2B5EF4-FFF2-40B4-BE49-F238E27FC236}">
-                <a16:creationId xmlns:a16="http://schemas.microsoft.com/office/drawing/2014/main" id="{E1906366-7521-EF04-8057-97DA7615E630}"/>
-              </a:ext>
-            </a:extLst>
-          </p:cNvPr>
-          <p:cNvSpPr txBox="1"/>
-          <p:nvPr/>
-        </p:nvSpPr>
-        <p:spPr>
-          <a:xfrm>
-            <a:off x="161403" y="220542"/>
-            <a:ext cx="4829319" cy="369332"/>
-          </a:xfrm>
-          <a:prstGeom prst="rect">
-            <a:avLst/>
-          </a:prstGeom>
-          <a:noFill/>
-        </p:spPr>
-        <p:txBody>
-          <a:bodyPr wrap="square">
-            <a:spAutoFit/>
-          </a:bodyPr>
-          <a:lstStyle/>
-          <a:p>
-            <a:r>
-              <a:rPr lang="en-US" dirty="0">
-                <a:latin typeface="Gaegu" pitchFamily="2" charset="0"/>
-              </a:rPr>
-              <a:t>Sequence in Method Call</a:t>
-            </a:r>
-            <a:endParaRPr lang="en-US" b="1" dirty="0"/>
-          </a:p>
-        </p:txBody>
-      </p:sp>
       <p:grpSp>
         <p:nvGrpSpPr>
           <p:cNvPr id="20" name="Group 19">
@@ -23764,7 +20263,7 @@
 </p:sld>
 </file>
 
-<file path=ppt/slides/slide7.xml><?xml version="1.0" encoding="utf-8"?>
+<file path=ppt/slides/slide6.xml><?xml version="1.0" encoding="utf-8"?>
 <p:sld xmlns:a="http://schemas.openxmlformats.org/drawingml/2006/main" xmlns:r="http://schemas.openxmlformats.org/officeDocument/2006/relationships" xmlns:p="http://schemas.openxmlformats.org/presentationml/2006/main">
   <p:cSld>
     <p:bg>
@@ -25660,44 +22159,6 @@
           </a:fontRef>
         </p:style>
       </p:cxnSp>
-      <p:sp>
-        <p:nvSpPr>
-          <p:cNvPr id="19" name="TextBox 18">
-            <a:extLst>
-              <a:ext uri="{FF2B5EF4-FFF2-40B4-BE49-F238E27FC236}">
-                <a16:creationId xmlns:a16="http://schemas.microsoft.com/office/drawing/2014/main" id="{E1906366-7521-EF04-8057-97DA7615E630}"/>
-              </a:ext>
-            </a:extLst>
-          </p:cNvPr>
-          <p:cNvSpPr txBox="1"/>
-          <p:nvPr/>
-        </p:nvSpPr>
-        <p:spPr>
-          <a:xfrm>
-            <a:off x="161403" y="220542"/>
-            <a:ext cx="4829319" cy="369332"/>
-          </a:xfrm>
-          <a:prstGeom prst="rect">
-            <a:avLst/>
-          </a:prstGeom>
-          <a:noFill/>
-        </p:spPr>
-        <p:txBody>
-          <a:bodyPr wrap="square">
-            <a:spAutoFit/>
-          </a:bodyPr>
-          <a:lstStyle/>
-          <a:p>
-            <a:r>
-              <a:rPr lang="en-US" dirty="0">
-                <a:latin typeface="Gaegu" pitchFamily="2" charset="0"/>
-              </a:rPr>
-              <a:t>Sequence in Method Call</a:t>
-            </a:r>
-            <a:endParaRPr lang="en-US" b="1" dirty="0"/>
-          </a:p>
-        </p:txBody>
-      </p:sp>
       <p:grpSp>
         <p:nvGrpSpPr>
           <p:cNvPr id="20" name="Group 19">
@@ -27820,7 +24281,7 @@
 </p:sld>
 </file>
 
-<file path=ppt/slides/slide8.xml><?xml version="1.0" encoding="utf-8"?>
+<file path=ppt/slides/slide7.xml><?xml version="1.0" encoding="utf-8"?>
 <p:sld xmlns:a="http://schemas.openxmlformats.org/drawingml/2006/main" xmlns:r="http://schemas.openxmlformats.org/officeDocument/2006/relationships" xmlns:p="http://schemas.openxmlformats.org/presentationml/2006/main">
   <p:cSld>
     <p:spTree>
@@ -29702,44 +26163,6 @@
           </a:fontRef>
         </p:style>
       </p:cxnSp>
-      <p:sp>
-        <p:nvSpPr>
-          <p:cNvPr id="19" name="TextBox 18">
-            <a:extLst>
-              <a:ext uri="{FF2B5EF4-FFF2-40B4-BE49-F238E27FC236}">
-                <a16:creationId xmlns:a16="http://schemas.microsoft.com/office/drawing/2014/main" id="{E1906366-7521-EF04-8057-97DA7615E630}"/>
-              </a:ext>
-            </a:extLst>
-          </p:cNvPr>
-          <p:cNvSpPr txBox="1"/>
-          <p:nvPr/>
-        </p:nvSpPr>
-        <p:spPr>
-          <a:xfrm>
-            <a:off x="161403" y="220542"/>
-            <a:ext cx="4829319" cy="369332"/>
-          </a:xfrm>
-          <a:prstGeom prst="rect">
-            <a:avLst/>
-          </a:prstGeom>
-          <a:noFill/>
-        </p:spPr>
-        <p:txBody>
-          <a:bodyPr wrap="square">
-            <a:spAutoFit/>
-          </a:bodyPr>
-          <a:lstStyle/>
-          <a:p>
-            <a:r>
-              <a:rPr lang="en-US" dirty="0">
-                <a:latin typeface="Gaegu" pitchFamily="2" charset="0"/>
-              </a:rPr>
-              <a:t>Sequence in Method Call</a:t>
-            </a:r>
-            <a:endParaRPr lang="en-US" b="1" dirty="0"/>
-          </a:p>
-        </p:txBody>
-      </p:sp>
       <p:grpSp>
         <p:nvGrpSpPr>
           <p:cNvPr id="20" name="Group 19">
@@ -31849,7 +28272,7 @@
 </p:sld>
 </file>
 
-<file path=ppt/slides/slide9.xml><?xml version="1.0" encoding="utf-8"?>
+<file path=ppt/slides/slide8.xml><?xml version="1.0" encoding="utf-8"?>
 <p:sld xmlns:a="http://schemas.openxmlformats.org/drawingml/2006/main" xmlns:r="http://schemas.openxmlformats.org/officeDocument/2006/relationships" xmlns:p="http://schemas.openxmlformats.org/presentationml/2006/main">
   <p:cSld>
     <p:spTree>
@@ -33731,44 +30154,6 @@
           </a:fontRef>
         </p:style>
       </p:cxnSp>
-      <p:sp>
-        <p:nvSpPr>
-          <p:cNvPr id="19" name="TextBox 18">
-            <a:extLst>
-              <a:ext uri="{FF2B5EF4-FFF2-40B4-BE49-F238E27FC236}">
-                <a16:creationId xmlns:a16="http://schemas.microsoft.com/office/drawing/2014/main" id="{E1906366-7521-EF04-8057-97DA7615E630}"/>
-              </a:ext>
-            </a:extLst>
-          </p:cNvPr>
-          <p:cNvSpPr txBox="1"/>
-          <p:nvPr/>
-        </p:nvSpPr>
-        <p:spPr>
-          <a:xfrm>
-            <a:off x="161403" y="220542"/>
-            <a:ext cx="4829319" cy="369332"/>
-          </a:xfrm>
-          <a:prstGeom prst="rect">
-            <a:avLst/>
-          </a:prstGeom>
-          <a:noFill/>
-        </p:spPr>
-        <p:txBody>
-          <a:bodyPr wrap="square">
-            <a:spAutoFit/>
-          </a:bodyPr>
-          <a:lstStyle/>
-          <a:p>
-            <a:r>
-              <a:rPr lang="en-US" dirty="0">
-                <a:latin typeface="Gaegu" pitchFamily="2" charset="0"/>
-              </a:rPr>
-              <a:t>Sequence in Method Call</a:t>
-            </a:r>
-            <a:endParaRPr lang="en-US" b="1" dirty="0"/>
-          </a:p>
-        </p:txBody>
-      </p:sp>
       <p:grpSp>
         <p:nvGrpSpPr>
           <p:cNvPr id="20" name="Group 19">
@@ -35345,55 +31730,6 @@
       </p:grpSp>
       <p:sp>
         <p:nvSpPr>
-          <p:cNvPr id="36" name="Rectangle 35">
-            <a:extLst>
-              <a:ext uri="{FF2B5EF4-FFF2-40B4-BE49-F238E27FC236}">
-                <a16:creationId xmlns:a16="http://schemas.microsoft.com/office/drawing/2014/main" id="{A22D9C09-E5CE-935D-2104-E354CA1CB7F1}"/>
-              </a:ext>
-            </a:extLst>
-          </p:cNvPr>
-          <p:cNvSpPr/>
-          <p:nvPr/>
-        </p:nvSpPr>
-        <p:spPr>
-          <a:xfrm>
-            <a:off x="4857014" y="3550563"/>
-            <a:ext cx="2651322" cy="1437424"/>
-          </a:xfrm>
-          <a:prstGeom prst="rect">
-            <a:avLst/>
-          </a:prstGeom>
-          <a:solidFill>
-            <a:srgbClr val="ADDAFF"/>
-          </a:solidFill>
-        </p:spPr>
-        <p:style>
-          <a:lnRef idx="2">
-            <a:schemeClr val="accent1">
-              <a:shade val="15000"/>
-            </a:schemeClr>
-          </a:lnRef>
-          <a:fillRef idx="1">
-            <a:schemeClr val="accent1"/>
-          </a:fillRef>
-          <a:effectRef idx="0">
-            <a:schemeClr val="accent1"/>
-          </a:effectRef>
-          <a:fontRef idx="minor">
-            <a:schemeClr val="lt1"/>
-          </a:fontRef>
-        </p:style>
-        <p:txBody>
-          <a:bodyPr rtlCol="0" anchor="ctr"/>
-          <a:lstStyle/>
-          <a:p>
-            <a:pPr algn="ctr"/>
-            <a:endParaRPr lang="en-US"/>
-          </a:p>
-        </p:txBody>
-      </p:sp>
-      <p:sp>
-        <p:nvSpPr>
           <p:cNvPr id="54" name="Rectangle 53">
             <a:extLst>
               <a:ext uri="{FF2B5EF4-FFF2-40B4-BE49-F238E27FC236}">
@@ -35605,6 +31941,55 @@
               <a:rPr lang="en-US" sz="1200" dirty="0"/>
               <a:t>Continue with next instruction</a:t>
             </a:r>
+          </a:p>
+        </p:txBody>
+      </p:sp>
+      <p:sp>
+        <p:nvSpPr>
+          <p:cNvPr id="9" name="Rectangle 8">
+            <a:extLst>
+              <a:ext uri="{FF2B5EF4-FFF2-40B4-BE49-F238E27FC236}">
+                <a16:creationId xmlns:a16="http://schemas.microsoft.com/office/drawing/2014/main" id="{01A5F532-280A-6084-119A-A4CC0F613285}"/>
+              </a:ext>
+            </a:extLst>
+          </p:cNvPr>
+          <p:cNvSpPr/>
+          <p:nvPr/>
+        </p:nvSpPr>
+        <p:spPr>
+          <a:xfrm>
+            <a:off x="4857014" y="3550563"/>
+            <a:ext cx="2651322" cy="1437424"/>
+          </a:xfrm>
+          <a:prstGeom prst="rect">
+            <a:avLst/>
+          </a:prstGeom>
+          <a:solidFill>
+            <a:schemeClr val="bg1"/>
+          </a:solidFill>
+        </p:spPr>
+        <p:style>
+          <a:lnRef idx="2">
+            <a:schemeClr val="accent1">
+              <a:shade val="15000"/>
+            </a:schemeClr>
+          </a:lnRef>
+          <a:fillRef idx="1">
+            <a:schemeClr val="accent1"/>
+          </a:fillRef>
+          <a:effectRef idx="0">
+            <a:schemeClr val="accent1"/>
+          </a:effectRef>
+          <a:fontRef idx="minor">
+            <a:schemeClr val="lt1"/>
+          </a:fontRef>
+        </p:style>
+        <p:txBody>
+          <a:bodyPr rtlCol="0" anchor="ctr"/>
+          <a:lstStyle/>
+          <a:p>
+            <a:pPr algn="ctr"/>
+            <a:endParaRPr lang="en-US"/>
           </a:p>
         </p:txBody>
       </p:sp>

</xml_diff>

<commit_message>
Fixed warped slider backgrounds.
</commit_message>
<xml_diff>
--- a/resources/ppt-slides/sequence-data-method-call.pptx
+++ b/resources/ppt-slides/sequence-data-method-call.pptx
@@ -250,7 +250,7 @@
           <a:p>
             <a:fld id="{964302DC-9F53-934F-AE4D-0F1F197008C1}" type="datetimeFigureOut">
               <a:rPr lang="en-US" smtClean="0"/>
-              <a:t>1/3/24</a:t>
+              <a:t>1/22/24</a:t>
             </a:fld>
             <a:endParaRPr lang="en-US"/>
           </a:p>
@@ -420,7 +420,7 @@
           <a:p>
             <a:fld id="{964302DC-9F53-934F-AE4D-0F1F197008C1}" type="datetimeFigureOut">
               <a:rPr lang="en-US" smtClean="0"/>
-              <a:t>1/3/24</a:t>
+              <a:t>1/22/24</a:t>
             </a:fld>
             <a:endParaRPr lang="en-US"/>
           </a:p>
@@ -600,7 +600,7 @@
           <a:p>
             <a:fld id="{964302DC-9F53-934F-AE4D-0F1F197008C1}" type="datetimeFigureOut">
               <a:rPr lang="en-US" smtClean="0"/>
-              <a:t>1/3/24</a:t>
+              <a:t>1/22/24</a:t>
             </a:fld>
             <a:endParaRPr lang="en-US"/>
           </a:p>
@@ -770,7 +770,7 @@
           <a:p>
             <a:fld id="{964302DC-9F53-934F-AE4D-0F1F197008C1}" type="datetimeFigureOut">
               <a:rPr lang="en-US" smtClean="0"/>
-              <a:t>1/3/24</a:t>
+              <a:t>1/22/24</a:t>
             </a:fld>
             <a:endParaRPr lang="en-US"/>
           </a:p>
@@ -1014,7 +1014,7 @@
           <a:p>
             <a:fld id="{964302DC-9F53-934F-AE4D-0F1F197008C1}" type="datetimeFigureOut">
               <a:rPr lang="en-US" smtClean="0"/>
-              <a:t>1/3/24</a:t>
+              <a:t>1/22/24</a:t>
             </a:fld>
             <a:endParaRPr lang="en-US"/>
           </a:p>
@@ -1246,7 +1246,7 @@
           <a:p>
             <a:fld id="{964302DC-9F53-934F-AE4D-0F1F197008C1}" type="datetimeFigureOut">
               <a:rPr lang="en-US" smtClean="0"/>
-              <a:t>1/3/24</a:t>
+              <a:t>1/22/24</a:t>
             </a:fld>
             <a:endParaRPr lang="en-US"/>
           </a:p>
@@ -1613,7 +1613,7 @@
           <a:p>
             <a:fld id="{964302DC-9F53-934F-AE4D-0F1F197008C1}" type="datetimeFigureOut">
               <a:rPr lang="en-US" smtClean="0"/>
-              <a:t>1/3/24</a:t>
+              <a:t>1/22/24</a:t>
             </a:fld>
             <a:endParaRPr lang="en-US"/>
           </a:p>
@@ -1731,7 +1731,7 @@
           <a:p>
             <a:fld id="{964302DC-9F53-934F-AE4D-0F1F197008C1}" type="datetimeFigureOut">
               <a:rPr lang="en-US" smtClean="0"/>
-              <a:t>1/3/24</a:t>
+              <a:t>1/22/24</a:t>
             </a:fld>
             <a:endParaRPr lang="en-US"/>
           </a:p>
@@ -1826,7 +1826,7 @@
           <a:p>
             <a:fld id="{964302DC-9F53-934F-AE4D-0F1F197008C1}" type="datetimeFigureOut">
               <a:rPr lang="en-US" smtClean="0"/>
-              <a:t>1/3/24</a:t>
+              <a:t>1/22/24</a:t>
             </a:fld>
             <a:endParaRPr lang="en-US"/>
           </a:p>
@@ -2103,7 +2103,7 @@
           <a:p>
             <a:fld id="{964302DC-9F53-934F-AE4D-0F1F197008C1}" type="datetimeFigureOut">
               <a:rPr lang="en-US" smtClean="0"/>
-              <a:t>1/3/24</a:t>
+              <a:t>1/22/24</a:t>
             </a:fld>
             <a:endParaRPr lang="en-US"/>
           </a:p>
@@ -2360,7 +2360,7 @@
           <a:p>
             <a:fld id="{964302DC-9F53-934F-AE4D-0F1F197008C1}" type="datetimeFigureOut">
               <a:rPr lang="en-US" smtClean="0"/>
-              <a:t>1/3/24</a:t>
+              <a:t>1/22/24</a:t>
             </a:fld>
             <a:endParaRPr lang="en-US"/>
           </a:p>
@@ -2425,9 +2425,18 @@
 <p:sldMaster xmlns:a="http://schemas.openxmlformats.org/drawingml/2006/main" xmlns:r="http://schemas.openxmlformats.org/officeDocument/2006/relationships" xmlns:p="http://schemas.openxmlformats.org/presentationml/2006/main">
   <p:cSld>
     <p:bg>
-      <p:bgRef idx="1001">
-        <a:schemeClr val="bg1"/>
-      </p:bgRef>
+      <p:bgPr>
+        <a:blipFill dpi="0" rotWithShape="1">
+          <a:blip r:embed="rId13">
+            <a:lum/>
+          </a:blip>
+          <a:srcRect/>
+          <a:stretch>
+            <a:fillRect t="-56000" b="-56000"/>
+          </a:stretch>
+        </a:blipFill>
+        <a:effectLst/>
+      </p:bgPr>
     </p:bg>
     <p:spTree>
       <p:nvGrpSpPr>
@@ -2573,7 +2582,7 @@
           <a:p>
             <a:fld id="{964302DC-9F53-934F-AE4D-0F1F197008C1}" type="datetimeFigureOut">
               <a:rPr lang="en-US" smtClean="0"/>
-              <a:t>1/3/24</a:t>
+              <a:t>1/22/24</a:t>
             </a:fld>
             <a:endParaRPr lang="en-US"/>
           </a:p>
@@ -2964,20 +2973,6 @@
 <file path=ppt/slides/slide1.xml><?xml version="1.0" encoding="utf-8"?>
 <p:sld xmlns:a="http://schemas.openxmlformats.org/drawingml/2006/main" xmlns:r="http://schemas.openxmlformats.org/officeDocument/2006/relationships" xmlns:p="http://schemas.openxmlformats.org/presentationml/2006/main">
   <p:cSld>
-    <p:bg>
-      <p:bgPr>
-        <a:blipFill dpi="0" rotWithShape="1">
-          <a:blip r:embed="rId2">
-            <a:lum/>
-          </a:blip>
-          <a:srcRect/>
-          <a:stretch>
-            <a:fillRect/>
-          </a:stretch>
-        </a:blipFill>
-        <a:effectLst/>
-      </p:bgPr>
-    </p:bg>
     <p:spTree>
       <p:nvGrpSpPr>
         <p:cNvPr id="1" name=""/>
@@ -3089,7 +3084,7 @@
               <p:nvPr/>
             </p:nvPicPr>
             <p:blipFill>
-              <a:blip r:embed="rId3">
+              <a:blip r:embed="rId2">
                 <a:alphaModFix/>
               </a:blip>
               <a:stretch>
@@ -4759,7 +4754,7 @@
             <p:nvPr/>
           </p:nvPicPr>
           <p:blipFill>
-            <a:blip r:embed="rId4">
+            <a:blip r:embed="rId3">
               <a:alphaModFix/>
             </a:blip>
             <a:stretch>
@@ -5845,20 +5840,6 @@
 <file path=ppt/slides/slide2.xml><?xml version="1.0" encoding="utf-8"?>
 <p:sld xmlns:a="http://schemas.openxmlformats.org/drawingml/2006/main" xmlns:r="http://schemas.openxmlformats.org/officeDocument/2006/relationships" xmlns:p="http://schemas.openxmlformats.org/presentationml/2006/main">
   <p:cSld>
-    <p:bg>
-      <p:bgPr>
-        <a:blipFill dpi="0" rotWithShape="1">
-          <a:blip r:embed="rId2">
-            <a:lum/>
-          </a:blip>
-          <a:srcRect/>
-          <a:stretch>
-            <a:fillRect/>
-          </a:stretch>
-        </a:blipFill>
-        <a:effectLst/>
-      </p:bgPr>
-    </p:bg>
     <p:spTree>
       <p:nvGrpSpPr>
         <p:cNvPr id="1" name=""/>
@@ -5970,7 +5951,7 @@
               <p:nvPr/>
             </p:nvPicPr>
             <p:blipFill>
-              <a:blip r:embed="rId3">
+              <a:blip r:embed="rId2">
                 <a:alphaModFix/>
               </a:blip>
               <a:stretch>
@@ -7640,7 +7621,7 @@
             <p:nvPr/>
           </p:nvPicPr>
           <p:blipFill>
-            <a:blip r:embed="rId4">
+            <a:blip r:embed="rId3">
               <a:alphaModFix/>
             </a:blip>
             <a:stretch>
@@ -9312,20 +9293,6 @@
 <file path=ppt/slides/slide3.xml><?xml version="1.0" encoding="utf-8"?>
 <p:sld xmlns:a="http://schemas.openxmlformats.org/drawingml/2006/main" xmlns:r="http://schemas.openxmlformats.org/officeDocument/2006/relationships" xmlns:p="http://schemas.openxmlformats.org/presentationml/2006/main">
   <p:cSld>
-    <p:bg>
-      <p:bgPr>
-        <a:blipFill dpi="0" rotWithShape="1">
-          <a:blip r:embed="rId2">
-            <a:lum/>
-          </a:blip>
-          <a:srcRect/>
-          <a:stretch>
-            <a:fillRect/>
-          </a:stretch>
-        </a:blipFill>
-        <a:effectLst/>
-      </p:bgPr>
-    </p:bg>
     <p:spTree>
       <p:nvGrpSpPr>
         <p:cNvPr id="1" name=""/>
@@ -9437,7 +9404,7 @@
               <p:nvPr/>
             </p:nvPicPr>
             <p:blipFill>
-              <a:blip r:embed="rId3">
+              <a:blip r:embed="rId2">
                 <a:alphaModFix/>
               </a:blip>
               <a:stretch>
@@ -11107,7 +11074,7 @@
             <p:nvPr/>
           </p:nvPicPr>
           <p:blipFill>
-            <a:blip r:embed="rId4">
+            <a:blip r:embed="rId3">
               <a:alphaModFix/>
             </a:blip>
             <a:stretch>
@@ -12935,20 +12902,6 @@
 <file path=ppt/slides/slide4.xml><?xml version="1.0" encoding="utf-8"?>
 <p:sld xmlns:a="http://schemas.openxmlformats.org/drawingml/2006/main" xmlns:r="http://schemas.openxmlformats.org/officeDocument/2006/relationships" xmlns:p="http://schemas.openxmlformats.org/presentationml/2006/main">
   <p:cSld>
-    <p:bg>
-      <p:bgPr>
-        <a:blipFill dpi="0" rotWithShape="1">
-          <a:blip r:embed="rId2">
-            <a:lum/>
-          </a:blip>
-          <a:srcRect/>
-          <a:stretch>
-            <a:fillRect/>
-          </a:stretch>
-        </a:blipFill>
-        <a:effectLst/>
-      </p:bgPr>
-    </p:bg>
     <p:spTree>
       <p:nvGrpSpPr>
         <p:cNvPr id="1" name=""/>
@@ -13060,7 +13013,7 @@
               <p:nvPr/>
             </p:nvPicPr>
             <p:blipFill>
-              <a:blip r:embed="rId3">
+              <a:blip r:embed="rId2">
                 <a:alphaModFix/>
               </a:blip>
               <a:stretch>
@@ -14730,7 +14683,7 @@
             <p:nvPr/>
           </p:nvPicPr>
           <p:blipFill>
-            <a:blip r:embed="rId4">
+            <a:blip r:embed="rId3">
               <a:alphaModFix/>
             </a:blip>
             <a:stretch>
@@ -16391,20 +16344,6 @@
 <file path=ppt/slides/slide5.xml><?xml version="1.0" encoding="utf-8"?>
 <p:sld xmlns:a="http://schemas.openxmlformats.org/drawingml/2006/main" xmlns:r="http://schemas.openxmlformats.org/officeDocument/2006/relationships" xmlns:p="http://schemas.openxmlformats.org/presentationml/2006/main">
   <p:cSld>
-    <p:bg>
-      <p:bgPr>
-        <a:blipFill dpi="0" rotWithShape="1">
-          <a:blip r:embed="rId2">
-            <a:lum/>
-          </a:blip>
-          <a:srcRect/>
-          <a:stretch>
-            <a:fillRect/>
-          </a:stretch>
-        </a:blipFill>
-        <a:effectLst/>
-      </p:bgPr>
-    </p:bg>
     <p:spTree>
       <p:nvGrpSpPr>
         <p:cNvPr id="1" name=""/>
@@ -16575,7 +16514,7 @@
               <p:nvPr/>
             </p:nvPicPr>
             <p:blipFill>
-              <a:blip r:embed="rId3">
+              <a:blip r:embed="rId2">
                 <a:alphaModFix/>
               </a:blip>
               <a:stretch>
@@ -18245,7 +18184,7 @@
             <p:nvPr/>
           </p:nvPicPr>
           <p:blipFill>
-            <a:blip r:embed="rId4">
+            <a:blip r:embed="rId3">
               <a:alphaModFix/>
             </a:blip>
             <a:stretch>
@@ -20266,20 +20205,6 @@
 <file path=ppt/slides/slide6.xml><?xml version="1.0" encoding="utf-8"?>
 <p:sld xmlns:a="http://schemas.openxmlformats.org/drawingml/2006/main" xmlns:r="http://schemas.openxmlformats.org/officeDocument/2006/relationships" xmlns:p="http://schemas.openxmlformats.org/presentationml/2006/main">
   <p:cSld>
-    <p:bg>
-      <p:bgPr>
-        <a:blipFill dpi="0" rotWithShape="1">
-          <a:blip r:embed="rId2">
-            <a:lum/>
-          </a:blip>
-          <a:srcRect/>
-          <a:stretch>
-            <a:fillRect/>
-          </a:stretch>
-        </a:blipFill>
-        <a:effectLst/>
-      </p:bgPr>
-    </p:bg>
     <p:spTree>
       <p:nvGrpSpPr>
         <p:cNvPr id="1" name=""/>
@@ -20391,7 +20316,7 @@
               <p:nvPr/>
             </p:nvPicPr>
             <p:blipFill>
-              <a:blip r:embed="rId3">
+              <a:blip r:embed="rId2">
                 <a:alphaModFix/>
               </a:blip>
               <a:stretch>
@@ -22061,7 +21986,7 @@
             <p:nvPr/>
           </p:nvPicPr>
           <p:blipFill>
-            <a:blip r:embed="rId4">
+            <a:blip r:embed="rId3">
               <a:alphaModFix/>
             </a:blip>
             <a:stretch>
@@ -23938,7 +23863,7 @@
             <p:nvPr/>
           </p:nvPicPr>
           <p:blipFill>
-            <a:blip r:embed="rId4"/>
+            <a:blip r:embed="rId3"/>
             <a:stretch>
               <a:fillRect/>
             </a:stretch>

</xml_diff>

<commit_message>
Remove mention of the stack from sequence and method call sliders.
</commit_message>
<xml_diff>
--- a/resources/ppt-slides/sequence-data-method-call.pptx
+++ b/resources/ppt-slides/sequence-data-method-call.pptx
@@ -250,7 +250,7 @@
           <a:p>
             <a:fld id="{964302DC-9F53-934F-AE4D-0F1F197008C1}" type="datetimeFigureOut">
               <a:rPr lang="en-US" smtClean="0"/>
-              <a:t>1/22/24</a:t>
+              <a:t>1/23/24</a:t>
             </a:fld>
             <a:endParaRPr lang="en-US"/>
           </a:p>
@@ -420,7 +420,7 @@
           <a:p>
             <a:fld id="{964302DC-9F53-934F-AE4D-0F1F197008C1}" type="datetimeFigureOut">
               <a:rPr lang="en-US" smtClean="0"/>
-              <a:t>1/22/24</a:t>
+              <a:t>1/23/24</a:t>
             </a:fld>
             <a:endParaRPr lang="en-US"/>
           </a:p>
@@ -600,7 +600,7 @@
           <a:p>
             <a:fld id="{964302DC-9F53-934F-AE4D-0F1F197008C1}" type="datetimeFigureOut">
               <a:rPr lang="en-US" smtClean="0"/>
-              <a:t>1/22/24</a:t>
+              <a:t>1/23/24</a:t>
             </a:fld>
             <a:endParaRPr lang="en-US"/>
           </a:p>
@@ -770,7 +770,7 @@
           <a:p>
             <a:fld id="{964302DC-9F53-934F-AE4D-0F1F197008C1}" type="datetimeFigureOut">
               <a:rPr lang="en-US" smtClean="0"/>
-              <a:t>1/22/24</a:t>
+              <a:t>1/23/24</a:t>
             </a:fld>
             <a:endParaRPr lang="en-US"/>
           </a:p>
@@ -1014,7 +1014,7 @@
           <a:p>
             <a:fld id="{964302DC-9F53-934F-AE4D-0F1F197008C1}" type="datetimeFigureOut">
               <a:rPr lang="en-US" smtClean="0"/>
-              <a:t>1/22/24</a:t>
+              <a:t>1/23/24</a:t>
             </a:fld>
             <a:endParaRPr lang="en-US"/>
           </a:p>
@@ -1246,7 +1246,7 @@
           <a:p>
             <a:fld id="{964302DC-9F53-934F-AE4D-0F1F197008C1}" type="datetimeFigureOut">
               <a:rPr lang="en-US" smtClean="0"/>
-              <a:t>1/22/24</a:t>
+              <a:t>1/23/24</a:t>
             </a:fld>
             <a:endParaRPr lang="en-US"/>
           </a:p>
@@ -1613,7 +1613,7 @@
           <a:p>
             <a:fld id="{964302DC-9F53-934F-AE4D-0F1F197008C1}" type="datetimeFigureOut">
               <a:rPr lang="en-US" smtClean="0"/>
-              <a:t>1/22/24</a:t>
+              <a:t>1/23/24</a:t>
             </a:fld>
             <a:endParaRPr lang="en-US"/>
           </a:p>
@@ -1731,7 +1731,7 @@
           <a:p>
             <a:fld id="{964302DC-9F53-934F-AE4D-0F1F197008C1}" type="datetimeFigureOut">
               <a:rPr lang="en-US" smtClean="0"/>
-              <a:t>1/22/24</a:t>
+              <a:t>1/23/24</a:t>
             </a:fld>
             <a:endParaRPr lang="en-US"/>
           </a:p>
@@ -1826,7 +1826,7 @@
           <a:p>
             <a:fld id="{964302DC-9F53-934F-AE4D-0F1F197008C1}" type="datetimeFigureOut">
               <a:rPr lang="en-US" smtClean="0"/>
-              <a:t>1/22/24</a:t>
+              <a:t>1/23/24</a:t>
             </a:fld>
             <a:endParaRPr lang="en-US"/>
           </a:p>
@@ -2103,7 +2103,7 @@
           <a:p>
             <a:fld id="{964302DC-9F53-934F-AE4D-0F1F197008C1}" type="datetimeFigureOut">
               <a:rPr lang="en-US" smtClean="0"/>
-              <a:t>1/22/24</a:t>
+              <a:t>1/23/24</a:t>
             </a:fld>
             <a:endParaRPr lang="en-US"/>
           </a:p>
@@ -2360,7 +2360,7 @@
           <a:p>
             <a:fld id="{964302DC-9F53-934F-AE4D-0F1F197008C1}" type="datetimeFigureOut">
               <a:rPr lang="en-US" smtClean="0"/>
-              <a:t>1/22/24</a:t>
+              <a:t>1/23/24</a:t>
             </a:fld>
             <a:endParaRPr lang="en-US"/>
           </a:p>
@@ -2582,7 +2582,7 @@
           <a:p>
             <a:fld id="{964302DC-9F53-934F-AE4D-0F1F197008C1}" type="datetimeFigureOut">
               <a:rPr lang="en-US" smtClean="0"/>
-              <a:t>1/22/24</a:t>
+              <a:t>1/23/24</a:t>
             </a:fld>
             <a:endParaRPr lang="en-US"/>
           </a:p>
@@ -3139,43 +3139,6 @@
             </p:txBody>
           </p:sp>
         </p:grpSp>
-        <p:sp>
-          <p:nvSpPr>
-            <p:cNvPr id="2" name="TextBox 1">
-              <a:extLst>
-                <a:ext uri="{FF2B5EF4-FFF2-40B4-BE49-F238E27FC236}">
-                  <a16:creationId xmlns:a16="http://schemas.microsoft.com/office/drawing/2014/main" id="{7896A7BA-08CF-32E6-6836-EBE01A61209D}"/>
-                </a:ext>
-              </a:extLst>
-            </p:cNvPr>
-            <p:cNvSpPr txBox="1"/>
-            <p:nvPr/>
-          </p:nvSpPr>
-          <p:spPr>
-            <a:xfrm>
-              <a:off x="487351" y="-2537265"/>
-              <a:ext cx="1119217" cy="369332"/>
-            </a:xfrm>
-            <a:prstGeom prst="rect">
-              <a:avLst/>
-            </a:prstGeom>
-            <a:noFill/>
-          </p:spPr>
-          <p:txBody>
-            <a:bodyPr wrap="none" rtlCol="0">
-              <a:spAutoFit/>
-            </a:bodyPr>
-            <a:lstStyle/>
-            <a:p>
-              <a:r>
-                <a:rPr lang="en-US" dirty="0">
-                  <a:latin typeface="Gaegu" pitchFamily="2" charset="0"/>
-                </a:rPr>
-                <a:t>The Stack</a:t>
-              </a:r>
-            </a:p>
-          </p:txBody>
-        </p:sp>
         <p:grpSp>
           <p:nvGrpSpPr>
             <p:cNvPr id="52" name="Group 51">
@@ -6006,43 +5969,6 @@
             </p:txBody>
           </p:sp>
         </p:grpSp>
-        <p:sp>
-          <p:nvSpPr>
-            <p:cNvPr id="2" name="TextBox 1">
-              <a:extLst>
-                <a:ext uri="{FF2B5EF4-FFF2-40B4-BE49-F238E27FC236}">
-                  <a16:creationId xmlns:a16="http://schemas.microsoft.com/office/drawing/2014/main" id="{7896A7BA-08CF-32E6-6836-EBE01A61209D}"/>
-                </a:ext>
-              </a:extLst>
-            </p:cNvPr>
-            <p:cNvSpPr txBox="1"/>
-            <p:nvPr/>
-          </p:nvSpPr>
-          <p:spPr>
-            <a:xfrm>
-              <a:off x="487351" y="-2537265"/>
-              <a:ext cx="1119217" cy="369332"/>
-            </a:xfrm>
-            <a:prstGeom prst="rect">
-              <a:avLst/>
-            </a:prstGeom>
-            <a:noFill/>
-          </p:spPr>
-          <p:txBody>
-            <a:bodyPr wrap="none" rtlCol="0">
-              <a:spAutoFit/>
-            </a:bodyPr>
-            <a:lstStyle/>
-            <a:p>
-              <a:r>
-                <a:rPr lang="en-US" dirty="0">
-                  <a:latin typeface="Gaegu" pitchFamily="2" charset="0"/>
-                </a:rPr>
-                <a:t>The Stack</a:t>
-              </a:r>
-            </a:p>
-          </p:txBody>
-        </p:sp>
         <p:grpSp>
           <p:nvGrpSpPr>
             <p:cNvPr id="52" name="Group 51">
@@ -9459,43 +9385,6 @@
             </p:txBody>
           </p:sp>
         </p:grpSp>
-        <p:sp>
-          <p:nvSpPr>
-            <p:cNvPr id="2" name="TextBox 1">
-              <a:extLst>
-                <a:ext uri="{FF2B5EF4-FFF2-40B4-BE49-F238E27FC236}">
-                  <a16:creationId xmlns:a16="http://schemas.microsoft.com/office/drawing/2014/main" id="{7896A7BA-08CF-32E6-6836-EBE01A61209D}"/>
-                </a:ext>
-              </a:extLst>
-            </p:cNvPr>
-            <p:cNvSpPr txBox="1"/>
-            <p:nvPr/>
-          </p:nvSpPr>
-          <p:spPr>
-            <a:xfrm>
-              <a:off x="487351" y="-2537265"/>
-              <a:ext cx="1119217" cy="369332"/>
-            </a:xfrm>
-            <a:prstGeom prst="rect">
-              <a:avLst/>
-            </a:prstGeom>
-            <a:noFill/>
-          </p:spPr>
-          <p:txBody>
-            <a:bodyPr wrap="none" rtlCol="0">
-              <a:spAutoFit/>
-            </a:bodyPr>
-            <a:lstStyle/>
-            <a:p>
-              <a:r>
-                <a:rPr lang="en-US" dirty="0">
-                  <a:latin typeface="Gaegu" pitchFamily="2" charset="0"/>
-                </a:rPr>
-                <a:t>The Stack</a:t>
-              </a:r>
-            </a:p>
-          </p:txBody>
-        </p:sp>
         <p:grpSp>
           <p:nvGrpSpPr>
             <p:cNvPr id="52" name="Group 51">
@@ -13068,43 +12957,6 @@
             </p:txBody>
           </p:sp>
         </p:grpSp>
-        <p:sp>
-          <p:nvSpPr>
-            <p:cNvPr id="2" name="TextBox 1">
-              <a:extLst>
-                <a:ext uri="{FF2B5EF4-FFF2-40B4-BE49-F238E27FC236}">
-                  <a16:creationId xmlns:a16="http://schemas.microsoft.com/office/drawing/2014/main" id="{7896A7BA-08CF-32E6-6836-EBE01A61209D}"/>
-                </a:ext>
-              </a:extLst>
-            </p:cNvPr>
-            <p:cNvSpPr txBox="1"/>
-            <p:nvPr/>
-          </p:nvSpPr>
-          <p:spPr>
-            <a:xfrm>
-              <a:off x="487351" y="-2537265"/>
-              <a:ext cx="1119217" cy="369332"/>
-            </a:xfrm>
-            <a:prstGeom prst="rect">
-              <a:avLst/>
-            </a:prstGeom>
-            <a:noFill/>
-          </p:spPr>
-          <p:txBody>
-            <a:bodyPr wrap="none" rtlCol="0">
-              <a:spAutoFit/>
-            </a:bodyPr>
-            <a:lstStyle/>
-            <a:p>
-              <a:r>
-                <a:rPr lang="en-US" dirty="0">
-                  <a:latin typeface="Gaegu" pitchFamily="2" charset="0"/>
-                </a:rPr>
-                <a:t>The Stack</a:t>
-              </a:r>
-            </a:p>
-          </p:txBody>
-        </p:sp>
         <p:grpSp>
           <p:nvGrpSpPr>
             <p:cNvPr id="52" name="Group 51">
@@ -16569,43 +16421,6 @@
             </p:txBody>
           </p:sp>
         </p:grpSp>
-        <p:sp>
-          <p:nvSpPr>
-            <p:cNvPr id="2" name="TextBox 1">
-              <a:extLst>
-                <a:ext uri="{FF2B5EF4-FFF2-40B4-BE49-F238E27FC236}">
-                  <a16:creationId xmlns:a16="http://schemas.microsoft.com/office/drawing/2014/main" id="{7896A7BA-08CF-32E6-6836-EBE01A61209D}"/>
-                </a:ext>
-              </a:extLst>
-            </p:cNvPr>
-            <p:cNvSpPr txBox="1"/>
-            <p:nvPr/>
-          </p:nvSpPr>
-          <p:spPr>
-            <a:xfrm>
-              <a:off x="487351" y="-2537265"/>
-              <a:ext cx="1119217" cy="369332"/>
-            </a:xfrm>
-            <a:prstGeom prst="rect">
-              <a:avLst/>
-            </a:prstGeom>
-            <a:noFill/>
-          </p:spPr>
-          <p:txBody>
-            <a:bodyPr wrap="none" rtlCol="0">
-              <a:spAutoFit/>
-            </a:bodyPr>
-            <a:lstStyle/>
-            <a:p>
-              <a:r>
-                <a:rPr lang="en-US" dirty="0">
-                  <a:latin typeface="Gaegu" pitchFamily="2" charset="0"/>
-                </a:rPr>
-                <a:t>The Stack</a:t>
-              </a:r>
-            </a:p>
-          </p:txBody>
-        </p:sp>
         <p:grpSp>
           <p:nvGrpSpPr>
             <p:cNvPr id="52" name="Group 51">
@@ -20371,43 +20186,6 @@
             </p:txBody>
           </p:sp>
         </p:grpSp>
-        <p:sp>
-          <p:nvSpPr>
-            <p:cNvPr id="2" name="TextBox 1">
-              <a:extLst>
-                <a:ext uri="{FF2B5EF4-FFF2-40B4-BE49-F238E27FC236}">
-                  <a16:creationId xmlns:a16="http://schemas.microsoft.com/office/drawing/2014/main" id="{7896A7BA-08CF-32E6-6836-EBE01A61209D}"/>
-                </a:ext>
-              </a:extLst>
-            </p:cNvPr>
-            <p:cNvSpPr txBox="1"/>
-            <p:nvPr/>
-          </p:nvSpPr>
-          <p:spPr>
-            <a:xfrm>
-              <a:off x="487351" y="-2537265"/>
-              <a:ext cx="1119217" cy="369332"/>
-            </a:xfrm>
-            <a:prstGeom prst="rect">
-              <a:avLst/>
-            </a:prstGeom>
-            <a:noFill/>
-          </p:spPr>
-          <p:txBody>
-            <a:bodyPr wrap="none" rtlCol="0">
-              <a:spAutoFit/>
-            </a:bodyPr>
-            <a:lstStyle/>
-            <a:p>
-              <a:r>
-                <a:rPr lang="en-US" dirty="0">
-                  <a:latin typeface="Gaegu" pitchFamily="2" charset="0"/>
-                </a:rPr>
-                <a:t>The Stack</a:t>
-              </a:r>
-            </a:p>
-          </p:txBody>
-        </p:sp>
         <p:grpSp>
           <p:nvGrpSpPr>
             <p:cNvPr id="52" name="Group 51">
@@ -24375,43 +24153,6 @@
             </p:txBody>
           </p:sp>
         </p:grpSp>
-        <p:sp>
-          <p:nvSpPr>
-            <p:cNvPr id="2" name="TextBox 1">
-              <a:extLst>
-                <a:ext uri="{FF2B5EF4-FFF2-40B4-BE49-F238E27FC236}">
-                  <a16:creationId xmlns:a16="http://schemas.microsoft.com/office/drawing/2014/main" id="{7896A7BA-08CF-32E6-6836-EBE01A61209D}"/>
-                </a:ext>
-              </a:extLst>
-            </p:cNvPr>
-            <p:cNvSpPr txBox="1"/>
-            <p:nvPr/>
-          </p:nvSpPr>
-          <p:spPr>
-            <a:xfrm>
-              <a:off x="487351" y="-2537265"/>
-              <a:ext cx="1119217" cy="369332"/>
-            </a:xfrm>
-            <a:prstGeom prst="rect">
-              <a:avLst/>
-            </a:prstGeom>
-            <a:noFill/>
-          </p:spPr>
-          <p:txBody>
-            <a:bodyPr wrap="none" rtlCol="0">
-              <a:spAutoFit/>
-            </a:bodyPr>
-            <a:lstStyle/>
-            <a:p>
-              <a:r>
-                <a:rPr lang="en-US" dirty="0">
-                  <a:latin typeface="Gaegu" pitchFamily="2" charset="0"/>
-                </a:rPr>
-                <a:t>The Stack</a:t>
-              </a:r>
-            </a:p>
-          </p:txBody>
-        </p:sp>
         <p:grpSp>
           <p:nvGrpSpPr>
             <p:cNvPr id="52" name="Group 51">
@@ -28366,43 +28107,6 @@
             </p:txBody>
           </p:sp>
         </p:grpSp>
-        <p:sp>
-          <p:nvSpPr>
-            <p:cNvPr id="2" name="TextBox 1">
-              <a:extLst>
-                <a:ext uri="{FF2B5EF4-FFF2-40B4-BE49-F238E27FC236}">
-                  <a16:creationId xmlns:a16="http://schemas.microsoft.com/office/drawing/2014/main" id="{7896A7BA-08CF-32E6-6836-EBE01A61209D}"/>
-                </a:ext>
-              </a:extLst>
-            </p:cNvPr>
-            <p:cNvSpPr txBox="1"/>
-            <p:nvPr/>
-          </p:nvSpPr>
-          <p:spPr>
-            <a:xfrm>
-              <a:off x="487351" y="-2537265"/>
-              <a:ext cx="1119217" cy="369332"/>
-            </a:xfrm>
-            <a:prstGeom prst="rect">
-              <a:avLst/>
-            </a:prstGeom>
-            <a:noFill/>
-          </p:spPr>
-          <p:txBody>
-            <a:bodyPr wrap="none" rtlCol="0">
-              <a:spAutoFit/>
-            </a:bodyPr>
-            <a:lstStyle/>
-            <a:p>
-              <a:r>
-                <a:rPr lang="en-US" dirty="0">
-                  <a:latin typeface="Gaegu" pitchFamily="2" charset="0"/>
-                </a:rPr>
-                <a:t>The Stack</a:t>
-              </a:r>
-            </a:p>
-          </p:txBody>
-        </p:sp>
         <p:grpSp>
           <p:nvGrpSpPr>
             <p:cNvPr id="52" name="Group 51">

</xml_diff>